<commit_message>
complete Jpa Persistence post! Great!
</commit_message>
<xml_diff>
--- a/assets/spring/spring.pptx
+++ b/assets/spring/spring.pptx
@@ -4,9 +4,14 @@
   <p:sldMasterIdLst>
     <p:sldMasterId id="2147483648" r:id="rId1"/>
   </p:sldMasterIdLst>
+  <p:notesMasterIdLst>
+    <p:notesMasterId r:id="rId6"/>
+  </p:notesMasterIdLst>
   <p:sldIdLst>
     <p:sldId id="256" r:id="rId2"/>
     <p:sldId id="257" r:id="rId3"/>
+    <p:sldId id="258" r:id="rId4"/>
+    <p:sldId id="259" r:id="rId5"/>
   </p:sldIdLst>
   <p:sldSz cx="12192000" cy="6858000"/>
   <p:notesSz cx="6858000" cy="9144000"/>
@@ -112,15 +117,729 @@
           <p14:sldIdLst>
             <p14:sldId id="256"/>
             <p14:sldId id="257"/>
+            <p14:sldId id="258"/>
+            <p14:sldId id="259"/>
           </p14:sldIdLst>
         </p14:section>
-        <p14:section name="JPA" id="{ED4FC4C4-6DC7-4EF7-A00E-4783D1D6B698}">
+        <p14:section name="Spring" id="{ED4FC4C4-6DC7-4EF7-A00E-4783D1D6B698}">
           <p14:sldIdLst/>
         </p14:section>
       </p14:sectionLst>
     </p:ext>
+    <p:ext uri="{EFAFB233-063F-42B5-8137-9DF3F51BA10A}">
+      <p15:sldGuideLst xmlns:p15="http://schemas.microsoft.com/office/powerpoint/2012/main"/>
+    </p:ext>
   </p:extLst>
 </p:presentation>
+</file>
+
+<file path=ppt/notesMasters/notesMaster1.xml><?xml version="1.0" encoding="utf-8"?>
+<p:notesMaster xmlns:a="http://schemas.openxmlformats.org/drawingml/2006/main" xmlns:r="http://schemas.openxmlformats.org/officeDocument/2006/relationships" xmlns:p="http://schemas.openxmlformats.org/presentationml/2006/main">
+  <p:cSld>
+    <p:bg>
+      <p:bgRef idx="1001">
+        <a:schemeClr val="bg1"/>
+      </p:bgRef>
+    </p:bg>
+    <p:spTree>
+      <p:nvGrpSpPr>
+        <p:cNvPr id="1" name=""/>
+        <p:cNvGrpSpPr/>
+        <p:nvPr/>
+      </p:nvGrpSpPr>
+      <p:grpSpPr>
+        <a:xfrm>
+          <a:off x="0" y="0"/>
+          <a:ext cx="0" cy="0"/>
+          <a:chOff x="0" y="0"/>
+          <a:chExt cx="0" cy="0"/>
+        </a:xfrm>
+      </p:grpSpPr>
+      <p:sp>
+        <p:nvSpPr>
+          <p:cNvPr id="2" name="머리글 개체 틀 1"/>
+          <p:cNvSpPr>
+            <a:spLocks noGrp="1"/>
+          </p:cNvSpPr>
+          <p:nvPr>
+            <p:ph type="hdr" sz="quarter"/>
+          </p:nvPr>
+        </p:nvSpPr>
+        <p:spPr>
+          <a:xfrm>
+            <a:off x="0" y="0"/>
+            <a:ext cx="2971800" cy="458788"/>
+          </a:xfrm>
+          <a:prstGeom prst="rect">
+            <a:avLst/>
+          </a:prstGeom>
+        </p:spPr>
+        <p:txBody>
+          <a:bodyPr vert="horz" lIns="91440" tIns="45720" rIns="91440" bIns="45720" rtlCol="0"/>
+          <a:lstStyle>
+            <a:lvl1pPr algn="l">
+              <a:defRPr sz="1200"/>
+            </a:lvl1pPr>
+          </a:lstStyle>
+          <a:p>
+            <a:endParaRPr lang="ko-KR" altLang="en-US" dirty="0"/>
+          </a:p>
+        </p:txBody>
+      </p:sp>
+      <p:sp>
+        <p:nvSpPr>
+          <p:cNvPr id="3" name="날짜 개체 틀 2"/>
+          <p:cNvSpPr>
+            <a:spLocks noGrp="1"/>
+          </p:cNvSpPr>
+          <p:nvPr>
+            <p:ph type="dt" idx="1"/>
+          </p:nvPr>
+        </p:nvSpPr>
+        <p:spPr>
+          <a:xfrm>
+            <a:off x="3884613" y="0"/>
+            <a:ext cx="2971800" cy="458788"/>
+          </a:xfrm>
+          <a:prstGeom prst="rect">
+            <a:avLst/>
+          </a:prstGeom>
+        </p:spPr>
+        <p:txBody>
+          <a:bodyPr vert="horz" lIns="91440" tIns="45720" rIns="91440" bIns="45720" rtlCol="0"/>
+          <a:lstStyle>
+            <a:lvl1pPr algn="r">
+              <a:defRPr sz="1200"/>
+            </a:lvl1pPr>
+          </a:lstStyle>
+          <a:p>
+            <a:fld id="{21E43087-1E83-4EBB-B2F1-05118D3E9DD8}" type="datetimeFigureOut">
+              <a:rPr lang="ko-KR" altLang="en-US" smtClean="0"/>
+              <a:t>2019-04-03</a:t>
+            </a:fld>
+            <a:endParaRPr lang="ko-KR" altLang="en-US" dirty="0"/>
+          </a:p>
+        </p:txBody>
+      </p:sp>
+      <p:sp>
+        <p:nvSpPr>
+          <p:cNvPr id="4" name="슬라이드 이미지 개체 틀 3"/>
+          <p:cNvSpPr>
+            <a:spLocks noGrp="1" noRot="1" noChangeAspect="1"/>
+          </p:cNvSpPr>
+          <p:nvPr>
+            <p:ph type="sldImg" idx="2"/>
+          </p:nvPr>
+        </p:nvSpPr>
+        <p:spPr>
+          <a:xfrm>
+            <a:off x="685800" y="1143000"/>
+            <a:ext cx="5486400" cy="3086100"/>
+          </a:xfrm>
+          <a:prstGeom prst="rect">
+            <a:avLst/>
+          </a:prstGeom>
+          <a:noFill/>
+          <a:ln w="12700">
+            <a:solidFill>
+              <a:prstClr val="black"/>
+            </a:solidFill>
+          </a:ln>
+        </p:spPr>
+        <p:txBody>
+          <a:bodyPr vert="horz" lIns="91440" tIns="45720" rIns="91440" bIns="45720" rtlCol="0" anchor="ctr"/>
+          <a:lstStyle/>
+          <a:p>
+            <a:endParaRPr lang="ko-KR" altLang="en-US" dirty="0"/>
+          </a:p>
+        </p:txBody>
+      </p:sp>
+      <p:sp>
+        <p:nvSpPr>
+          <p:cNvPr id="5" name="슬라이드 노트 개체 틀 4"/>
+          <p:cNvSpPr>
+            <a:spLocks noGrp="1"/>
+          </p:cNvSpPr>
+          <p:nvPr>
+            <p:ph type="body" sz="quarter" idx="3"/>
+          </p:nvPr>
+        </p:nvSpPr>
+        <p:spPr>
+          <a:xfrm>
+            <a:off x="685800" y="4400550"/>
+            <a:ext cx="5486400" cy="3600450"/>
+          </a:xfrm>
+          <a:prstGeom prst="rect">
+            <a:avLst/>
+          </a:prstGeom>
+        </p:spPr>
+        <p:txBody>
+          <a:bodyPr vert="horz" lIns="91440" tIns="45720" rIns="91440" bIns="45720" rtlCol="0"/>
+          <a:lstStyle/>
+          <a:p>
+            <a:pPr lvl="0"/>
+            <a:r>
+              <a:rPr lang="ko-KR" altLang="en-US"/>
+              <a:t>마스터 텍스트 스타일을 편집하려면 클릭</a:t>
+            </a:r>
+          </a:p>
+          <a:p>
+            <a:pPr lvl="1"/>
+            <a:r>
+              <a:rPr lang="ko-KR" altLang="en-US"/>
+              <a:t>두 번째 수준</a:t>
+            </a:r>
+          </a:p>
+          <a:p>
+            <a:pPr lvl="2"/>
+            <a:r>
+              <a:rPr lang="ko-KR" altLang="en-US"/>
+              <a:t>세 번째 수준</a:t>
+            </a:r>
+          </a:p>
+          <a:p>
+            <a:pPr lvl="3"/>
+            <a:r>
+              <a:rPr lang="ko-KR" altLang="en-US"/>
+              <a:t>네 번째 수준</a:t>
+            </a:r>
+          </a:p>
+          <a:p>
+            <a:pPr lvl="4"/>
+            <a:r>
+              <a:rPr lang="ko-KR" altLang="en-US"/>
+              <a:t>다섯 번째 수준</a:t>
+            </a:r>
+          </a:p>
+        </p:txBody>
+      </p:sp>
+      <p:sp>
+        <p:nvSpPr>
+          <p:cNvPr id="6" name="바닥글 개체 틀 5"/>
+          <p:cNvSpPr>
+            <a:spLocks noGrp="1"/>
+          </p:cNvSpPr>
+          <p:nvPr>
+            <p:ph type="ftr" sz="quarter" idx="4"/>
+          </p:nvPr>
+        </p:nvSpPr>
+        <p:spPr>
+          <a:xfrm>
+            <a:off x="0" y="8685213"/>
+            <a:ext cx="2971800" cy="458787"/>
+          </a:xfrm>
+          <a:prstGeom prst="rect">
+            <a:avLst/>
+          </a:prstGeom>
+        </p:spPr>
+        <p:txBody>
+          <a:bodyPr vert="horz" lIns="91440" tIns="45720" rIns="91440" bIns="45720" rtlCol="0" anchor="b"/>
+          <a:lstStyle>
+            <a:lvl1pPr algn="l">
+              <a:defRPr sz="1200"/>
+            </a:lvl1pPr>
+          </a:lstStyle>
+          <a:p>
+            <a:endParaRPr lang="ko-KR" altLang="en-US" dirty="0"/>
+          </a:p>
+        </p:txBody>
+      </p:sp>
+      <p:sp>
+        <p:nvSpPr>
+          <p:cNvPr id="7" name="슬라이드 번호 개체 틀 6"/>
+          <p:cNvSpPr>
+            <a:spLocks noGrp="1"/>
+          </p:cNvSpPr>
+          <p:nvPr>
+            <p:ph type="sldNum" sz="quarter" idx="5"/>
+          </p:nvPr>
+        </p:nvSpPr>
+        <p:spPr>
+          <a:xfrm>
+            <a:off x="3884613" y="8685213"/>
+            <a:ext cx="2971800" cy="458787"/>
+          </a:xfrm>
+          <a:prstGeom prst="rect">
+            <a:avLst/>
+          </a:prstGeom>
+        </p:spPr>
+        <p:txBody>
+          <a:bodyPr vert="horz" lIns="91440" tIns="45720" rIns="91440" bIns="45720" rtlCol="0" anchor="b"/>
+          <a:lstStyle>
+            <a:lvl1pPr algn="r">
+              <a:defRPr sz="1200"/>
+            </a:lvl1pPr>
+          </a:lstStyle>
+          <a:p>
+            <a:fld id="{5E44F880-DA34-4F6F-BE1A-465E7F1168D1}" type="slidenum">
+              <a:rPr lang="ko-KR" altLang="en-US" smtClean="0"/>
+              <a:t>‹#›</a:t>
+            </a:fld>
+            <a:endParaRPr lang="ko-KR" altLang="en-US" dirty="0"/>
+          </a:p>
+        </p:txBody>
+      </p:sp>
+    </p:spTree>
+    <p:extLst>
+      <p:ext uri="{BB962C8B-B14F-4D97-AF65-F5344CB8AC3E}">
+        <p14:creationId xmlns:p14="http://schemas.microsoft.com/office/powerpoint/2010/main" val="1592594428"/>
+      </p:ext>
+    </p:extLst>
+  </p:cSld>
+  <p:clrMap bg1="lt1" tx1="dk1" bg2="lt2" tx2="dk2" accent1="accent1" accent2="accent2" accent3="accent3" accent4="accent4" accent5="accent5" accent6="accent6" hlink="hlink" folHlink="folHlink"/>
+  <p:notesStyle>
+    <a:lvl1pPr marL="0" algn="l" defTabSz="914400" rtl="0" eaLnBrk="1" latinLnBrk="1" hangingPunct="1">
+      <a:defRPr sz="1200" kern="1200">
+        <a:solidFill>
+          <a:schemeClr val="tx1"/>
+        </a:solidFill>
+        <a:latin typeface="+mn-lt"/>
+        <a:ea typeface="+mn-ea"/>
+        <a:cs typeface="+mn-cs"/>
+      </a:defRPr>
+    </a:lvl1pPr>
+    <a:lvl2pPr marL="457200" algn="l" defTabSz="914400" rtl="0" eaLnBrk="1" latinLnBrk="1" hangingPunct="1">
+      <a:defRPr sz="1200" kern="1200">
+        <a:solidFill>
+          <a:schemeClr val="tx1"/>
+        </a:solidFill>
+        <a:latin typeface="+mn-lt"/>
+        <a:ea typeface="+mn-ea"/>
+        <a:cs typeface="+mn-cs"/>
+      </a:defRPr>
+    </a:lvl2pPr>
+    <a:lvl3pPr marL="914400" algn="l" defTabSz="914400" rtl="0" eaLnBrk="1" latinLnBrk="1" hangingPunct="1">
+      <a:defRPr sz="1200" kern="1200">
+        <a:solidFill>
+          <a:schemeClr val="tx1"/>
+        </a:solidFill>
+        <a:latin typeface="+mn-lt"/>
+        <a:ea typeface="+mn-ea"/>
+        <a:cs typeface="+mn-cs"/>
+      </a:defRPr>
+    </a:lvl3pPr>
+    <a:lvl4pPr marL="1371600" algn="l" defTabSz="914400" rtl="0" eaLnBrk="1" latinLnBrk="1" hangingPunct="1">
+      <a:defRPr sz="1200" kern="1200">
+        <a:solidFill>
+          <a:schemeClr val="tx1"/>
+        </a:solidFill>
+        <a:latin typeface="+mn-lt"/>
+        <a:ea typeface="+mn-ea"/>
+        <a:cs typeface="+mn-cs"/>
+      </a:defRPr>
+    </a:lvl4pPr>
+    <a:lvl5pPr marL="1828800" algn="l" defTabSz="914400" rtl="0" eaLnBrk="1" latinLnBrk="1" hangingPunct="1">
+      <a:defRPr sz="1200" kern="1200">
+        <a:solidFill>
+          <a:schemeClr val="tx1"/>
+        </a:solidFill>
+        <a:latin typeface="+mn-lt"/>
+        <a:ea typeface="+mn-ea"/>
+        <a:cs typeface="+mn-cs"/>
+      </a:defRPr>
+    </a:lvl5pPr>
+    <a:lvl6pPr marL="2286000" algn="l" defTabSz="914400" rtl="0" eaLnBrk="1" latinLnBrk="1" hangingPunct="1">
+      <a:defRPr sz="1200" kern="1200">
+        <a:solidFill>
+          <a:schemeClr val="tx1"/>
+        </a:solidFill>
+        <a:latin typeface="+mn-lt"/>
+        <a:ea typeface="+mn-ea"/>
+        <a:cs typeface="+mn-cs"/>
+      </a:defRPr>
+    </a:lvl6pPr>
+    <a:lvl7pPr marL="2743200" algn="l" defTabSz="914400" rtl="0" eaLnBrk="1" latinLnBrk="1" hangingPunct="1">
+      <a:defRPr sz="1200" kern="1200">
+        <a:solidFill>
+          <a:schemeClr val="tx1"/>
+        </a:solidFill>
+        <a:latin typeface="+mn-lt"/>
+        <a:ea typeface="+mn-ea"/>
+        <a:cs typeface="+mn-cs"/>
+      </a:defRPr>
+    </a:lvl7pPr>
+    <a:lvl8pPr marL="3200400" algn="l" defTabSz="914400" rtl="0" eaLnBrk="1" latinLnBrk="1" hangingPunct="1">
+      <a:defRPr sz="1200" kern="1200">
+        <a:solidFill>
+          <a:schemeClr val="tx1"/>
+        </a:solidFill>
+        <a:latin typeface="+mn-lt"/>
+        <a:ea typeface="+mn-ea"/>
+        <a:cs typeface="+mn-cs"/>
+      </a:defRPr>
+    </a:lvl8pPr>
+    <a:lvl9pPr marL="3657600" algn="l" defTabSz="914400" rtl="0" eaLnBrk="1" latinLnBrk="1" hangingPunct="1">
+      <a:defRPr sz="1200" kern="1200">
+        <a:solidFill>
+          <a:schemeClr val="tx1"/>
+        </a:solidFill>
+        <a:latin typeface="+mn-lt"/>
+        <a:ea typeface="+mn-ea"/>
+        <a:cs typeface="+mn-cs"/>
+      </a:defRPr>
+    </a:lvl9pPr>
+  </p:notesStyle>
+</p:notesMaster>
+</file>
+
+<file path=ppt/notesSlides/notesSlide1.xml><?xml version="1.0" encoding="utf-8"?>
+<p:notes xmlns:a="http://schemas.openxmlformats.org/drawingml/2006/main" xmlns:r="http://schemas.openxmlformats.org/officeDocument/2006/relationships" xmlns:p="http://schemas.openxmlformats.org/presentationml/2006/main">
+  <p:cSld>
+    <p:spTree>
+      <p:nvGrpSpPr>
+        <p:cNvPr id="1" name=""/>
+        <p:cNvGrpSpPr/>
+        <p:nvPr/>
+      </p:nvGrpSpPr>
+      <p:grpSpPr>
+        <a:xfrm>
+          <a:off x="0" y="0"/>
+          <a:ext cx="0" cy="0"/>
+          <a:chOff x="0" y="0"/>
+          <a:chExt cx="0" cy="0"/>
+        </a:xfrm>
+      </p:grpSpPr>
+      <p:sp>
+        <p:nvSpPr>
+          <p:cNvPr id="2" name="슬라이드 이미지 개체 틀 1"/>
+          <p:cNvSpPr>
+            <a:spLocks noGrp="1" noRot="1" noChangeAspect="1"/>
+          </p:cNvSpPr>
+          <p:nvPr>
+            <p:ph type="sldImg"/>
+          </p:nvPr>
+        </p:nvSpPr>
+        <p:spPr/>
+      </p:sp>
+      <p:sp>
+        <p:nvSpPr>
+          <p:cNvPr id="3" name="슬라이드 노트 개체 틀 2"/>
+          <p:cNvSpPr>
+            <a:spLocks noGrp="1"/>
+          </p:cNvSpPr>
+          <p:nvPr>
+            <p:ph type="body" idx="1"/>
+          </p:nvPr>
+        </p:nvSpPr>
+        <p:spPr/>
+        <p:txBody>
+          <a:bodyPr/>
+          <a:lstStyle/>
+          <a:p>
+            <a:r>
+              <a:rPr lang="en-US" altLang="ko-KR" dirty="0"/>
+              <a:t>1. Save</a:t>
+            </a:r>
+            <a:r>
+              <a:rPr lang="ko-KR" altLang="en-US" dirty="0"/>
+              <a:t> </a:t>
+            </a:r>
+            <a:r>
+              <a:rPr lang="en-US" altLang="ko-KR" dirty="0"/>
+              <a:t>memberA</a:t>
+            </a:r>
+            <a:endParaRPr lang="ko-KR" altLang="en-US" dirty="0"/>
+          </a:p>
+        </p:txBody>
+      </p:sp>
+      <p:sp>
+        <p:nvSpPr>
+          <p:cNvPr id="4" name="슬라이드 번호 개체 틀 3"/>
+          <p:cNvSpPr>
+            <a:spLocks noGrp="1"/>
+          </p:cNvSpPr>
+          <p:nvPr>
+            <p:ph type="sldNum" sz="quarter" idx="5"/>
+          </p:nvPr>
+        </p:nvSpPr>
+        <p:spPr/>
+        <p:txBody>
+          <a:bodyPr/>
+          <a:lstStyle/>
+          <a:p>
+            <a:fld id="{5E44F880-DA34-4F6F-BE1A-465E7F1168D1}" type="slidenum">
+              <a:rPr lang="ko-KR" altLang="en-US" smtClean="0"/>
+              <a:t>1</a:t>
+            </a:fld>
+            <a:endParaRPr lang="ko-KR" altLang="en-US" dirty="0"/>
+          </a:p>
+        </p:txBody>
+      </p:sp>
+    </p:spTree>
+    <p:extLst>
+      <p:ext uri="{BB962C8B-B14F-4D97-AF65-F5344CB8AC3E}">
+        <p14:creationId xmlns:p14="http://schemas.microsoft.com/office/powerpoint/2010/main" val="4091986201"/>
+      </p:ext>
+    </p:extLst>
+  </p:cSld>
+  <p:clrMapOvr>
+    <a:masterClrMapping/>
+  </p:clrMapOvr>
+</p:notes>
+</file>
+
+<file path=ppt/notesSlides/notesSlide2.xml><?xml version="1.0" encoding="utf-8"?>
+<p:notes xmlns:a="http://schemas.openxmlformats.org/drawingml/2006/main" xmlns:r="http://schemas.openxmlformats.org/officeDocument/2006/relationships" xmlns:p="http://schemas.openxmlformats.org/presentationml/2006/main">
+  <p:cSld>
+    <p:spTree>
+      <p:nvGrpSpPr>
+        <p:cNvPr id="1" name=""/>
+        <p:cNvGrpSpPr/>
+        <p:nvPr/>
+      </p:nvGrpSpPr>
+      <p:grpSpPr>
+        <a:xfrm>
+          <a:off x="0" y="0"/>
+          <a:ext cx="0" cy="0"/>
+          <a:chOff x="0" y="0"/>
+          <a:chExt cx="0" cy="0"/>
+        </a:xfrm>
+      </p:grpSpPr>
+      <p:sp>
+        <p:nvSpPr>
+          <p:cNvPr id="2" name="슬라이드 이미지 개체 틀 1"/>
+          <p:cNvSpPr>
+            <a:spLocks noGrp="1" noRot="1" noChangeAspect="1"/>
+          </p:cNvSpPr>
+          <p:nvPr>
+            <p:ph type="sldImg"/>
+          </p:nvPr>
+        </p:nvSpPr>
+        <p:spPr/>
+      </p:sp>
+      <p:sp>
+        <p:nvSpPr>
+          <p:cNvPr id="3" name="슬라이드 노트 개체 틀 2"/>
+          <p:cNvSpPr>
+            <a:spLocks noGrp="1"/>
+          </p:cNvSpPr>
+          <p:nvPr>
+            <p:ph type="body" idx="1"/>
+          </p:nvPr>
+        </p:nvSpPr>
+        <p:spPr/>
+        <p:txBody>
+          <a:bodyPr/>
+          <a:lstStyle/>
+          <a:p>
+            <a:r>
+              <a:rPr lang="en-US" altLang="ko-KR" dirty="0"/>
+              <a:t>Commit()</a:t>
+            </a:r>
+            <a:endParaRPr lang="ko-KR" altLang="en-US" dirty="0"/>
+          </a:p>
+        </p:txBody>
+      </p:sp>
+      <p:sp>
+        <p:nvSpPr>
+          <p:cNvPr id="4" name="슬라이드 번호 개체 틀 3"/>
+          <p:cNvSpPr>
+            <a:spLocks noGrp="1"/>
+          </p:cNvSpPr>
+          <p:nvPr>
+            <p:ph type="sldNum" sz="quarter" idx="5"/>
+          </p:nvPr>
+        </p:nvSpPr>
+        <p:spPr/>
+        <p:txBody>
+          <a:bodyPr/>
+          <a:lstStyle/>
+          <a:p>
+            <a:fld id="{5E44F880-DA34-4F6F-BE1A-465E7F1168D1}" type="slidenum">
+              <a:rPr lang="ko-KR" altLang="en-US" smtClean="0"/>
+              <a:t>2</a:t>
+            </a:fld>
+            <a:endParaRPr lang="ko-KR" altLang="en-US" dirty="0"/>
+          </a:p>
+        </p:txBody>
+      </p:sp>
+    </p:spTree>
+    <p:extLst>
+      <p:ext uri="{BB962C8B-B14F-4D97-AF65-F5344CB8AC3E}">
+        <p14:creationId xmlns:p14="http://schemas.microsoft.com/office/powerpoint/2010/main" val="901798202"/>
+      </p:ext>
+    </p:extLst>
+  </p:cSld>
+  <p:clrMapOvr>
+    <a:masterClrMapping/>
+  </p:clrMapOvr>
+</p:notes>
+</file>
+
+<file path=ppt/notesSlides/notesSlide3.xml><?xml version="1.0" encoding="utf-8"?>
+<p:notes xmlns:a="http://schemas.openxmlformats.org/drawingml/2006/main" xmlns:r="http://schemas.openxmlformats.org/officeDocument/2006/relationships" xmlns:p="http://schemas.openxmlformats.org/presentationml/2006/main">
+  <p:cSld>
+    <p:spTree>
+      <p:nvGrpSpPr>
+        <p:cNvPr id="1" name=""/>
+        <p:cNvGrpSpPr/>
+        <p:nvPr/>
+      </p:nvGrpSpPr>
+      <p:grpSpPr>
+        <a:xfrm>
+          <a:off x="0" y="0"/>
+          <a:ext cx="0" cy="0"/>
+          <a:chOff x="0" y="0"/>
+          <a:chExt cx="0" cy="0"/>
+        </a:xfrm>
+      </p:grpSpPr>
+      <p:sp>
+        <p:nvSpPr>
+          <p:cNvPr id="2" name="슬라이드 이미지 개체 틀 1"/>
+          <p:cNvSpPr>
+            <a:spLocks noGrp="1" noRot="1" noChangeAspect="1"/>
+          </p:cNvSpPr>
+          <p:nvPr>
+            <p:ph type="sldImg"/>
+          </p:nvPr>
+        </p:nvSpPr>
+        <p:spPr/>
+      </p:sp>
+      <p:sp>
+        <p:nvSpPr>
+          <p:cNvPr id="3" name="슬라이드 노트 개체 틀 2"/>
+          <p:cNvSpPr>
+            <a:spLocks noGrp="1"/>
+          </p:cNvSpPr>
+          <p:nvPr>
+            <p:ph type="body" idx="1"/>
+          </p:nvPr>
+        </p:nvSpPr>
+        <p:spPr/>
+        <p:txBody>
+          <a:bodyPr/>
+          <a:lstStyle/>
+          <a:p>
+            <a:r>
+              <a:rPr lang="en-US" altLang="ko-KR" dirty="0"/>
+              <a:t>Find(memberA)</a:t>
+            </a:r>
+            <a:endParaRPr lang="ko-KR" altLang="en-US" dirty="0"/>
+          </a:p>
+        </p:txBody>
+      </p:sp>
+      <p:sp>
+        <p:nvSpPr>
+          <p:cNvPr id="4" name="슬라이드 번호 개체 틀 3"/>
+          <p:cNvSpPr>
+            <a:spLocks noGrp="1"/>
+          </p:cNvSpPr>
+          <p:nvPr>
+            <p:ph type="sldNum" sz="quarter" idx="5"/>
+          </p:nvPr>
+        </p:nvSpPr>
+        <p:spPr/>
+        <p:txBody>
+          <a:bodyPr/>
+          <a:lstStyle/>
+          <a:p>
+            <a:fld id="{5E44F880-DA34-4F6F-BE1A-465E7F1168D1}" type="slidenum">
+              <a:rPr lang="ko-KR" altLang="en-US" smtClean="0"/>
+              <a:t>3</a:t>
+            </a:fld>
+            <a:endParaRPr lang="ko-KR" altLang="en-US" dirty="0"/>
+          </a:p>
+        </p:txBody>
+      </p:sp>
+    </p:spTree>
+    <p:extLst>
+      <p:ext uri="{BB962C8B-B14F-4D97-AF65-F5344CB8AC3E}">
+        <p14:creationId xmlns:p14="http://schemas.microsoft.com/office/powerpoint/2010/main" val="623079563"/>
+      </p:ext>
+    </p:extLst>
+  </p:cSld>
+  <p:clrMapOvr>
+    <a:masterClrMapping/>
+  </p:clrMapOvr>
+</p:notes>
+</file>
+
+<file path=ppt/notesSlides/notesSlide4.xml><?xml version="1.0" encoding="utf-8"?>
+<p:notes xmlns:a="http://schemas.openxmlformats.org/drawingml/2006/main" xmlns:r="http://schemas.openxmlformats.org/officeDocument/2006/relationships" xmlns:p="http://schemas.openxmlformats.org/presentationml/2006/main">
+  <p:cSld>
+    <p:spTree>
+      <p:nvGrpSpPr>
+        <p:cNvPr id="1" name=""/>
+        <p:cNvGrpSpPr/>
+        <p:nvPr/>
+      </p:nvGrpSpPr>
+      <p:grpSpPr>
+        <a:xfrm>
+          <a:off x="0" y="0"/>
+          <a:ext cx="0" cy="0"/>
+          <a:chOff x="0" y="0"/>
+          <a:chExt cx="0" cy="0"/>
+        </a:xfrm>
+      </p:grpSpPr>
+      <p:sp>
+        <p:nvSpPr>
+          <p:cNvPr id="2" name="슬라이드 이미지 개체 틀 1"/>
+          <p:cNvSpPr>
+            <a:spLocks noGrp="1" noRot="1" noChangeAspect="1"/>
+          </p:cNvSpPr>
+          <p:nvPr>
+            <p:ph type="sldImg"/>
+          </p:nvPr>
+        </p:nvSpPr>
+        <p:spPr/>
+      </p:sp>
+      <p:sp>
+        <p:nvSpPr>
+          <p:cNvPr id="3" name="슬라이드 노트 개체 틀 2"/>
+          <p:cNvSpPr>
+            <a:spLocks noGrp="1"/>
+          </p:cNvSpPr>
+          <p:nvPr>
+            <p:ph type="body" idx="1"/>
+          </p:nvPr>
+        </p:nvSpPr>
+        <p:spPr/>
+        <p:txBody>
+          <a:bodyPr/>
+          <a:lstStyle/>
+          <a:p>
+            <a:r>
+              <a:rPr lang="en-US" altLang="ko-KR" dirty="0" err="1"/>
+              <a:t>Session.flush</a:t>
+            </a:r>
+            <a:endParaRPr lang="ko-KR" altLang="en-US" dirty="0"/>
+          </a:p>
+        </p:txBody>
+      </p:sp>
+      <p:sp>
+        <p:nvSpPr>
+          <p:cNvPr id="4" name="슬라이드 번호 개체 틀 3"/>
+          <p:cNvSpPr>
+            <a:spLocks noGrp="1"/>
+          </p:cNvSpPr>
+          <p:nvPr>
+            <p:ph type="sldNum" sz="quarter" idx="5"/>
+          </p:nvPr>
+        </p:nvSpPr>
+        <p:spPr/>
+        <p:txBody>
+          <a:bodyPr/>
+          <a:lstStyle/>
+          <a:p>
+            <a:fld id="{5E44F880-DA34-4F6F-BE1A-465E7F1168D1}" type="slidenum">
+              <a:rPr lang="ko-KR" altLang="en-US" smtClean="0"/>
+              <a:t>4</a:t>
+            </a:fld>
+            <a:endParaRPr lang="ko-KR" altLang="en-US" dirty="0"/>
+          </a:p>
+        </p:txBody>
+      </p:sp>
+    </p:spTree>
+    <p:extLst>
+      <p:ext uri="{BB962C8B-B14F-4D97-AF65-F5344CB8AC3E}">
+        <p14:creationId xmlns:p14="http://schemas.microsoft.com/office/powerpoint/2010/main" val="663336474"/>
+      </p:ext>
+    </p:extLst>
+  </p:cSld>
+  <p:clrMapOvr>
+    <a:masterClrMapping/>
+  </p:clrMapOvr>
+</p:notes>
 </file>
 
 <file path=ppt/slideLayouts/slideLayout1.xml><?xml version="1.0" encoding="utf-8"?>
@@ -5521,6 +6240,2550 @@
 </p:sld>
 </file>
 
+<file path=ppt/slides/slide3.xml><?xml version="1.0" encoding="utf-8"?>
+<p:sld xmlns:a="http://schemas.openxmlformats.org/drawingml/2006/main" xmlns:r="http://schemas.openxmlformats.org/officeDocument/2006/relationships" xmlns:p="http://schemas.openxmlformats.org/presentationml/2006/main">
+  <p:cSld>
+    <p:spTree>
+      <p:nvGrpSpPr>
+        <p:cNvPr id="1" name=""/>
+        <p:cNvGrpSpPr/>
+        <p:nvPr/>
+      </p:nvGrpSpPr>
+      <p:grpSpPr>
+        <a:xfrm>
+          <a:off x="0" y="0"/>
+          <a:ext cx="0" cy="0"/>
+          <a:chOff x="0" y="0"/>
+          <a:chExt cx="0" cy="0"/>
+        </a:xfrm>
+      </p:grpSpPr>
+      <p:sp>
+        <p:nvSpPr>
+          <p:cNvPr id="10" name="직사각형 9">
+            <a:extLst>
+              <a:ext uri="{FF2B5EF4-FFF2-40B4-BE49-F238E27FC236}">
+                <a16:creationId xmlns:a16="http://schemas.microsoft.com/office/drawing/2014/main" id="{29F3B81B-3D40-440F-B7AC-C3B5CFB0A3F5}"/>
+              </a:ext>
+            </a:extLst>
+          </p:cNvPr>
+          <p:cNvSpPr/>
+          <p:nvPr/>
+        </p:nvSpPr>
+        <p:spPr>
+          <a:xfrm>
+            <a:off x="3128211" y="535237"/>
+            <a:ext cx="6650381" cy="5935572"/>
+          </a:xfrm>
+          <a:prstGeom prst="rect">
+            <a:avLst/>
+          </a:prstGeom>
+          <a:solidFill>
+            <a:schemeClr val="bg1">
+              <a:lumMod val="85000"/>
+            </a:schemeClr>
+          </a:solidFill>
+          <a:ln>
+            <a:noFill/>
+          </a:ln>
+        </p:spPr>
+        <p:style>
+          <a:lnRef idx="2">
+            <a:schemeClr val="accent1">
+              <a:shade val="50000"/>
+            </a:schemeClr>
+          </a:lnRef>
+          <a:fillRef idx="1">
+            <a:schemeClr val="accent1"/>
+          </a:fillRef>
+          <a:effectRef idx="0">
+            <a:schemeClr val="accent1"/>
+          </a:effectRef>
+          <a:fontRef idx="minor">
+            <a:schemeClr val="lt1"/>
+          </a:fontRef>
+        </p:style>
+        <p:txBody>
+          <a:bodyPr rtlCol="0" anchor="ctr"/>
+          <a:lstStyle/>
+          <a:p>
+            <a:pPr algn="ctr"/>
+            <a:endParaRPr lang="ko-KR" altLang="en-US" dirty="0">
+              <a:latin typeface="나눔스퀘어 ExtraBold" panose="020B0600000101010101" pitchFamily="50" charset="-127"/>
+              <a:ea typeface="나눔스퀘어 ExtraBold" panose="020B0600000101010101" pitchFamily="50" charset="-127"/>
+            </a:endParaRPr>
+          </a:p>
+        </p:txBody>
+      </p:sp>
+      <p:cxnSp>
+        <p:nvCxnSpPr>
+          <p:cNvPr id="5" name="직선 화살표 연결선 4">
+            <a:extLst>
+              <a:ext uri="{FF2B5EF4-FFF2-40B4-BE49-F238E27FC236}">
+                <a16:creationId xmlns:a16="http://schemas.microsoft.com/office/drawing/2014/main" id="{9E32C43A-A809-4797-9A05-9C4C775DB3B2}"/>
+              </a:ext>
+            </a:extLst>
+          </p:cNvPr>
+          <p:cNvCxnSpPr>
+            <a:cxnSpLocks/>
+            <a:stCxn id="6" idx="2"/>
+            <a:endCxn id="13" idx="1"/>
+          </p:cNvCxnSpPr>
+          <p:nvPr/>
+        </p:nvCxnSpPr>
+        <p:spPr>
+          <a:xfrm>
+            <a:off x="2411498" y="3733100"/>
+            <a:ext cx="2637440" cy="1691628"/>
+          </a:xfrm>
+          <a:prstGeom prst="straightConnector1">
+            <a:avLst/>
+          </a:prstGeom>
+          <a:ln w="38100">
+            <a:solidFill>
+              <a:schemeClr val="bg1">
+                <a:lumMod val="50000"/>
+              </a:schemeClr>
+            </a:solidFill>
+            <a:tailEnd type="triangle"/>
+          </a:ln>
+        </p:spPr>
+        <p:style>
+          <a:lnRef idx="1">
+            <a:schemeClr val="accent1"/>
+          </a:lnRef>
+          <a:fillRef idx="0">
+            <a:schemeClr val="accent1"/>
+          </a:fillRef>
+          <a:effectRef idx="0">
+            <a:schemeClr val="accent1"/>
+          </a:effectRef>
+          <a:fontRef idx="minor">
+            <a:schemeClr val="tx1"/>
+          </a:fontRef>
+        </p:style>
+      </p:cxnSp>
+      <p:sp>
+        <p:nvSpPr>
+          <p:cNvPr id="6" name="TextBox 5">
+            <a:extLst>
+              <a:ext uri="{FF2B5EF4-FFF2-40B4-BE49-F238E27FC236}">
+                <a16:creationId xmlns:a16="http://schemas.microsoft.com/office/drawing/2014/main" id="{608FDBEF-27D8-4593-B29B-D6713BAB1BF8}"/>
+              </a:ext>
+            </a:extLst>
+          </p:cNvPr>
+          <p:cNvSpPr txBox="1"/>
+          <p:nvPr/>
+        </p:nvSpPr>
+        <p:spPr>
+          <a:xfrm>
+            <a:off x="87442" y="3363768"/>
+            <a:ext cx="4648112" cy="369332"/>
+          </a:xfrm>
+          <a:prstGeom prst="rect">
+            <a:avLst/>
+          </a:prstGeom>
+          <a:noFill/>
+        </p:spPr>
+        <p:txBody>
+          <a:bodyPr wrap="square" rtlCol="0">
+            <a:spAutoFit/>
+          </a:bodyPr>
+          <a:lstStyle/>
+          <a:p>
+            <a:pPr algn="ctr"/>
+            <a:r>
+              <a:rPr lang="en-US" altLang="ko-KR" dirty="0">
+                <a:latin typeface="나눔스퀘어 ExtraBold" panose="020B0600000101010101" pitchFamily="50" charset="-127"/>
+                <a:ea typeface="나눔스퀘어 ExtraBold" panose="020B0600000101010101" pitchFamily="50" charset="-127"/>
+              </a:rPr>
+              <a:t>1. Find (Member.class, memberA);</a:t>
+            </a:r>
+            <a:endParaRPr lang="ko-KR" altLang="en-US" dirty="0">
+              <a:latin typeface="나눔스퀘어 ExtraBold" panose="020B0600000101010101" pitchFamily="50" charset="-127"/>
+              <a:ea typeface="나눔스퀘어 ExtraBold" panose="020B0600000101010101" pitchFamily="50" charset="-127"/>
+            </a:endParaRPr>
+          </a:p>
+        </p:txBody>
+      </p:sp>
+      <p:sp>
+        <p:nvSpPr>
+          <p:cNvPr id="7" name="타원 6">
+            <a:extLst>
+              <a:ext uri="{FF2B5EF4-FFF2-40B4-BE49-F238E27FC236}">
+                <a16:creationId xmlns:a16="http://schemas.microsoft.com/office/drawing/2014/main" id="{24245A24-944A-44E9-9940-AC5C8C90F25C}"/>
+              </a:ext>
+            </a:extLst>
+          </p:cNvPr>
+          <p:cNvSpPr/>
+          <p:nvPr/>
+        </p:nvSpPr>
+        <p:spPr>
+          <a:xfrm>
+            <a:off x="494299" y="4955391"/>
+            <a:ext cx="1878227" cy="938673"/>
+          </a:xfrm>
+          <a:prstGeom prst="ellipse">
+            <a:avLst/>
+          </a:prstGeom>
+          <a:noFill/>
+          <a:ln w="38100">
+            <a:solidFill>
+              <a:schemeClr val="tx1"/>
+            </a:solidFill>
+          </a:ln>
+        </p:spPr>
+        <p:style>
+          <a:lnRef idx="2">
+            <a:schemeClr val="accent1">
+              <a:shade val="50000"/>
+            </a:schemeClr>
+          </a:lnRef>
+          <a:fillRef idx="1">
+            <a:schemeClr val="accent1"/>
+          </a:fillRef>
+          <a:effectRef idx="0">
+            <a:schemeClr val="accent1"/>
+          </a:effectRef>
+          <a:fontRef idx="minor">
+            <a:schemeClr val="lt1"/>
+          </a:fontRef>
+        </p:style>
+        <p:txBody>
+          <a:bodyPr rtlCol="0" anchor="ctr"/>
+          <a:lstStyle/>
+          <a:p>
+            <a:pPr algn="ctr"/>
+            <a:r>
+              <a:rPr lang="en-US" altLang="ko-KR" dirty="0">
+                <a:solidFill>
+                  <a:schemeClr val="tx1"/>
+                </a:solidFill>
+                <a:latin typeface="나눔스퀘어 ExtraBold" panose="020B0600000101010101" pitchFamily="50" charset="-127"/>
+                <a:ea typeface="나눔스퀘어 ExtraBold" panose="020B0600000101010101" pitchFamily="50" charset="-127"/>
+              </a:rPr>
+              <a:t>memberA</a:t>
+            </a:r>
+            <a:endParaRPr lang="ko-KR" altLang="en-US" dirty="0">
+              <a:solidFill>
+                <a:schemeClr val="tx1"/>
+              </a:solidFill>
+              <a:latin typeface="나눔스퀘어 ExtraBold" panose="020B0600000101010101" pitchFamily="50" charset="-127"/>
+              <a:ea typeface="나눔스퀘어 ExtraBold" panose="020B0600000101010101" pitchFamily="50" charset="-127"/>
+            </a:endParaRPr>
+          </a:p>
+        </p:txBody>
+      </p:sp>
+      <p:sp>
+        <p:nvSpPr>
+          <p:cNvPr id="9" name="순서도: 자기 디스크 8">
+            <a:extLst>
+              <a:ext uri="{FF2B5EF4-FFF2-40B4-BE49-F238E27FC236}">
+                <a16:creationId xmlns:a16="http://schemas.microsoft.com/office/drawing/2014/main" id="{DCAE435D-E946-4C5F-B1EC-87F2FA1A1295}"/>
+              </a:ext>
+            </a:extLst>
+          </p:cNvPr>
+          <p:cNvSpPr/>
+          <p:nvPr/>
+        </p:nvSpPr>
+        <p:spPr>
+          <a:xfrm>
+            <a:off x="5920330" y="2197232"/>
+            <a:ext cx="2662178" cy="1318283"/>
+          </a:xfrm>
+          <a:prstGeom prst="flowChartMagneticDisk">
+            <a:avLst/>
+          </a:prstGeom>
+          <a:noFill/>
+          <a:ln w="28575">
+            <a:solidFill>
+              <a:schemeClr val="tx1"/>
+            </a:solidFill>
+          </a:ln>
+        </p:spPr>
+        <p:style>
+          <a:lnRef idx="2">
+            <a:schemeClr val="accent1">
+              <a:shade val="50000"/>
+            </a:schemeClr>
+          </a:lnRef>
+          <a:fillRef idx="1">
+            <a:schemeClr val="accent1"/>
+          </a:fillRef>
+          <a:effectRef idx="0">
+            <a:schemeClr val="accent1"/>
+          </a:effectRef>
+          <a:fontRef idx="minor">
+            <a:schemeClr val="lt1"/>
+          </a:fontRef>
+        </p:style>
+        <p:txBody>
+          <a:bodyPr rtlCol="0" anchor="ctr"/>
+          <a:lstStyle/>
+          <a:p>
+            <a:pPr algn="ctr"/>
+            <a:r>
+              <a:rPr lang="ko-KR" altLang="en-US" dirty="0">
+                <a:solidFill>
+                  <a:schemeClr val="tx1"/>
+                </a:solidFill>
+                <a:latin typeface="나눔스퀘어 ExtraBold" panose="020B0600000101010101" pitchFamily="50" charset="-127"/>
+                <a:ea typeface="나눔스퀘어 ExtraBold" panose="020B0600000101010101" pitchFamily="50" charset="-127"/>
+              </a:rPr>
+              <a:t>쓰기 지연 </a:t>
+            </a:r>
+            <a:r>
+              <a:rPr lang="en-US" altLang="ko-KR" dirty="0">
+                <a:solidFill>
+                  <a:schemeClr val="tx1"/>
+                </a:solidFill>
+                <a:latin typeface="나눔스퀘어 ExtraBold" panose="020B0600000101010101" pitchFamily="50" charset="-127"/>
+                <a:ea typeface="나눔스퀘어 ExtraBold" panose="020B0600000101010101" pitchFamily="50" charset="-127"/>
+              </a:rPr>
+              <a:t>SQL </a:t>
+            </a:r>
+            <a:r>
+              <a:rPr lang="ko-KR" altLang="en-US" dirty="0">
+                <a:solidFill>
+                  <a:schemeClr val="tx1"/>
+                </a:solidFill>
+                <a:latin typeface="나눔스퀘어 ExtraBold" panose="020B0600000101010101" pitchFamily="50" charset="-127"/>
+                <a:ea typeface="나눔스퀘어 ExtraBold" panose="020B0600000101010101" pitchFamily="50" charset="-127"/>
+              </a:rPr>
+              <a:t>저장소</a:t>
+            </a:r>
+          </a:p>
+        </p:txBody>
+      </p:sp>
+      <p:sp>
+        <p:nvSpPr>
+          <p:cNvPr id="11" name="TextBox 10">
+            <a:extLst>
+              <a:ext uri="{FF2B5EF4-FFF2-40B4-BE49-F238E27FC236}">
+                <a16:creationId xmlns:a16="http://schemas.microsoft.com/office/drawing/2014/main" id="{A7D4FFDB-8112-42C6-825B-A595B2A658F3}"/>
+              </a:ext>
+            </a:extLst>
+          </p:cNvPr>
+          <p:cNvSpPr txBox="1"/>
+          <p:nvPr/>
+        </p:nvSpPr>
+        <p:spPr>
+          <a:xfrm>
+            <a:off x="5355038" y="672992"/>
+            <a:ext cx="2482870" cy="830997"/>
+          </a:xfrm>
+          <a:prstGeom prst="rect">
+            <a:avLst/>
+          </a:prstGeom>
+          <a:noFill/>
+        </p:spPr>
+        <p:txBody>
+          <a:bodyPr wrap="square" rtlCol="0">
+            <a:spAutoFit/>
+          </a:bodyPr>
+          <a:lstStyle/>
+          <a:p>
+            <a:pPr algn="ctr"/>
+            <a:r>
+              <a:rPr lang="ko-KR" altLang="en-US" sz="2400" dirty="0">
+                <a:latin typeface="나눔스퀘어 ExtraBold" panose="020B0600000101010101" pitchFamily="50" charset="-127"/>
+                <a:ea typeface="나눔스퀘어 ExtraBold" panose="020B0600000101010101" pitchFamily="50" charset="-127"/>
+              </a:rPr>
+              <a:t>영속 컨텍스트</a:t>
+            </a:r>
+            <a:r>
+              <a:rPr lang="en-US" altLang="ko-KR" sz="2400" dirty="0">
+                <a:latin typeface="나눔스퀘어 ExtraBold" panose="020B0600000101010101" pitchFamily="50" charset="-127"/>
+                <a:ea typeface="나눔스퀘어 ExtraBold" panose="020B0600000101010101" pitchFamily="50" charset="-127"/>
+              </a:rPr>
+              <a:t>(Entity</a:t>
+            </a:r>
+            <a:r>
+              <a:rPr lang="ko-KR" altLang="en-US" sz="2400" dirty="0">
+                <a:latin typeface="나눔스퀘어 ExtraBold" panose="020B0600000101010101" pitchFamily="50" charset="-127"/>
+                <a:ea typeface="나눔스퀘어 ExtraBold" panose="020B0600000101010101" pitchFamily="50" charset="-127"/>
+              </a:rPr>
+              <a:t> </a:t>
+            </a:r>
+            <a:r>
+              <a:rPr lang="en-US" altLang="ko-KR" sz="2400" dirty="0">
+                <a:latin typeface="나눔스퀘어 ExtraBold" panose="020B0600000101010101" pitchFamily="50" charset="-127"/>
+                <a:ea typeface="나눔스퀘어 ExtraBold" panose="020B0600000101010101" pitchFamily="50" charset="-127"/>
+              </a:rPr>
+              <a:t>Manger)</a:t>
+            </a:r>
+            <a:endParaRPr lang="ko-KR" altLang="en-US" sz="2400" dirty="0">
+              <a:latin typeface="나눔스퀘어 ExtraBold" panose="020B0600000101010101" pitchFamily="50" charset="-127"/>
+              <a:ea typeface="나눔스퀘어 ExtraBold" panose="020B0600000101010101" pitchFamily="50" charset="-127"/>
+            </a:endParaRPr>
+          </a:p>
+        </p:txBody>
+      </p:sp>
+      <p:graphicFrame>
+        <p:nvGraphicFramePr>
+          <p:cNvPr id="13" name="표 12">
+            <a:extLst>
+              <a:ext uri="{FF2B5EF4-FFF2-40B4-BE49-F238E27FC236}">
+                <a16:creationId xmlns:a16="http://schemas.microsoft.com/office/drawing/2014/main" id="{0B6618A5-AD04-400A-9DAA-0368F98F8B87}"/>
+              </a:ext>
+            </a:extLst>
+          </p:cNvPr>
+          <p:cNvGraphicFramePr>
+            <a:graphicFrameLocks noGrp="1"/>
+          </p:cNvGraphicFramePr>
+          <p:nvPr>
+            <p:extLst/>
+          </p:nvPr>
+        </p:nvGraphicFramePr>
+        <p:xfrm>
+          <a:off x="5048938" y="5053888"/>
+          <a:ext cx="3684118" cy="741680"/>
+        </p:xfrm>
+        <a:graphic>
+          <a:graphicData uri="http://schemas.openxmlformats.org/drawingml/2006/table">
+            <a:tbl>
+              <a:tblPr firstRow="1" bandRow="1">
+                <a:tableStyleId>{2D5ABB26-0587-4C30-8999-92F81FD0307C}</a:tableStyleId>
+              </a:tblPr>
+              <a:tblGrid>
+                <a:gridCol w="1842059">
+                  <a:extLst>
+                    <a:ext uri="{9D8B030D-6E8A-4147-A177-3AD203B41FA5}">
+                      <a16:colId xmlns:a16="http://schemas.microsoft.com/office/drawing/2014/main" val="3288214171"/>
+                    </a:ext>
+                  </a:extLst>
+                </a:gridCol>
+                <a:gridCol w="1842059">
+                  <a:extLst>
+                    <a:ext uri="{9D8B030D-6E8A-4147-A177-3AD203B41FA5}">
+                      <a16:colId xmlns:a16="http://schemas.microsoft.com/office/drawing/2014/main" val="3162273400"/>
+                    </a:ext>
+                  </a:extLst>
+                </a:gridCol>
+              </a:tblGrid>
+              <a:tr h="370840">
+                <a:tc>
+                  <a:txBody>
+                    <a:bodyPr/>
+                    <a:lstStyle/>
+                    <a:p>
+                      <a:pPr latinLnBrk="1"/>
+                      <a:r>
+                        <a:rPr lang="en-US" altLang="ko-KR" dirty="0"/>
+                        <a:t>@Id</a:t>
+                      </a:r>
+                      <a:endParaRPr lang="ko-KR" altLang="en-US" dirty="0"/>
+                    </a:p>
+                  </a:txBody>
+                  <a:tcPr>
+                    <a:lnL w="12700" cap="flat" cmpd="sng" algn="ctr">
+                      <a:solidFill>
+                        <a:schemeClr val="tx1"/>
+                      </a:solidFill>
+                      <a:prstDash val="sysDash"/>
+                      <a:round/>
+                      <a:headEnd type="none" w="med" len="med"/>
+                      <a:tailEnd type="none" w="med" len="med"/>
+                    </a:lnL>
+                    <a:lnR w="12700" cap="flat" cmpd="sng" algn="ctr">
+                      <a:solidFill>
+                        <a:schemeClr val="tx1"/>
+                      </a:solidFill>
+                      <a:prstDash val="sysDash"/>
+                      <a:round/>
+                      <a:headEnd type="none" w="med" len="med"/>
+                      <a:tailEnd type="none" w="med" len="med"/>
+                    </a:lnR>
+                    <a:lnT w="12700" cap="flat" cmpd="sng" algn="ctr">
+                      <a:solidFill>
+                        <a:schemeClr val="tx1"/>
+                      </a:solidFill>
+                      <a:prstDash val="sysDash"/>
+                      <a:round/>
+                      <a:headEnd type="none" w="med" len="med"/>
+                      <a:tailEnd type="none" w="med" len="med"/>
+                    </a:lnT>
+                    <a:lnB w="12700" cap="flat" cmpd="sng" algn="ctr">
+                      <a:solidFill>
+                        <a:schemeClr val="tx1"/>
+                      </a:solidFill>
+                      <a:prstDash val="sysDash"/>
+                      <a:round/>
+                      <a:headEnd type="none" w="med" len="med"/>
+                      <a:tailEnd type="none" w="med" len="med"/>
+                    </a:lnB>
+                    <a:lnTlToBr w="12700" cmpd="sng">
+                      <a:noFill/>
+                      <a:prstDash val="solid"/>
+                    </a:lnTlToBr>
+                    <a:lnBlToTr w="12700" cmpd="sng">
+                      <a:noFill/>
+                      <a:prstDash val="solid"/>
+                    </a:lnBlToTr>
+                  </a:tcPr>
+                </a:tc>
+                <a:tc>
+                  <a:txBody>
+                    <a:bodyPr/>
+                    <a:lstStyle/>
+                    <a:p>
+                      <a:pPr latinLnBrk="1"/>
+                      <a:r>
+                        <a:rPr lang="en-US" altLang="ko-KR" dirty="0"/>
+                        <a:t>Entity</a:t>
+                      </a:r>
+                      <a:endParaRPr lang="ko-KR" altLang="en-US" dirty="0"/>
+                    </a:p>
+                  </a:txBody>
+                  <a:tcPr>
+                    <a:lnL w="12700" cap="flat" cmpd="sng" algn="ctr">
+                      <a:solidFill>
+                        <a:schemeClr val="tx1"/>
+                      </a:solidFill>
+                      <a:prstDash val="sysDash"/>
+                      <a:round/>
+                      <a:headEnd type="none" w="med" len="med"/>
+                      <a:tailEnd type="none" w="med" len="med"/>
+                    </a:lnL>
+                    <a:lnR w="12700" cap="flat" cmpd="sng" algn="ctr">
+                      <a:solidFill>
+                        <a:schemeClr val="tx1"/>
+                      </a:solidFill>
+                      <a:prstDash val="sysDash"/>
+                      <a:round/>
+                      <a:headEnd type="none" w="med" len="med"/>
+                      <a:tailEnd type="none" w="med" len="med"/>
+                    </a:lnR>
+                    <a:lnT w="12700" cap="flat" cmpd="sng" algn="ctr">
+                      <a:solidFill>
+                        <a:schemeClr val="tx1"/>
+                      </a:solidFill>
+                      <a:prstDash val="sysDash"/>
+                      <a:round/>
+                      <a:headEnd type="none" w="med" len="med"/>
+                      <a:tailEnd type="none" w="med" len="med"/>
+                    </a:lnT>
+                    <a:lnB w="12700" cap="flat" cmpd="sng" algn="ctr">
+                      <a:solidFill>
+                        <a:schemeClr val="tx1"/>
+                      </a:solidFill>
+                      <a:prstDash val="sysDash"/>
+                      <a:round/>
+                      <a:headEnd type="none" w="med" len="med"/>
+                      <a:tailEnd type="none" w="med" len="med"/>
+                    </a:lnB>
+                    <a:lnTlToBr w="12700" cmpd="sng">
+                      <a:noFill/>
+                      <a:prstDash val="solid"/>
+                    </a:lnTlToBr>
+                    <a:lnBlToTr w="12700" cmpd="sng">
+                      <a:noFill/>
+                      <a:prstDash val="solid"/>
+                    </a:lnBlToTr>
+                  </a:tcPr>
+                </a:tc>
+                <a:extLst>
+                  <a:ext uri="{0D108BD9-81ED-4DB2-BD59-A6C34878D82A}">
+                    <a16:rowId xmlns:a16="http://schemas.microsoft.com/office/drawing/2014/main" val="457591107"/>
+                  </a:ext>
+                </a:extLst>
+              </a:tr>
+              <a:tr h="370840">
+                <a:tc>
+                  <a:txBody>
+                    <a:bodyPr/>
+                    <a:lstStyle/>
+                    <a:p>
+                      <a:pPr latinLnBrk="1"/>
+                      <a:r>
+                        <a:rPr lang="en-US" altLang="ko-KR" dirty="0"/>
+                        <a:t>1</a:t>
+                      </a:r>
+                      <a:endParaRPr lang="ko-KR" altLang="en-US" dirty="0"/>
+                    </a:p>
+                  </a:txBody>
+                  <a:tcPr>
+                    <a:lnL w="12700" cap="flat" cmpd="sng" algn="ctr">
+                      <a:solidFill>
+                        <a:schemeClr val="tx1"/>
+                      </a:solidFill>
+                      <a:prstDash val="sysDash"/>
+                      <a:round/>
+                      <a:headEnd type="none" w="med" len="med"/>
+                      <a:tailEnd type="none" w="med" len="med"/>
+                    </a:lnL>
+                    <a:lnR w="12700" cap="flat" cmpd="sng" algn="ctr">
+                      <a:solidFill>
+                        <a:schemeClr val="tx1"/>
+                      </a:solidFill>
+                      <a:prstDash val="sysDash"/>
+                      <a:round/>
+                      <a:headEnd type="none" w="med" len="med"/>
+                      <a:tailEnd type="none" w="med" len="med"/>
+                    </a:lnR>
+                    <a:lnT w="12700" cap="flat" cmpd="sng" algn="ctr">
+                      <a:solidFill>
+                        <a:schemeClr val="tx1"/>
+                      </a:solidFill>
+                      <a:prstDash val="sysDash"/>
+                      <a:round/>
+                      <a:headEnd type="none" w="med" len="med"/>
+                      <a:tailEnd type="none" w="med" len="med"/>
+                    </a:lnT>
+                    <a:lnB w="12700" cap="flat" cmpd="sng" algn="ctr">
+                      <a:solidFill>
+                        <a:schemeClr val="tx1"/>
+                      </a:solidFill>
+                      <a:prstDash val="sysDash"/>
+                      <a:round/>
+                      <a:headEnd type="none" w="med" len="med"/>
+                      <a:tailEnd type="none" w="med" len="med"/>
+                    </a:lnB>
+                    <a:lnTlToBr w="12700" cmpd="sng">
+                      <a:noFill/>
+                      <a:prstDash val="solid"/>
+                    </a:lnTlToBr>
+                    <a:lnBlToTr w="12700" cmpd="sng">
+                      <a:noFill/>
+                      <a:prstDash val="solid"/>
+                    </a:lnBlToTr>
+                  </a:tcPr>
+                </a:tc>
+                <a:tc>
+                  <a:txBody>
+                    <a:bodyPr/>
+                    <a:lstStyle/>
+                    <a:p>
+                      <a:pPr latinLnBrk="1"/>
+                      <a:r>
+                        <a:rPr lang="en-US" altLang="ko-KR" dirty="0"/>
+                        <a:t>member</a:t>
+                      </a:r>
+                      <a:endParaRPr lang="ko-KR" altLang="en-US" dirty="0"/>
+                    </a:p>
+                  </a:txBody>
+                  <a:tcPr>
+                    <a:lnL w="12700" cap="flat" cmpd="sng" algn="ctr">
+                      <a:solidFill>
+                        <a:schemeClr val="tx1"/>
+                      </a:solidFill>
+                      <a:prstDash val="sysDash"/>
+                      <a:round/>
+                      <a:headEnd type="none" w="med" len="med"/>
+                      <a:tailEnd type="none" w="med" len="med"/>
+                    </a:lnL>
+                    <a:lnR w="12700" cap="flat" cmpd="sng" algn="ctr">
+                      <a:solidFill>
+                        <a:schemeClr val="tx1"/>
+                      </a:solidFill>
+                      <a:prstDash val="sysDash"/>
+                      <a:round/>
+                      <a:headEnd type="none" w="med" len="med"/>
+                      <a:tailEnd type="none" w="med" len="med"/>
+                    </a:lnR>
+                    <a:lnT w="12700" cap="flat" cmpd="sng" algn="ctr">
+                      <a:solidFill>
+                        <a:schemeClr val="tx1"/>
+                      </a:solidFill>
+                      <a:prstDash val="sysDash"/>
+                      <a:round/>
+                      <a:headEnd type="none" w="med" len="med"/>
+                      <a:tailEnd type="none" w="med" len="med"/>
+                    </a:lnT>
+                    <a:lnB w="12700" cap="flat" cmpd="sng" algn="ctr">
+                      <a:solidFill>
+                        <a:schemeClr val="tx1"/>
+                      </a:solidFill>
+                      <a:prstDash val="sysDash"/>
+                      <a:round/>
+                      <a:headEnd type="none" w="med" len="med"/>
+                      <a:tailEnd type="none" w="med" len="med"/>
+                    </a:lnB>
+                    <a:lnTlToBr w="12700" cmpd="sng">
+                      <a:noFill/>
+                      <a:prstDash val="solid"/>
+                    </a:lnTlToBr>
+                    <a:lnBlToTr w="12700" cmpd="sng">
+                      <a:noFill/>
+                      <a:prstDash val="solid"/>
+                    </a:lnBlToTr>
+                  </a:tcPr>
+                </a:tc>
+                <a:extLst>
+                  <a:ext uri="{0D108BD9-81ED-4DB2-BD59-A6C34878D82A}">
+                    <a16:rowId xmlns:a16="http://schemas.microsoft.com/office/drawing/2014/main" val="850536928"/>
+                  </a:ext>
+                </a:extLst>
+              </a:tr>
+            </a:tbl>
+          </a:graphicData>
+        </a:graphic>
+      </p:graphicFrame>
+      <p:sp>
+        <p:nvSpPr>
+          <p:cNvPr id="15" name="TextBox 14">
+            <a:extLst>
+              <a:ext uri="{FF2B5EF4-FFF2-40B4-BE49-F238E27FC236}">
+                <a16:creationId xmlns:a16="http://schemas.microsoft.com/office/drawing/2014/main" id="{7A34BB31-C823-4028-8995-D0E9951F62E9}"/>
+              </a:ext>
+            </a:extLst>
+          </p:cNvPr>
+          <p:cNvSpPr txBox="1"/>
+          <p:nvPr/>
+        </p:nvSpPr>
+        <p:spPr>
+          <a:xfrm>
+            <a:off x="5942542" y="4567368"/>
+            <a:ext cx="2022761" cy="369332"/>
+          </a:xfrm>
+          <a:prstGeom prst="rect">
+            <a:avLst/>
+          </a:prstGeom>
+          <a:noFill/>
+        </p:spPr>
+        <p:txBody>
+          <a:bodyPr wrap="square" rtlCol="0">
+            <a:spAutoFit/>
+          </a:bodyPr>
+          <a:lstStyle/>
+          <a:p>
+            <a:pPr algn="ctr"/>
+            <a:r>
+              <a:rPr lang="en-US" altLang="ko-KR" dirty="0">
+                <a:latin typeface="나눔스퀘어 ExtraBold" panose="020B0600000101010101" pitchFamily="50" charset="-127"/>
+                <a:ea typeface="나눔스퀘어 ExtraBold" panose="020B0600000101010101" pitchFamily="50" charset="-127"/>
+              </a:rPr>
+              <a:t>1</a:t>
+            </a:r>
+            <a:r>
+              <a:rPr lang="ko-KR" altLang="en-US" dirty="0">
+                <a:latin typeface="나눔스퀘어 ExtraBold" panose="020B0600000101010101" pitchFamily="50" charset="-127"/>
+                <a:ea typeface="나눔스퀘어 ExtraBold" panose="020B0600000101010101" pitchFamily="50" charset="-127"/>
+              </a:rPr>
+              <a:t>차 캐시</a:t>
+            </a:r>
+          </a:p>
+        </p:txBody>
+      </p:sp>
+      <p:cxnSp>
+        <p:nvCxnSpPr>
+          <p:cNvPr id="16" name="직선 화살표 연결선 15">
+            <a:extLst>
+              <a:ext uri="{FF2B5EF4-FFF2-40B4-BE49-F238E27FC236}">
+                <a16:creationId xmlns:a16="http://schemas.microsoft.com/office/drawing/2014/main" id="{D01EF078-ED72-4597-84E2-B5C023A8DEC0}"/>
+              </a:ext>
+            </a:extLst>
+          </p:cNvPr>
+          <p:cNvCxnSpPr>
+            <a:cxnSpLocks/>
+            <a:stCxn id="10" idx="3"/>
+          </p:cNvCxnSpPr>
+          <p:nvPr/>
+        </p:nvCxnSpPr>
+        <p:spPr>
+          <a:xfrm>
+            <a:off x="9778592" y="3503023"/>
+            <a:ext cx="968014" cy="2177"/>
+          </a:xfrm>
+          <a:prstGeom prst="straightConnector1">
+            <a:avLst/>
+          </a:prstGeom>
+          <a:ln w="38100">
+            <a:solidFill>
+              <a:schemeClr val="bg1">
+                <a:lumMod val="50000"/>
+              </a:schemeClr>
+            </a:solidFill>
+            <a:tailEnd type="triangle"/>
+          </a:ln>
+        </p:spPr>
+        <p:style>
+          <a:lnRef idx="1">
+            <a:schemeClr val="accent1"/>
+          </a:lnRef>
+          <a:fillRef idx="0">
+            <a:schemeClr val="accent1"/>
+          </a:fillRef>
+          <a:effectRef idx="0">
+            <a:schemeClr val="accent1"/>
+          </a:effectRef>
+          <a:fontRef idx="minor">
+            <a:schemeClr val="tx1"/>
+          </a:fontRef>
+        </p:style>
+      </p:cxnSp>
+      <p:sp>
+        <p:nvSpPr>
+          <p:cNvPr id="18" name="순서도: 자기 디스크 17">
+            <a:extLst>
+              <a:ext uri="{FF2B5EF4-FFF2-40B4-BE49-F238E27FC236}">
+                <a16:creationId xmlns:a16="http://schemas.microsoft.com/office/drawing/2014/main" id="{3F9BA157-703E-442E-8BC3-60313DC1949B}"/>
+              </a:ext>
+            </a:extLst>
+          </p:cNvPr>
+          <p:cNvSpPr/>
+          <p:nvPr/>
+        </p:nvSpPr>
+        <p:spPr>
+          <a:xfrm>
+            <a:off x="10756873" y="2983275"/>
+            <a:ext cx="978281" cy="1064480"/>
+          </a:xfrm>
+          <a:prstGeom prst="flowChartMagneticDisk">
+            <a:avLst/>
+          </a:prstGeom>
+          <a:noFill/>
+          <a:ln w="28575">
+            <a:solidFill>
+              <a:schemeClr val="tx1"/>
+            </a:solidFill>
+          </a:ln>
+        </p:spPr>
+        <p:style>
+          <a:lnRef idx="2">
+            <a:schemeClr val="accent1">
+              <a:shade val="50000"/>
+            </a:schemeClr>
+          </a:lnRef>
+          <a:fillRef idx="1">
+            <a:schemeClr val="accent1"/>
+          </a:fillRef>
+          <a:effectRef idx="0">
+            <a:schemeClr val="accent1"/>
+          </a:effectRef>
+          <a:fontRef idx="minor">
+            <a:schemeClr val="lt1"/>
+          </a:fontRef>
+        </p:style>
+        <p:txBody>
+          <a:bodyPr rtlCol="0" anchor="ctr"/>
+          <a:lstStyle/>
+          <a:p>
+            <a:pPr algn="ctr"/>
+            <a:r>
+              <a:rPr lang="en-US" altLang="ko-KR" dirty="0">
+                <a:solidFill>
+                  <a:schemeClr val="tx1"/>
+                </a:solidFill>
+                <a:latin typeface="나눔스퀘어 ExtraBold" panose="020B0600000101010101" pitchFamily="50" charset="-127"/>
+                <a:ea typeface="나눔스퀘어 ExtraBold" panose="020B0600000101010101" pitchFamily="50" charset="-127"/>
+              </a:rPr>
+              <a:t>DB</a:t>
+            </a:r>
+            <a:endParaRPr lang="ko-KR" altLang="en-US" dirty="0">
+              <a:solidFill>
+                <a:schemeClr val="tx1"/>
+              </a:solidFill>
+              <a:latin typeface="나눔스퀘어 ExtraBold" panose="020B0600000101010101" pitchFamily="50" charset="-127"/>
+              <a:ea typeface="나눔스퀘어 ExtraBold" panose="020B0600000101010101" pitchFamily="50" charset="-127"/>
+            </a:endParaRPr>
+          </a:p>
+        </p:txBody>
+      </p:sp>
+      <p:cxnSp>
+        <p:nvCxnSpPr>
+          <p:cNvPr id="20" name="직선 화살표 연결선 19">
+            <a:extLst>
+              <a:ext uri="{FF2B5EF4-FFF2-40B4-BE49-F238E27FC236}">
+                <a16:creationId xmlns:a16="http://schemas.microsoft.com/office/drawing/2014/main" id="{DA2735E3-2FD8-4C6F-A169-AE972A2D1591}"/>
+              </a:ext>
+            </a:extLst>
+          </p:cNvPr>
+          <p:cNvCxnSpPr>
+            <a:cxnSpLocks/>
+            <a:stCxn id="13" idx="1"/>
+          </p:cNvCxnSpPr>
+          <p:nvPr/>
+        </p:nvCxnSpPr>
+        <p:spPr>
+          <a:xfrm flipH="1">
+            <a:off x="2411498" y="5424728"/>
+            <a:ext cx="2637440" cy="0"/>
+          </a:xfrm>
+          <a:prstGeom prst="straightConnector1">
+            <a:avLst/>
+          </a:prstGeom>
+          <a:ln w="38100">
+            <a:solidFill>
+              <a:schemeClr val="bg1">
+                <a:lumMod val="50000"/>
+              </a:schemeClr>
+            </a:solidFill>
+            <a:tailEnd type="triangle"/>
+          </a:ln>
+        </p:spPr>
+        <p:style>
+          <a:lnRef idx="1">
+            <a:schemeClr val="accent1"/>
+          </a:lnRef>
+          <a:fillRef idx="0">
+            <a:schemeClr val="accent1"/>
+          </a:fillRef>
+          <a:effectRef idx="0">
+            <a:schemeClr val="accent1"/>
+          </a:effectRef>
+          <a:fontRef idx="minor">
+            <a:schemeClr val="tx1"/>
+          </a:fontRef>
+        </p:style>
+      </p:cxnSp>
+      <p:sp>
+        <p:nvSpPr>
+          <p:cNvPr id="30" name="TextBox 29">
+            <a:extLst>
+              <a:ext uri="{FF2B5EF4-FFF2-40B4-BE49-F238E27FC236}">
+                <a16:creationId xmlns:a16="http://schemas.microsoft.com/office/drawing/2014/main" id="{FB5C6DC3-195B-4DDD-B59F-E2382EB5AEDA}"/>
+              </a:ext>
+            </a:extLst>
+          </p:cNvPr>
+          <p:cNvSpPr txBox="1"/>
+          <p:nvPr/>
+        </p:nvSpPr>
+        <p:spPr>
+          <a:xfrm>
+            <a:off x="3354762" y="4110777"/>
+            <a:ext cx="2996611" cy="369332"/>
+          </a:xfrm>
+          <a:prstGeom prst="rect">
+            <a:avLst/>
+          </a:prstGeom>
+          <a:noFill/>
+        </p:spPr>
+        <p:txBody>
+          <a:bodyPr wrap="square" rtlCol="0">
+            <a:spAutoFit/>
+          </a:bodyPr>
+          <a:lstStyle/>
+          <a:p>
+            <a:pPr algn="ctr"/>
+            <a:r>
+              <a:rPr lang="en-US" altLang="ko-KR" dirty="0">
+                <a:latin typeface="나눔스퀘어 ExtraBold" panose="020B0600000101010101" pitchFamily="50" charset="-127"/>
+                <a:ea typeface="나눔스퀘어 ExtraBold" panose="020B0600000101010101" pitchFamily="50" charset="-127"/>
+              </a:rPr>
+              <a:t>2. 1</a:t>
+            </a:r>
+            <a:r>
+              <a:rPr lang="ko-KR" altLang="en-US" dirty="0">
+                <a:latin typeface="나눔스퀘어 ExtraBold" panose="020B0600000101010101" pitchFamily="50" charset="-127"/>
+                <a:ea typeface="나눔스퀘어 ExtraBold" panose="020B0600000101010101" pitchFamily="50" charset="-127"/>
+              </a:rPr>
+              <a:t>차 캐시에서 탐색</a:t>
+            </a:r>
+          </a:p>
+        </p:txBody>
+      </p:sp>
+      <p:sp>
+        <p:nvSpPr>
+          <p:cNvPr id="32" name="TextBox 31">
+            <a:extLst>
+              <a:ext uri="{FF2B5EF4-FFF2-40B4-BE49-F238E27FC236}">
+                <a16:creationId xmlns:a16="http://schemas.microsoft.com/office/drawing/2014/main" id="{C4664DF0-D61D-4DEF-BC64-3A4CCBEF25BD}"/>
+              </a:ext>
+            </a:extLst>
+          </p:cNvPr>
+          <p:cNvSpPr txBox="1"/>
+          <p:nvPr/>
+        </p:nvSpPr>
+        <p:spPr>
+          <a:xfrm>
+            <a:off x="5455616" y="5921075"/>
+            <a:ext cx="2996611" cy="369332"/>
+          </a:xfrm>
+          <a:prstGeom prst="rect">
+            <a:avLst/>
+          </a:prstGeom>
+          <a:noFill/>
+        </p:spPr>
+        <p:txBody>
+          <a:bodyPr wrap="square" rtlCol="0">
+            <a:spAutoFit/>
+          </a:bodyPr>
+          <a:lstStyle/>
+          <a:p>
+            <a:pPr algn="ctr"/>
+            <a:r>
+              <a:rPr lang="en-US" altLang="ko-KR" dirty="0">
+                <a:latin typeface="나눔스퀘어 ExtraBold" panose="020B0600000101010101" pitchFamily="50" charset="-127"/>
+                <a:ea typeface="나눔스퀘어 ExtraBold" panose="020B0600000101010101" pitchFamily="50" charset="-127"/>
+              </a:rPr>
+              <a:t>4. 1</a:t>
+            </a:r>
+            <a:r>
+              <a:rPr lang="ko-KR" altLang="en-US" dirty="0">
+                <a:latin typeface="나눔스퀘어 ExtraBold" panose="020B0600000101010101" pitchFamily="50" charset="-127"/>
+                <a:ea typeface="나눔스퀘어 ExtraBold" panose="020B0600000101010101" pitchFamily="50" charset="-127"/>
+              </a:rPr>
+              <a:t>차 캐시에 저장</a:t>
+            </a:r>
+          </a:p>
+        </p:txBody>
+      </p:sp>
+      <p:sp>
+        <p:nvSpPr>
+          <p:cNvPr id="29" name="TextBox 28">
+            <a:extLst>
+              <a:ext uri="{FF2B5EF4-FFF2-40B4-BE49-F238E27FC236}">
+                <a16:creationId xmlns:a16="http://schemas.microsoft.com/office/drawing/2014/main" id="{184EE628-DBAF-46CF-8338-6CF36713826E}"/>
+              </a:ext>
+            </a:extLst>
+          </p:cNvPr>
+          <p:cNvSpPr txBox="1"/>
+          <p:nvPr/>
+        </p:nvSpPr>
+        <p:spPr>
+          <a:xfrm>
+            <a:off x="2091996" y="5587486"/>
+            <a:ext cx="2996611" cy="646331"/>
+          </a:xfrm>
+          <a:prstGeom prst="rect">
+            <a:avLst/>
+          </a:prstGeom>
+          <a:noFill/>
+        </p:spPr>
+        <p:txBody>
+          <a:bodyPr wrap="square" rtlCol="0">
+            <a:spAutoFit/>
+          </a:bodyPr>
+          <a:lstStyle/>
+          <a:p>
+            <a:pPr algn="ctr"/>
+            <a:r>
+              <a:rPr lang="en-US" altLang="ko-KR" dirty="0">
+                <a:latin typeface="나눔스퀘어 ExtraBold" panose="020B0600000101010101" pitchFamily="50" charset="-127"/>
+                <a:ea typeface="나눔스퀘어 ExtraBold" panose="020B0600000101010101" pitchFamily="50" charset="-127"/>
+              </a:rPr>
+              <a:t>3. 1</a:t>
+            </a:r>
+            <a:r>
+              <a:rPr lang="ko-KR" altLang="en-US" dirty="0">
+                <a:latin typeface="나눔스퀘어 ExtraBold" panose="020B0600000101010101" pitchFamily="50" charset="-127"/>
+                <a:ea typeface="나눔스퀘어 ExtraBold" panose="020B0600000101010101" pitchFamily="50" charset="-127"/>
+              </a:rPr>
+              <a:t>차 캐시에 </a:t>
+            </a:r>
+            <a:br>
+              <a:rPr lang="en-US" altLang="ko-KR" dirty="0">
+                <a:latin typeface="나눔스퀘어 ExtraBold" panose="020B0600000101010101" pitchFamily="50" charset="-127"/>
+                <a:ea typeface="나눔스퀘어 ExtraBold" panose="020B0600000101010101" pitchFamily="50" charset="-127"/>
+              </a:rPr>
+            </a:br>
+            <a:r>
+              <a:rPr lang="ko-KR" altLang="en-US" dirty="0">
+                <a:latin typeface="나눔스퀘어 ExtraBold" panose="020B0600000101010101" pitchFamily="50" charset="-127"/>
+                <a:ea typeface="나눔스퀘어 ExtraBold" panose="020B0600000101010101" pitchFamily="50" charset="-127"/>
+              </a:rPr>
+              <a:t>해당 엔티티 있으면 반환</a:t>
+            </a:r>
+          </a:p>
+        </p:txBody>
+      </p:sp>
+      <p:cxnSp>
+        <p:nvCxnSpPr>
+          <p:cNvPr id="34" name="직선 화살표 연결선 33">
+            <a:extLst>
+              <a:ext uri="{FF2B5EF4-FFF2-40B4-BE49-F238E27FC236}">
+                <a16:creationId xmlns:a16="http://schemas.microsoft.com/office/drawing/2014/main" id="{656B17F1-2D9D-4133-81A0-3BAD58870779}"/>
+              </a:ext>
+            </a:extLst>
+          </p:cNvPr>
+          <p:cNvCxnSpPr>
+            <a:cxnSpLocks/>
+            <a:stCxn id="13" idx="3"/>
+            <a:endCxn id="18" idx="3"/>
+          </p:cNvCxnSpPr>
+          <p:nvPr/>
+        </p:nvCxnSpPr>
+        <p:spPr>
+          <a:xfrm flipV="1">
+            <a:off x="8733056" y="4047755"/>
+            <a:ext cx="2512958" cy="1376973"/>
+          </a:xfrm>
+          <a:prstGeom prst="straightConnector1">
+            <a:avLst/>
+          </a:prstGeom>
+          <a:ln w="38100">
+            <a:solidFill>
+              <a:schemeClr val="bg1">
+                <a:lumMod val="50000"/>
+              </a:schemeClr>
+            </a:solidFill>
+            <a:tailEnd type="triangle"/>
+          </a:ln>
+        </p:spPr>
+        <p:style>
+          <a:lnRef idx="1">
+            <a:schemeClr val="accent1"/>
+          </a:lnRef>
+          <a:fillRef idx="0">
+            <a:schemeClr val="accent1"/>
+          </a:fillRef>
+          <a:effectRef idx="0">
+            <a:schemeClr val="accent1"/>
+          </a:effectRef>
+          <a:fontRef idx="minor">
+            <a:schemeClr val="tx1"/>
+          </a:fontRef>
+        </p:style>
+      </p:cxnSp>
+      <p:sp>
+        <p:nvSpPr>
+          <p:cNvPr id="35" name="TextBox 34">
+            <a:extLst>
+              <a:ext uri="{FF2B5EF4-FFF2-40B4-BE49-F238E27FC236}">
+                <a16:creationId xmlns:a16="http://schemas.microsoft.com/office/drawing/2014/main" id="{148B55C9-1E35-40ED-A5C8-3DD5D7125119}"/>
+              </a:ext>
+            </a:extLst>
+          </p:cNvPr>
+          <p:cNvSpPr txBox="1"/>
+          <p:nvPr/>
+        </p:nvSpPr>
+        <p:spPr>
+          <a:xfrm>
+            <a:off x="7647694" y="4021638"/>
+            <a:ext cx="3109179" cy="646331"/>
+          </a:xfrm>
+          <a:prstGeom prst="rect">
+            <a:avLst/>
+          </a:prstGeom>
+          <a:noFill/>
+        </p:spPr>
+        <p:txBody>
+          <a:bodyPr wrap="square" rtlCol="0">
+            <a:spAutoFit/>
+          </a:bodyPr>
+          <a:lstStyle/>
+          <a:p>
+            <a:pPr algn="ctr"/>
+            <a:r>
+              <a:rPr lang="en-US" altLang="ko-KR" dirty="0">
+                <a:latin typeface="나눔스퀘어 ExtraBold" panose="020B0600000101010101" pitchFamily="50" charset="-127"/>
+                <a:ea typeface="나눔스퀘어 ExtraBold" panose="020B0600000101010101" pitchFamily="50" charset="-127"/>
+              </a:rPr>
+              <a:t>4. 1</a:t>
+            </a:r>
+            <a:r>
+              <a:rPr lang="ko-KR" altLang="en-US" dirty="0">
+                <a:latin typeface="나눔스퀘어 ExtraBold" panose="020B0600000101010101" pitchFamily="50" charset="-127"/>
+                <a:ea typeface="나눔스퀘어 ExtraBold" panose="020B0600000101010101" pitchFamily="50" charset="-127"/>
+              </a:rPr>
+              <a:t>차 캐시에 없으면</a:t>
+            </a:r>
+            <a:r>
+              <a:rPr lang="en-US" altLang="ko-KR" dirty="0">
+                <a:latin typeface="나눔스퀘어 ExtraBold" panose="020B0600000101010101" pitchFamily="50" charset="-127"/>
+                <a:ea typeface="나눔스퀘어 ExtraBold" panose="020B0600000101010101" pitchFamily="50" charset="-127"/>
+              </a:rPr>
+              <a:t> DB </a:t>
+            </a:r>
+            <a:r>
+              <a:rPr lang="ko-KR" altLang="en-US" dirty="0">
+                <a:latin typeface="나눔스퀘어 ExtraBold" panose="020B0600000101010101" pitchFamily="50" charset="-127"/>
+                <a:ea typeface="나눔스퀘어 ExtraBold" panose="020B0600000101010101" pitchFamily="50" charset="-127"/>
+              </a:rPr>
+              <a:t>조회 </a:t>
+            </a:r>
+            <a:endParaRPr lang="en-US" altLang="ko-KR" dirty="0">
+              <a:latin typeface="나눔스퀘어 ExtraBold" panose="020B0600000101010101" pitchFamily="50" charset="-127"/>
+              <a:ea typeface="나눔스퀘어 ExtraBold" panose="020B0600000101010101" pitchFamily="50" charset="-127"/>
+            </a:endParaRPr>
+          </a:p>
+          <a:p>
+            <a:pPr algn="ctr"/>
+            <a:r>
+              <a:rPr lang="ko-KR" altLang="en-US" dirty="0">
+                <a:latin typeface="나눔스퀘어 ExtraBold" panose="020B0600000101010101" pitchFamily="50" charset="-127"/>
+                <a:ea typeface="나눔스퀘어 ExtraBold" panose="020B0600000101010101" pitchFamily="50" charset="-127"/>
+              </a:rPr>
+              <a:t>후 캐시에 저장 후 반환</a:t>
+            </a:r>
+          </a:p>
+        </p:txBody>
+      </p:sp>
+      <p:cxnSp>
+        <p:nvCxnSpPr>
+          <p:cNvPr id="36" name="직선 화살표 연결선 35">
+            <a:extLst>
+              <a:ext uri="{FF2B5EF4-FFF2-40B4-BE49-F238E27FC236}">
+                <a16:creationId xmlns:a16="http://schemas.microsoft.com/office/drawing/2014/main" id="{F37EB376-C642-4DA1-AF45-B925CD0F5F35}"/>
+              </a:ext>
+            </a:extLst>
+          </p:cNvPr>
+          <p:cNvCxnSpPr>
+            <a:cxnSpLocks/>
+            <a:stCxn id="13" idx="3"/>
+            <a:endCxn id="38" idx="2"/>
+          </p:cNvCxnSpPr>
+          <p:nvPr/>
+        </p:nvCxnSpPr>
+        <p:spPr>
+          <a:xfrm>
+            <a:off x="8733056" y="5424728"/>
+            <a:ext cx="1431660" cy="556718"/>
+          </a:xfrm>
+          <a:prstGeom prst="straightConnector1">
+            <a:avLst/>
+          </a:prstGeom>
+          <a:ln w="38100">
+            <a:solidFill>
+              <a:schemeClr val="bg1">
+                <a:lumMod val="50000"/>
+              </a:schemeClr>
+            </a:solidFill>
+            <a:tailEnd type="triangle"/>
+          </a:ln>
+        </p:spPr>
+        <p:style>
+          <a:lnRef idx="1">
+            <a:schemeClr val="accent1"/>
+          </a:lnRef>
+          <a:fillRef idx="0">
+            <a:schemeClr val="accent1"/>
+          </a:fillRef>
+          <a:effectRef idx="0">
+            <a:schemeClr val="accent1"/>
+          </a:effectRef>
+          <a:fontRef idx="minor">
+            <a:schemeClr val="tx1"/>
+          </a:fontRef>
+        </p:style>
+      </p:cxnSp>
+      <p:sp>
+        <p:nvSpPr>
+          <p:cNvPr id="38" name="타원 37">
+            <a:extLst>
+              <a:ext uri="{FF2B5EF4-FFF2-40B4-BE49-F238E27FC236}">
+                <a16:creationId xmlns:a16="http://schemas.microsoft.com/office/drawing/2014/main" id="{FF891070-1D76-4DAA-8F79-C56D902C871B}"/>
+              </a:ext>
+            </a:extLst>
+          </p:cNvPr>
+          <p:cNvSpPr/>
+          <p:nvPr/>
+        </p:nvSpPr>
+        <p:spPr>
+          <a:xfrm>
+            <a:off x="10164716" y="5512109"/>
+            <a:ext cx="1822572" cy="938673"/>
+          </a:xfrm>
+          <a:prstGeom prst="ellipse">
+            <a:avLst/>
+          </a:prstGeom>
+          <a:noFill/>
+          <a:ln w="38100">
+            <a:solidFill>
+              <a:schemeClr val="tx1"/>
+            </a:solidFill>
+          </a:ln>
+        </p:spPr>
+        <p:style>
+          <a:lnRef idx="2">
+            <a:schemeClr val="accent1">
+              <a:shade val="50000"/>
+            </a:schemeClr>
+          </a:lnRef>
+          <a:fillRef idx="1">
+            <a:schemeClr val="accent1"/>
+          </a:fillRef>
+          <a:effectRef idx="0">
+            <a:schemeClr val="accent1"/>
+          </a:effectRef>
+          <a:fontRef idx="minor">
+            <a:schemeClr val="lt1"/>
+          </a:fontRef>
+        </p:style>
+        <p:txBody>
+          <a:bodyPr rtlCol="0" anchor="ctr"/>
+          <a:lstStyle/>
+          <a:p>
+            <a:pPr algn="ctr"/>
+            <a:r>
+              <a:rPr lang="en-US" altLang="ko-KR" dirty="0">
+                <a:solidFill>
+                  <a:schemeClr val="tx1"/>
+                </a:solidFill>
+                <a:latin typeface="나눔스퀘어 ExtraBold" panose="020B0600000101010101" pitchFamily="50" charset="-127"/>
+                <a:ea typeface="나눔스퀘어 ExtraBold" panose="020B0600000101010101" pitchFamily="50" charset="-127"/>
+              </a:rPr>
+              <a:t>memberA</a:t>
+            </a:r>
+            <a:endParaRPr lang="ko-KR" altLang="en-US" dirty="0">
+              <a:solidFill>
+                <a:schemeClr val="tx1"/>
+              </a:solidFill>
+              <a:latin typeface="나눔스퀘어 ExtraBold" panose="020B0600000101010101" pitchFamily="50" charset="-127"/>
+              <a:ea typeface="나눔스퀘어 ExtraBold" panose="020B0600000101010101" pitchFamily="50" charset="-127"/>
+            </a:endParaRPr>
+          </a:p>
+        </p:txBody>
+      </p:sp>
+    </p:spTree>
+    <p:extLst>
+      <p:ext uri="{BB962C8B-B14F-4D97-AF65-F5344CB8AC3E}">
+        <p14:creationId xmlns:p14="http://schemas.microsoft.com/office/powerpoint/2010/main" val="3169231157"/>
+      </p:ext>
+    </p:extLst>
+  </p:cSld>
+  <p:clrMapOvr>
+    <a:masterClrMapping/>
+  </p:clrMapOvr>
+</p:sld>
+</file>
+
+<file path=ppt/slides/slide4.xml><?xml version="1.0" encoding="utf-8"?>
+<p:sld xmlns:a="http://schemas.openxmlformats.org/drawingml/2006/main" xmlns:r="http://schemas.openxmlformats.org/officeDocument/2006/relationships" xmlns:p="http://schemas.openxmlformats.org/presentationml/2006/main">
+  <p:cSld>
+    <p:spTree>
+      <p:nvGrpSpPr>
+        <p:cNvPr id="1" name=""/>
+        <p:cNvGrpSpPr/>
+        <p:nvPr/>
+      </p:nvGrpSpPr>
+      <p:grpSpPr>
+        <a:xfrm>
+          <a:off x="0" y="0"/>
+          <a:ext cx="0" cy="0"/>
+          <a:chOff x="0" y="0"/>
+          <a:chExt cx="0" cy="0"/>
+        </a:xfrm>
+      </p:grpSpPr>
+      <p:sp>
+        <p:nvSpPr>
+          <p:cNvPr id="10" name="직사각형 9">
+            <a:extLst>
+              <a:ext uri="{FF2B5EF4-FFF2-40B4-BE49-F238E27FC236}">
+                <a16:creationId xmlns:a16="http://schemas.microsoft.com/office/drawing/2014/main" id="{29F3B81B-3D40-440F-B7AC-C3B5CFB0A3F5}"/>
+              </a:ext>
+            </a:extLst>
+          </p:cNvPr>
+          <p:cNvSpPr/>
+          <p:nvPr/>
+        </p:nvSpPr>
+        <p:spPr>
+          <a:xfrm>
+            <a:off x="1081157" y="877076"/>
+            <a:ext cx="6295827" cy="5779087"/>
+          </a:xfrm>
+          <a:prstGeom prst="rect">
+            <a:avLst/>
+          </a:prstGeom>
+          <a:solidFill>
+            <a:schemeClr val="bg1">
+              <a:lumMod val="85000"/>
+            </a:schemeClr>
+          </a:solidFill>
+          <a:ln>
+            <a:noFill/>
+          </a:ln>
+        </p:spPr>
+        <p:style>
+          <a:lnRef idx="2">
+            <a:schemeClr val="accent1">
+              <a:shade val="50000"/>
+            </a:schemeClr>
+          </a:lnRef>
+          <a:fillRef idx="1">
+            <a:schemeClr val="accent1"/>
+          </a:fillRef>
+          <a:effectRef idx="0">
+            <a:schemeClr val="accent1"/>
+          </a:effectRef>
+          <a:fontRef idx="minor">
+            <a:schemeClr val="lt1"/>
+          </a:fontRef>
+        </p:style>
+        <p:txBody>
+          <a:bodyPr rtlCol="0" anchor="ctr"/>
+          <a:lstStyle/>
+          <a:p>
+            <a:pPr algn="ctr"/>
+            <a:endParaRPr lang="ko-KR" altLang="en-US" dirty="0">
+              <a:latin typeface="나눔스퀘어 ExtraBold" panose="020B0600000101010101" pitchFamily="50" charset="-127"/>
+              <a:ea typeface="나눔스퀘어 ExtraBold" panose="020B0600000101010101" pitchFamily="50" charset="-127"/>
+            </a:endParaRPr>
+          </a:p>
+        </p:txBody>
+      </p:sp>
+      <p:cxnSp>
+        <p:nvCxnSpPr>
+          <p:cNvPr id="5" name="직선 화살표 연결선 4">
+            <a:extLst>
+              <a:ext uri="{FF2B5EF4-FFF2-40B4-BE49-F238E27FC236}">
+                <a16:creationId xmlns:a16="http://schemas.microsoft.com/office/drawing/2014/main" id="{9E32C43A-A809-4797-9A05-9C4C775DB3B2}"/>
+              </a:ext>
+            </a:extLst>
+          </p:cNvPr>
+          <p:cNvCxnSpPr>
+            <a:cxnSpLocks/>
+          </p:cNvCxnSpPr>
+          <p:nvPr/>
+        </p:nvCxnSpPr>
+        <p:spPr>
+          <a:xfrm>
+            <a:off x="417095" y="4029042"/>
+            <a:ext cx="2187209" cy="0"/>
+          </a:xfrm>
+          <a:prstGeom prst="straightConnector1">
+            <a:avLst/>
+          </a:prstGeom>
+          <a:ln w="38100">
+            <a:solidFill>
+              <a:schemeClr val="bg1">
+                <a:lumMod val="50000"/>
+              </a:schemeClr>
+            </a:solidFill>
+            <a:tailEnd type="triangle"/>
+          </a:ln>
+        </p:spPr>
+        <p:style>
+          <a:lnRef idx="1">
+            <a:schemeClr val="accent1"/>
+          </a:lnRef>
+          <a:fillRef idx="0">
+            <a:schemeClr val="accent1"/>
+          </a:fillRef>
+          <a:effectRef idx="0">
+            <a:schemeClr val="accent1"/>
+          </a:effectRef>
+          <a:fontRef idx="minor">
+            <a:schemeClr val="tx1"/>
+          </a:fontRef>
+        </p:style>
+      </p:cxnSp>
+      <p:sp>
+        <p:nvSpPr>
+          <p:cNvPr id="6" name="TextBox 5">
+            <a:extLst>
+              <a:ext uri="{FF2B5EF4-FFF2-40B4-BE49-F238E27FC236}">
+                <a16:creationId xmlns:a16="http://schemas.microsoft.com/office/drawing/2014/main" id="{608FDBEF-27D8-4593-B29B-D6713BAB1BF8}"/>
+              </a:ext>
+            </a:extLst>
+          </p:cNvPr>
+          <p:cNvSpPr txBox="1"/>
+          <p:nvPr/>
+        </p:nvSpPr>
+        <p:spPr>
+          <a:xfrm>
+            <a:off x="197708" y="3597721"/>
+            <a:ext cx="2324371" cy="369332"/>
+          </a:xfrm>
+          <a:prstGeom prst="rect">
+            <a:avLst/>
+          </a:prstGeom>
+          <a:noFill/>
+        </p:spPr>
+        <p:txBody>
+          <a:bodyPr wrap="square" rtlCol="0">
+            <a:spAutoFit/>
+          </a:bodyPr>
+          <a:lstStyle/>
+          <a:p>
+            <a:pPr algn="ctr"/>
+            <a:r>
+              <a:rPr lang="en-US" altLang="ko-KR" dirty="0">
+                <a:latin typeface="나눔스퀘어 ExtraBold" panose="020B0600000101010101" pitchFamily="50" charset="-127"/>
+                <a:ea typeface="나눔스퀘어 ExtraBold" panose="020B0600000101010101" pitchFamily="50" charset="-127"/>
+              </a:rPr>
+              <a:t>1. </a:t>
+            </a:r>
+            <a:r>
+              <a:rPr lang="en-US" altLang="ko-KR" dirty="0" err="1">
+                <a:latin typeface="나눔스퀘어 ExtraBold" panose="020B0600000101010101" pitchFamily="50" charset="-127"/>
+                <a:ea typeface="나눔스퀘어 ExtraBold" panose="020B0600000101010101" pitchFamily="50" charset="-127"/>
+              </a:rPr>
+              <a:t>session.flush</a:t>
+            </a:r>
+            <a:r>
+              <a:rPr lang="en-US" altLang="ko-KR" dirty="0">
+                <a:latin typeface="나눔스퀘어 ExtraBold" panose="020B0600000101010101" pitchFamily="50" charset="-127"/>
+                <a:ea typeface="나눔스퀘어 ExtraBold" panose="020B0600000101010101" pitchFamily="50" charset="-127"/>
+              </a:rPr>
+              <a:t>()</a:t>
+            </a:r>
+            <a:endParaRPr lang="ko-KR" altLang="en-US" dirty="0">
+              <a:latin typeface="나눔스퀘어 ExtraBold" panose="020B0600000101010101" pitchFamily="50" charset="-127"/>
+              <a:ea typeface="나눔스퀘어 ExtraBold" panose="020B0600000101010101" pitchFamily="50" charset="-127"/>
+            </a:endParaRPr>
+          </a:p>
+        </p:txBody>
+      </p:sp>
+      <p:sp>
+        <p:nvSpPr>
+          <p:cNvPr id="9" name="순서도: 자기 디스크 8">
+            <a:extLst>
+              <a:ext uri="{FF2B5EF4-FFF2-40B4-BE49-F238E27FC236}">
+                <a16:creationId xmlns:a16="http://schemas.microsoft.com/office/drawing/2014/main" id="{DCAE435D-E946-4C5F-B1EC-87F2FA1A1295}"/>
+              </a:ext>
+            </a:extLst>
+          </p:cNvPr>
+          <p:cNvSpPr/>
+          <p:nvPr/>
+        </p:nvSpPr>
+        <p:spPr>
+          <a:xfrm>
+            <a:off x="4237070" y="3306706"/>
+            <a:ext cx="2662178" cy="1318283"/>
+          </a:xfrm>
+          <a:prstGeom prst="flowChartMagneticDisk">
+            <a:avLst/>
+          </a:prstGeom>
+          <a:noFill/>
+          <a:ln w="28575">
+            <a:solidFill>
+              <a:schemeClr val="tx1"/>
+            </a:solidFill>
+          </a:ln>
+        </p:spPr>
+        <p:style>
+          <a:lnRef idx="2">
+            <a:schemeClr val="accent1">
+              <a:shade val="50000"/>
+            </a:schemeClr>
+          </a:lnRef>
+          <a:fillRef idx="1">
+            <a:schemeClr val="accent1"/>
+          </a:fillRef>
+          <a:effectRef idx="0">
+            <a:schemeClr val="accent1"/>
+          </a:effectRef>
+          <a:fontRef idx="minor">
+            <a:schemeClr val="lt1"/>
+          </a:fontRef>
+        </p:style>
+        <p:txBody>
+          <a:bodyPr rtlCol="0" anchor="ctr"/>
+          <a:lstStyle/>
+          <a:p>
+            <a:pPr algn="ctr"/>
+            <a:r>
+              <a:rPr lang="ko-KR" altLang="en-US" dirty="0">
+                <a:solidFill>
+                  <a:schemeClr val="tx1"/>
+                </a:solidFill>
+                <a:latin typeface="나눔스퀘어 ExtraBold" panose="020B0600000101010101" pitchFamily="50" charset="-127"/>
+                <a:ea typeface="나눔스퀘어 ExtraBold" panose="020B0600000101010101" pitchFamily="50" charset="-127"/>
+              </a:rPr>
+              <a:t>쓰기 지연 </a:t>
+            </a:r>
+            <a:r>
+              <a:rPr lang="en-US" altLang="ko-KR" dirty="0">
+                <a:solidFill>
+                  <a:schemeClr val="tx1"/>
+                </a:solidFill>
+                <a:latin typeface="나눔스퀘어 ExtraBold" panose="020B0600000101010101" pitchFamily="50" charset="-127"/>
+                <a:ea typeface="나눔스퀘어 ExtraBold" panose="020B0600000101010101" pitchFamily="50" charset="-127"/>
+              </a:rPr>
+              <a:t>SQL </a:t>
+            </a:r>
+            <a:r>
+              <a:rPr lang="ko-KR" altLang="en-US" dirty="0">
+                <a:solidFill>
+                  <a:schemeClr val="tx1"/>
+                </a:solidFill>
+                <a:latin typeface="나눔스퀘어 ExtraBold" panose="020B0600000101010101" pitchFamily="50" charset="-127"/>
+                <a:ea typeface="나눔스퀘어 ExtraBold" panose="020B0600000101010101" pitchFamily="50" charset="-127"/>
+              </a:rPr>
+              <a:t>저장소</a:t>
+            </a:r>
+          </a:p>
+        </p:txBody>
+      </p:sp>
+      <p:sp>
+        <p:nvSpPr>
+          <p:cNvPr id="11" name="TextBox 10">
+            <a:extLst>
+              <a:ext uri="{FF2B5EF4-FFF2-40B4-BE49-F238E27FC236}">
+                <a16:creationId xmlns:a16="http://schemas.microsoft.com/office/drawing/2014/main" id="{A7D4FFDB-8112-42C6-825B-A595B2A658F3}"/>
+              </a:ext>
+            </a:extLst>
+          </p:cNvPr>
+          <p:cNvSpPr txBox="1"/>
+          <p:nvPr/>
+        </p:nvSpPr>
+        <p:spPr>
+          <a:xfrm>
+            <a:off x="2972746" y="1060803"/>
+            <a:ext cx="2482870" cy="830997"/>
+          </a:xfrm>
+          <a:prstGeom prst="rect">
+            <a:avLst/>
+          </a:prstGeom>
+          <a:noFill/>
+        </p:spPr>
+        <p:txBody>
+          <a:bodyPr wrap="square" rtlCol="0">
+            <a:spAutoFit/>
+          </a:bodyPr>
+          <a:lstStyle/>
+          <a:p>
+            <a:pPr algn="ctr"/>
+            <a:r>
+              <a:rPr lang="ko-KR" altLang="en-US" sz="2400" dirty="0">
+                <a:latin typeface="나눔스퀘어 ExtraBold" panose="020B0600000101010101" pitchFamily="50" charset="-127"/>
+                <a:ea typeface="나눔스퀘어 ExtraBold" panose="020B0600000101010101" pitchFamily="50" charset="-127"/>
+              </a:rPr>
+              <a:t>영속 컨텍스트</a:t>
+            </a:r>
+            <a:r>
+              <a:rPr lang="en-US" altLang="ko-KR" sz="2400" dirty="0">
+                <a:latin typeface="나눔스퀘어 ExtraBold" panose="020B0600000101010101" pitchFamily="50" charset="-127"/>
+                <a:ea typeface="나눔스퀘어 ExtraBold" panose="020B0600000101010101" pitchFamily="50" charset="-127"/>
+              </a:rPr>
+              <a:t>(Entity</a:t>
+            </a:r>
+            <a:r>
+              <a:rPr lang="ko-KR" altLang="en-US" sz="2400" dirty="0">
+                <a:latin typeface="나눔스퀘어 ExtraBold" panose="020B0600000101010101" pitchFamily="50" charset="-127"/>
+                <a:ea typeface="나눔스퀘어 ExtraBold" panose="020B0600000101010101" pitchFamily="50" charset="-127"/>
+              </a:rPr>
+              <a:t> </a:t>
+            </a:r>
+            <a:r>
+              <a:rPr lang="en-US" altLang="ko-KR" sz="2400" dirty="0">
+                <a:latin typeface="나눔스퀘어 ExtraBold" panose="020B0600000101010101" pitchFamily="50" charset="-127"/>
+                <a:ea typeface="나눔스퀘어 ExtraBold" panose="020B0600000101010101" pitchFamily="50" charset="-127"/>
+              </a:rPr>
+              <a:t>Manger)</a:t>
+            </a:r>
+            <a:endParaRPr lang="ko-KR" altLang="en-US" sz="2400" dirty="0">
+              <a:latin typeface="나눔스퀘어 ExtraBold" panose="020B0600000101010101" pitchFamily="50" charset="-127"/>
+              <a:ea typeface="나눔스퀘어 ExtraBold" panose="020B0600000101010101" pitchFamily="50" charset="-127"/>
+            </a:endParaRPr>
+          </a:p>
+        </p:txBody>
+      </p:sp>
+      <p:graphicFrame>
+        <p:nvGraphicFramePr>
+          <p:cNvPr id="13" name="표 12">
+            <a:extLst>
+              <a:ext uri="{FF2B5EF4-FFF2-40B4-BE49-F238E27FC236}">
+                <a16:creationId xmlns:a16="http://schemas.microsoft.com/office/drawing/2014/main" id="{0B6618A5-AD04-400A-9DAA-0368F98F8B87}"/>
+              </a:ext>
+            </a:extLst>
+          </p:cNvPr>
+          <p:cNvGraphicFramePr>
+            <a:graphicFrameLocks noGrp="1"/>
+          </p:cNvGraphicFramePr>
+          <p:nvPr>
+            <p:extLst>
+              <p:ext uri="{D42A27DB-BD31-4B8C-83A1-F6EECF244321}">
+                <p14:modId xmlns:p14="http://schemas.microsoft.com/office/powerpoint/2010/main" val="1095797974"/>
+              </p:ext>
+            </p:extLst>
+          </p:nvPr>
+        </p:nvGraphicFramePr>
+        <p:xfrm>
+          <a:off x="3429963" y="5555894"/>
+          <a:ext cx="3684118" cy="741680"/>
+        </p:xfrm>
+        <a:graphic>
+          <a:graphicData uri="http://schemas.openxmlformats.org/drawingml/2006/table">
+            <a:tbl>
+              <a:tblPr firstRow="1" bandRow="1">
+                <a:tableStyleId>{2D5ABB26-0587-4C30-8999-92F81FD0307C}</a:tableStyleId>
+              </a:tblPr>
+              <a:tblGrid>
+                <a:gridCol w="1842059">
+                  <a:extLst>
+                    <a:ext uri="{9D8B030D-6E8A-4147-A177-3AD203B41FA5}">
+                      <a16:colId xmlns:a16="http://schemas.microsoft.com/office/drawing/2014/main" val="3288214171"/>
+                    </a:ext>
+                  </a:extLst>
+                </a:gridCol>
+                <a:gridCol w="1842059">
+                  <a:extLst>
+                    <a:ext uri="{9D8B030D-6E8A-4147-A177-3AD203B41FA5}">
+                      <a16:colId xmlns:a16="http://schemas.microsoft.com/office/drawing/2014/main" val="3162273400"/>
+                    </a:ext>
+                  </a:extLst>
+                </a:gridCol>
+              </a:tblGrid>
+              <a:tr h="370840">
+                <a:tc>
+                  <a:txBody>
+                    <a:bodyPr/>
+                    <a:lstStyle/>
+                    <a:p>
+                      <a:pPr latinLnBrk="1"/>
+                      <a:r>
+                        <a:rPr lang="en-US" altLang="ko-KR" dirty="0"/>
+                        <a:t>@Id</a:t>
+                      </a:r>
+                      <a:endParaRPr lang="ko-KR" altLang="en-US" dirty="0"/>
+                    </a:p>
+                  </a:txBody>
+                  <a:tcPr>
+                    <a:lnL w="12700" cap="flat" cmpd="sng" algn="ctr">
+                      <a:solidFill>
+                        <a:schemeClr val="tx1"/>
+                      </a:solidFill>
+                      <a:prstDash val="sysDash"/>
+                      <a:round/>
+                      <a:headEnd type="none" w="med" len="med"/>
+                      <a:tailEnd type="none" w="med" len="med"/>
+                    </a:lnL>
+                    <a:lnR w="12700" cap="flat" cmpd="sng" algn="ctr">
+                      <a:solidFill>
+                        <a:schemeClr val="tx1"/>
+                      </a:solidFill>
+                      <a:prstDash val="sysDash"/>
+                      <a:round/>
+                      <a:headEnd type="none" w="med" len="med"/>
+                      <a:tailEnd type="none" w="med" len="med"/>
+                    </a:lnR>
+                    <a:lnT w="12700" cap="flat" cmpd="sng" algn="ctr">
+                      <a:solidFill>
+                        <a:schemeClr val="tx1"/>
+                      </a:solidFill>
+                      <a:prstDash val="sysDash"/>
+                      <a:round/>
+                      <a:headEnd type="none" w="med" len="med"/>
+                      <a:tailEnd type="none" w="med" len="med"/>
+                    </a:lnT>
+                    <a:lnB w="12700" cap="flat" cmpd="sng" algn="ctr">
+                      <a:solidFill>
+                        <a:schemeClr val="tx1"/>
+                      </a:solidFill>
+                      <a:prstDash val="sysDash"/>
+                      <a:round/>
+                      <a:headEnd type="none" w="med" len="med"/>
+                      <a:tailEnd type="none" w="med" len="med"/>
+                    </a:lnB>
+                    <a:lnTlToBr w="12700" cmpd="sng">
+                      <a:noFill/>
+                      <a:prstDash val="solid"/>
+                    </a:lnTlToBr>
+                    <a:lnBlToTr w="12700" cmpd="sng">
+                      <a:noFill/>
+                      <a:prstDash val="solid"/>
+                    </a:lnBlToTr>
+                  </a:tcPr>
+                </a:tc>
+                <a:tc>
+                  <a:txBody>
+                    <a:bodyPr/>
+                    <a:lstStyle/>
+                    <a:p>
+                      <a:pPr latinLnBrk="1"/>
+                      <a:r>
+                        <a:rPr lang="en-US" altLang="ko-KR" dirty="0"/>
+                        <a:t>Entity</a:t>
+                      </a:r>
+                      <a:endParaRPr lang="ko-KR" altLang="en-US" dirty="0"/>
+                    </a:p>
+                  </a:txBody>
+                  <a:tcPr>
+                    <a:lnL w="12700" cap="flat" cmpd="sng" algn="ctr">
+                      <a:solidFill>
+                        <a:schemeClr val="tx1"/>
+                      </a:solidFill>
+                      <a:prstDash val="sysDash"/>
+                      <a:round/>
+                      <a:headEnd type="none" w="med" len="med"/>
+                      <a:tailEnd type="none" w="med" len="med"/>
+                    </a:lnL>
+                    <a:lnR w="12700" cap="flat" cmpd="sng" algn="ctr">
+                      <a:solidFill>
+                        <a:schemeClr val="tx1"/>
+                      </a:solidFill>
+                      <a:prstDash val="sysDash"/>
+                      <a:round/>
+                      <a:headEnd type="none" w="med" len="med"/>
+                      <a:tailEnd type="none" w="med" len="med"/>
+                    </a:lnR>
+                    <a:lnT w="12700" cap="flat" cmpd="sng" algn="ctr">
+                      <a:solidFill>
+                        <a:schemeClr val="tx1"/>
+                      </a:solidFill>
+                      <a:prstDash val="sysDash"/>
+                      <a:round/>
+                      <a:headEnd type="none" w="med" len="med"/>
+                      <a:tailEnd type="none" w="med" len="med"/>
+                    </a:lnT>
+                    <a:lnB w="12700" cap="flat" cmpd="sng" algn="ctr">
+                      <a:solidFill>
+                        <a:schemeClr val="tx1"/>
+                      </a:solidFill>
+                      <a:prstDash val="sysDash"/>
+                      <a:round/>
+                      <a:headEnd type="none" w="med" len="med"/>
+                      <a:tailEnd type="none" w="med" len="med"/>
+                    </a:lnB>
+                    <a:lnTlToBr w="12700" cmpd="sng">
+                      <a:noFill/>
+                      <a:prstDash val="solid"/>
+                    </a:lnTlToBr>
+                    <a:lnBlToTr w="12700" cmpd="sng">
+                      <a:noFill/>
+                      <a:prstDash val="solid"/>
+                    </a:lnBlToTr>
+                  </a:tcPr>
+                </a:tc>
+                <a:extLst>
+                  <a:ext uri="{0D108BD9-81ED-4DB2-BD59-A6C34878D82A}">
+                    <a16:rowId xmlns:a16="http://schemas.microsoft.com/office/drawing/2014/main" val="457591107"/>
+                  </a:ext>
+                </a:extLst>
+              </a:tr>
+              <a:tr h="370840">
+                <a:tc>
+                  <a:txBody>
+                    <a:bodyPr/>
+                    <a:lstStyle/>
+                    <a:p>
+                      <a:pPr latinLnBrk="1"/>
+                      <a:r>
+                        <a:rPr lang="en-US" altLang="ko-KR" dirty="0"/>
+                        <a:t>1</a:t>
+                      </a:r>
+                      <a:endParaRPr lang="ko-KR" altLang="en-US" dirty="0"/>
+                    </a:p>
+                  </a:txBody>
+                  <a:tcPr>
+                    <a:lnL w="12700" cap="flat" cmpd="sng" algn="ctr">
+                      <a:solidFill>
+                        <a:schemeClr val="tx1"/>
+                      </a:solidFill>
+                      <a:prstDash val="sysDash"/>
+                      <a:round/>
+                      <a:headEnd type="none" w="med" len="med"/>
+                      <a:tailEnd type="none" w="med" len="med"/>
+                    </a:lnL>
+                    <a:lnR w="12700" cap="flat" cmpd="sng" algn="ctr">
+                      <a:solidFill>
+                        <a:schemeClr val="tx1"/>
+                      </a:solidFill>
+                      <a:prstDash val="sysDash"/>
+                      <a:round/>
+                      <a:headEnd type="none" w="med" len="med"/>
+                      <a:tailEnd type="none" w="med" len="med"/>
+                    </a:lnR>
+                    <a:lnT w="12700" cap="flat" cmpd="sng" algn="ctr">
+                      <a:solidFill>
+                        <a:schemeClr val="tx1"/>
+                      </a:solidFill>
+                      <a:prstDash val="sysDash"/>
+                      <a:round/>
+                      <a:headEnd type="none" w="med" len="med"/>
+                      <a:tailEnd type="none" w="med" len="med"/>
+                    </a:lnT>
+                    <a:lnB w="12700" cap="flat" cmpd="sng" algn="ctr">
+                      <a:solidFill>
+                        <a:schemeClr val="tx1"/>
+                      </a:solidFill>
+                      <a:prstDash val="sysDash"/>
+                      <a:round/>
+                      <a:headEnd type="none" w="med" len="med"/>
+                      <a:tailEnd type="none" w="med" len="med"/>
+                    </a:lnB>
+                    <a:lnTlToBr w="12700" cmpd="sng">
+                      <a:noFill/>
+                      <a:prstDash val="solid"/>
+                    </a:lnTlToBr>
+                    <a:lnBlToTr w="12700" cmpd="sng">
+                      <a:noFill/>
+                      <a:prstDash val="solid"/>
+                    </a:lnBlToTr>
+                  </a:tcPr>
+                </a:tc>
+                <a:tc>
+                  <a:txBody>
+                    <a:bodyPr/>
+                    <a:lstStyle/>
+                    <a:p>
+                      <a:pPr latinLnBrk="1"/>
+                      <a:r>
+                        <a:rPr lang="en-US" altLang="ko-KR" dirty="0"/>
+                        <a:t>member</a:t>
+                      </a:r>
+                      <a:endParaRPr lang="ko-KR" altLang="en-US" dirty="0"/>
+                    </a:p>
+                  </a:txBody>
+                  <a:tcPr>
+                    <a:lnL w="12700" cap="flat" cmpd="sng" algn="ctr">
+                      <a:solidFill>
+                        <a:schemeClr val="tx1"/>
+                      </a:solidFill>
+                      <a:prstDash val="sysDash"/>
+                      <a:round/>
+                      <a:headEnd type="none" w="med" len="med"/>
+                      <a:tailEnd type="none" w="med" len="med"/>
+                    </a:lnL>
+                    <a:lnR w="12700" cap="flat" cmpd="sng" algn="ctr">
+                      <a:solidFill>
+                        <a:schemeClr val="tx1"/>
+                      </a:solidFill>
+                      <a:prstDash val="sysDash"/>
+                      <a:round/>
+                      <a:headEnd type="none" w="med" len="med"/>
+                      <a:tailEnd type="none" w="med" len="med"/>
+                    </a:lnR>
+                    <a:lnT w="12700" cap="flat" cmpd="sng" algn="ctr">
+                      <a:solidFill>
+                        <a:schemeClr val="tx1"/>
+                      </a:solidFill>
+                      <a:prstDash val="sysDash"/>
+                      <a:round/>
+                      <a:headEnd type="none" w="med" len="med"/>
+                      <a:tailEnd type="none" w="med" len="med"/>
+                    </a:lnT>
+                    <a:lnB w="12700" cap="flat" cmpd="sng" algn="ctr">
+                      <a:solidFill>
+                        <a:schemeClr val="tx1"/>
+                      </a:solidFill>
+                      <a:prstDash val="sysDash"/>
+                      <a:round/>
+                      <a:headEnd type="none" w="med" len="med"/>
+                      <a:tailEnd type="none" w="med" len="med"/>
+                    </a:lnB>
+                    <a:lnTlToBr w="12700" cmpd="sng">
+                      <a:noFill/>
+                      <a:prstDash val="solid"/>
+                    </a:lnTlToBr>
+                    <a:lnBlToTr w="12700" cmpd="sng">
+                      <a:noFill/>
+                      <a:prstDash val="solid"/>
+                    </a:lnBlToTr>
+                  </a:tcPr>
+                </a:tc>
+                <a:extLst>
+                  <a:ext uri="{0D108BD9-81ED-4DB2-BD59-A6C34878D82A}">
+                    <a16:rowId xmlns:a16="http://schemas.microsoft.com/office/drawing/2014/main" val="850536928"/>
+                  </a:ext>
+                </a:extLst>
+              </a:tr>
+            </a:tbl>
+          </a:graphicData>
+        </a:graphic>
+      </p:graphicFrame>
+      <p:sp>
+        <p:nvSpPr>
+          <p:cNvPr id="15" name="TextBox 14">
+            <a:extLst>
+              <a:ext uri="{FF2B5EF4-FFF2-40B4-BE49-F238E27FC236}">
+                <a16:creationId xmlns:a16="http://schemas.microsoft.com/office/drawing/2014/main" id="{7A34BB31-C823-4028-8995-D0E9951F62E9}"/>
+              </a:ext>
+            </a:extLst>
+          </p:cNvPr>
+          <p:cNvSpPr txBox="1"/>
+          <p:nvPr/>
+        </p:nvSpPr>
+        <p:spPr>
+          <a:xfrm>
+            <a:off x="4237070" y="5083305"/>
+            <a:ext cx="2022761" cy="369332"/>
+          </a:xfrm>
+          <a:prstGeom prst="rect">
+            <a:avLst/>
+          </a:prstGeom>
+          <a:noFill/>
+        </p:spPr>
+        <p:txBody>
+          <a:bodyPr wrap="square" rtlCol="0">
+            <a:spAutoFit/>
+          </a:bodyPr>
+          <a:lstStyle/>
+          <a:p>
+            <a:pPr algn="ctr"/>
+            <a:r>
+              <a:rPr lang="en-US" altLang="ko-KR" dirty="0">
+                <a:latin typeface="나눔스퀘어 ExtraBold" panose="020B0600000101010101" pitchFamily="50" charset="-127"/>
+                <a:ea typeface="나눔스퀘어 ExtraBold" panose="020B0600000101010101" pitchFamily="50" charset="-127"/>
+              </a:rPr>
+              <a:t>1</a:t>
+            </a:r>
+            <a:r>
+              <a:rPr lang="ko-KR" altLang="en-US" dirty="0">
+                <a:latin typeface="나눔스퀘어 ExtraBold" panose="020B0600000101010101" pitchFamily="50" charset="-127"/>
+                <a:ea typeface="나눔스퀘어 ExtraBold" panose="020B0600000101010101" pitchFamily="50" charset="-127"/>
+              </a:rPr>
+              <a:t>차 캐시</a:t>
+            </a:r>
+          </a:p>
+        </p:txBody>
+      </p:sp>
+      <p:sp>
+        <p:nvSpPr>
+          <p:cNvPr id="18" name="순서도: 자기 디스크 17">
+            <a:extLst>
+              <a:ext uri="{FF2B5EF4-FFF2-40B4-BE49-F238E27FC236}">
+                <a16:creationId xmlns:a16="http://schemas.microsoft.com/office/drawing/2014/main" id="{3F9BA157-703E-442E-8BC3-60313DC1949B}"/>
+              </a:ext>
+            </a:extLst>
+          </p:cNvPr>
+          <p:cNvSpPr/>
+          <p:nvPr/>
+        </p:nvSpPr>
+        <p:spPr>
+          <a:xfrm>
+            <a:off x="9514136" y="3192410"/>
+            <a:ext cx="2191689" cy="2367187"/>
+          </a:xfrm>
+          <a:prstGeom prst="flowChartMagneticDisk">
+            <a:avLst/>
+          </a:prstGeom>
+          <a:noFill/>
+          <a:ln w="28575">
+            <a:solidFill>
+              <a:schemeClr val="tx1"/>
+            </a:solidFill>
+          </a:ln>
+        </p:spPr>
+        <p:style>
+          <a:lnRef idx="2">
+            <a:schemeClr val="accent1">
+              <a:shade val="50000"/>
+            </a:schemeClr>
+          </a:lnRef>
+          <a:fillRef idx="1">
+            <a:schemeClr val="accent1"/>
+          </a:fillRef>
+          <a:effectRef idx="0">
+            <a:schemeClr val="accent1"/>
+          </a:effectRef>
+          <a:fontRef idx="minor">
+            <a:schemeClr val="lt1"/>
+          </a:fontRef>
+        </p:style>
+        <p:txBody>
+          <a:bodyPr rtlCol="0" anchor="ctr"/>
+          <a:lstStyle/>
+          <a:p>
+            <a:pPr algn="ctr"/>
+            <a:r>
+              <a:rPr lang="en-US" altLang="ko-KR" dirty="0">
+                <a:solidFill>
+                  <a:schemeClr val="tx1"/>
+                </a:solidFill>
+                <a:latin typeface="나눔스퀘어 ExtraBold" panose="020B0600000101010101" pitchFamily="50" charset="-127"/>
+                <a:ea typeface="나눔스퀘어 ExtraBold" panose="020B0600000101010101" pitchFamily="50" charset="-127"/>
+              </a:rPr>
+              <a:t>DB</a:t>
+            </a:r>
+            <a:endParaRPr lang="ko-KR" altLang="en-US" dirty="0">
+              <a:solidFill>
+                <a:schemeClr val="tx1"/>
+              </a:solidFill>
+              <a:latin typeface="나눔스퀘어 ExtraBold" panose="020B0600000101010101" pitchFamily="50" charset="-127"/>
+              <a:ea typeface="나눔스퀘어 ExtraBold" panose="020B0600000101010101" pitchFamily="50" charset="-127"/>
+            </a:endParaRPr>
+          </a:p>
+        </p:txBody>
+      </p:sp>
+      <p:sp>
+        <p:nvSpPr>
+          <p:cNvPr id="17" name="TextBox 16">
+            <a:extLst>
+              <a:ext uri="{FF2B5EF4-FFF2-40B4-BE49-F238E27FC236}">
+                <a16:creationId xmlns:a16="http://schemas.microsoft.com/office/drawing/2014/main" id="{C3539730-592A-442D-A46A-E696009A7068}"/>
+              </a:ext>
+            </a:extLst>
+          </p:cNvPr>
+          <p:cNvSpPr txBox="1"/>
+          <p:nvPr/>
+        </p:nvSpPr>
+        <p:spPr>
+          <a:xfrm>
+            <a:off x="3635900" y="312154"/>
+            <a:ext cx="4764387" cy="461665"/>
+          </a:xfrm>
+          <a:prstGeom prst="rect">
+            <a:avLst/>
+          </a:prstGeom>
+          <a:noFill/>
+        </p:spPr>
+        <p:txBody>
+          <a:bodyPr wrap="square" rtlCol="0">
+            <a:spAutoFit/>
+          </a:bodyPr>
+          <a:lstStyle/>
+          <a:p>
+            <a:pPr algn="ctr"/>
+            <a:r>
+              <a:rPr lang="ko-KR" altLang="en-US" sz="2400" dirty="0">
+                <a:latin typeface="나눔스퀘어 ExtraBold" panose="020B0600000101010101" pitchFamily="50" charset="-127"/>
+                <a:ea typeface="나눔스퀘어 ExtraBold" panose="020B0600000101010101" pitchFamily="50" charset="-127"/>
+              </a:rPr>
+              <a:t>변경 감지</a:t>
+            </a:r>
+            <a:r>
+              <a:rPr lang="en-US" altLang="ko-KR" sz="2400" dirty="0">
+                <a:latin typeface="나눔스퀘어 ExtraBold" panose="020B0600000101010101" pitchFamily="50" charset="-127"/>
+                <a:ea typeface="나눔스퀘어 ExtraBold" panose="020B0600000101010101" pitchFamily="50" charset="-127"/>
+              </a:rPr>
+              <a:t>(Dirty Checking)</a:t>
+            </a:r>
+            <a:endParaRPr lang="ko-KR" altLang="en-US" sz="2400" dirty="0">
+              <a:latin typeface="나눔스퀘어 ExtraBold" panose="020B0600000101010101" pitchFamily="50" charset="-127"/>
+              <a:ea typeface="나눔스퀘어 ExtraBold" panose="020B0600000101010101" pitchFamily="50" charset="-127"/>
+            </a:endParaRPr>
+          </a:p>
+        </p:txBody>
+      </p:sp>
+      <p:cxnSp>
+        <p:nvCxnSpPr>
+          <p:cNvPr id="21" name="직선 화살표 연결선 20">
+            <a:extLst>
+              <a:ext uri="{FF2B5EF4-FFF2-40B4-BE49-F238E27FC236}">
+                <a16:creationId xmlns:a16="http://schemas.microsoft.com/office/drawing/2014/main" id="{DA58C09A-70C3-4A0C-A412-EC301BC4FEF3}"/>
+              </a:ext>
+            </a:extLst>
+          </p:cNvPr>
+          <p:cNvCxnSpPr>
+            <a:cxnSpLocks/>
+            <a:stCxn id="26" idx="3"/>
+            <a:endCxn id="27" idx="1"/>
+          </p:cNvCxnSpPr>
+          <p:nvPr/>
+        </p:nvCxnSpPr>
+        <p:spPr>
+          <a:xfrm>
+            <a:off x="6488138" y="3155037"/>
+            <a:ext cx="3182728" cy="37373"/>
+          </a:xfrm>
+          <a:prstGeom prst="straightConnector1">
+            <a:avLst/>
+          </a:prstGeom>
+          <a:ln w="38100">
+            <a:solidFill>
+              <a:schemeClr val="bg1">
+                <a:lumMod val="50000"/>
+              </a:schemeClr>
+            </a:solidFill>
+            <a:tailEnd type="triangle"/>
+          </a:ln>
+        </p:spPr>
+        <p:style>
+          <a:lnRef idx="1">
+            <a:schemeClr val="accent1"/>
+          </a:lnRef>
+          <a:fillRef idx="0">
+            <a:schemeClr val="accent1"/>
+          </a:fillRef>
+          <a:effectRef idx="0">
+            <a:schemeClr val="accent1"/>
+          </a:effectRef>
+          <a:fontRef idx="minor">
+            <a:schemeClr val="tx1"/>
+          </a:fontRef>
+        </p:style>
+      </p:cxnSp>
+      <p:sp>
+        <p:nvSpPr>
+          <p:cNvPr id="22" name="TextBox 21">
+            <a:extLst>
+              <a:ext uri="{FF2B5EF4-FFF2-40B4-BE49-F238E27FC236}">
+                <a16:creationId xmlns:a16="http://schemas.microsoft.com/office/drawing/2014/main" id="{F5672FCB-4D22-4A12-9A79-81003E471F45}"/>
+              </a:ext>
+            </a:extLst>
+          </p:cNvPr>
+          <p:cNvSpPr txBox="1"/>
+          <p:nvPr/>
+        </p:nvSpPr>
+        <p:spPr>
+          <a:xfrm>
+            <a:off x="7690692" y="2785705"/>
+            <a:ext cx="1372360" cy="369332"/>
+          </a:xfrm>
+          <a:prstGeom prst="rect">
+            <a:avLst/>
+          </a:prstGeom>
+          <a:noFill/>
+        </p:spPr>
+        <p:txBody>
+          <a:bodyPr wrap="square" rtlCol="0">
+            <a:spAutoFit/>
+          </a:bodyPr>
+          <a:lstStyle/>
+          <a:p>
+            <a:pPr algn="ctr"/>
+            <a:r>
+              <a:rPr lang="en-US" altLang="ko-KR" dirty="0">
+                <a:latin typeface="나눔스퀘어 ExtraBold" panose="020B0600000101010101" pitchFamily="50" charset="-127"/>
+                <a:ea typeface="나눔스퀘어 ExtraBold" panose="020B0600000101010101" pitchFamily="50" charset="-127"/>
+              </a:rPr>
+              <a:t>4.flush</a:t>
+            </a:r>
+            <a:endParaRPr lang="ko-KR" altLang="en-US" dirty="0">
+              <a:latin typeface="나눔스퀘어 ExtraBold" panose="020B0600000101010101" pitchFamily="50" charset="-127"/>
+              <a:ea typeface="나눔스퀘어 ExtraBold" panose="020B0600000101010101" pitchFamily="50" charset="-127"/>
+            </a:endParaRPr>
+          </a:p>
+        </p:txBody>
+      </p:sp>
+      <p:sp>
+        <p:nvSpPr>
+          <p:cNvPr id="16" name="TextBox 15">
+            <a:extLst>
+              <a:ext uri="{FF2B5EF4-FFF2-40B4-BE49-F238E27FC236}">
+                <a16:creationId xmlns:a16="http://schemas.microsoft.com/office/drawing/2014/main" id="{86FB98DE-685B-4C2E-9581-C305FC415705}"/>
+              </a:ext>
+            </a:extLst>
+          </p:cNvPr>
+          <p:cNvSpPr txBox="1"/>
+          <p:nvPr/>
+        </p:nvSpPr>
+        <p:spPr>
+          <a:xfrm>
+            <a:off x="1209046" y="4643035"/>
+            <a:ext cx="3527399" cy="646331"/>
+          </a:xfrm>
+          <a:prstGeom prst="rect">
+            <a:avLst/>
+          </a:prstGeom>
+          <a:noFill/>
+        </p:spPr>
+        <p:txBody>
+          <a:bodyPr wrap="square" rtlCol="0">
+            <a:spAutoFit/>
+          </a:bodyPr>
+          <a:lstStyle/>
+          <a:p>
+            <a:pPr algn="ctr"/>
+            <a:r>
+              <a:rPr lang="en-US" altLang="ko-KR" dirty="0">
+                <a:latin typeface="나눔스퀘어 ExtraBold" panose="020B0600000101010101" pitchFamily="50" charset="-127"/>
+                <a:ea typeface="나눔스퀘어 ExtraBold" panose="020B0600000101010101" pitchFamily="50" charset="-127"/>
+              </a:rPr>
+              <a:t>2. </a:t>
+            </a:r>
+            <a:r>
+              <a:rPr lang="ko-KR" altLang="en-US" dirty="0">
+                <a:latin typeface="나눔스퀘어 ExtraBold" panose="020B0600000101010101" pitchFamily="50" charset="-127"/>
+                <a:ea typeface="나눔스퀘어 ExtraBold" panose="020B0600000101010101" pitchFamily="50" charset="-127"/>
+              </a:rPr>
+              <a:t>스냅샷과 비교하여 엔티티에서 변경 내용이 있는지 확인한다</a:t>
+            </a:r>
+            <a:r>
+              <a:rPr lang="en-US" altLang="ko-KR" dirty="0">
+                <a:latin typeface="나눔스퀘어 ExtraBold" panose="020B0600000101010101" pitchFamily="50" charset="-127"/>
+                <a:ea typeface="나눔스퀘어 ExtraBold" panose="020B0600000101010101" pitchFamily="50" charset="-127"/>
+              </a:rPr>
+              <a:t>.</a:t>
+            </a:r>
+            <a:endParaRPr lang="ko-KR" altLang="en-US" dirty="0">
+              <a:latin typeface="나눔스퀘어 ExtraBold" panose="020B0600000101010101" pitchFamily="50" charset="-127"/>
+              <a:ea typeface="나눔스퀘어 ExtraBold" panose="020B0600000101010101" pitchFamily="50" charset="-127"/>
+            </a:endParaRPr>
+          </a:p>
+        </p:txBody>
+      </p:sp>
+      <p:sp>
+        <p:nvSpPr>
+          <p:cNvPr id="19" name="TextBox 18">
+            <a:extLst>
+              <a:ext uri="{FF2B5EF4-FFF2-40B4-BE49-F238E27FC236}">
+                <a16:creationId xmlns:a16="http://schemas.microsoft.com/office/drawing/2014/main" id="{1A4ED2E0-1851-46F0-BBA6-84109F6CA615}"/>
+              </a:ext>
+            </a:extLst>
+          </p:cNvPr>
+          <p:cNvSpPr txBox="1"/>
+          <p:nvPr/>
+        </p:nvSpPr>
+        <p:spPr>
+          <a:xfrm>
+            <a:off x="3429963" y="2024407"/>
+            <a:ext cx="3743191" cy="646331"/>
+          </a:xfrm>
+          <a:prstGeom prst="rect">
+            <a:avLst/>
+          </a:prstGeom>
+          <a:noFill/>
+        </p:spPr>
+        <p:txBody>
+          <a:bodyPr wrap="square" rtlCol="0">
+            <a:spAutoFit/>
+          </a:bodyPr>
+          <a:lstStyle/>
+          <a:p>
+            <a:pPr algn="ctr"/>
+            <a:r>
+              <a:rPr lang="en-US" altLang="ko-KR" dirty="0">
+                <a:latin typeface="나눔스퀘어 ExtraBold" panose="020B0600000101010101" pitchFamily="50" charset="-127"/>
+                <a:ea typeface="나눔스퀘어 ExtraBold" panose="020B0600000101010101" pitchFamily="50" charset="-127"/>
+              </a:rPr>
+              <a:t>3. </a:t>
+            </a:r>
+            <a:r>
+              <a:rPr lang="ko-KR" altLang="en-US" dirty="0">
+                <a:latin typeface="나눔스퀘어 ExtraBold" panose="020B0600000101010101" pitchFamily="50" charset="-127"/>
+                <a:ea typeface="나눔스퀘어 ExtraBold" panose="020B0600000101010101" pitchFamily="50" charset="-127"/>
+              </a:rPr>
+              <a:t>변경 내용이 있으면 </a:t>
+            </a:r>
+            <a:r>
+              <a:rPr lang="en-US" altLang="ko-KR" dirty="0">
+                <a:latin typeface="나눔스퀘어 ExtraBold" panose="020B0600000101010101" pitchFamily="50" charset="-127"/>
+                <a:ea typeface="나눔스퀘어 ExtraBold" panose="020B0600000101010101" pitchFamily="50" charset="-127"/>
+              </a:rPr>
+              <a:t>Update</a:t>
+            </a:r>
+            <a:br>
+              <a:rPr lang="en-US" altLang="ko-KR" dirty="0">
+                <a:latin typeface="나눔스퀘어 ExtraBold" panose="020B0600000101010101" pitchFamily="50" charset="-127"/>
+                <a:ea typeface="나눔스퀘어 ExtraBold" panose="020B0600000101010101" pitchFamily="50" charset="-127"/>
+              </a:rPr>
+            </a:br>
+            <a:r>
+              <a:rPr lang="ko-KR" altLang="en-US" dirty="0">
+                <a:latin typeface="나눔스퀘어 ExtraBold" panose="020B0600000101010101" pitchFamily="50" charset="-127"/>
+                <a:ea typeface="나눔스퀘어 ExtraBold" panose="020B0600000101010101" pitchFamily="50" charset="-127"/>
+              </a:rPr>
+              <a:t>쿼리를 생성하여 저장소에 저장한다</a:t>
+            </a:r>
+            <a:r>
+              <a:rPr lang="en-US" altLang="ko-KR" dirty="0">
+                <a:latin typeface="나눔스퀘어 ExtraBold" panose="020B0600000101010101" pitchFamily="50" charset="-127"/>
+                <a:ea typeface="나눔스퀘어 ExtraBold" panose="020B0600000101010101" pitchFamily="50" charset="-127"/>
+              </a:rPr>
+              <a:t>.</a:t>
+            </a:r>
+            <a:endParaRPr lang="ko-KR" altLang="en-US" dirty="0">
+              <a:latin typeface="나눔스퀘어 ExtraBold" panose="020B0600000101010101" pitchFamily="50" charset="-127"/>
+              <a:ea typeface="나눔스퀘어 ExtraBold" panose="020B0600000101010101" pitchFamily="50" charset="-127"/>
+            </a:endParaRPr>
+          </a:p>
+        </p:txBody>
+      </p:sp>
+      <p:sp>
+        <p:nvSpPr>
+          <p:cNvPr id="4" name="직사각형 3">
+            <a:extLst>
+              <a:ext uri="{FF2B5EF4-FFF2-40B4-BE49-F238E27FC236}">
+                <a16:creationId xmlns:a16="http://schemas.microsoft.com/office/drawing/2014/main" id="{446B388E-05ED-4C37-A323-7B911E66776C}"/>
+              </a:ext>
+            </a:extLst>
+          </p:cNvPr>
+          <p:cNvSpPr/>
+          <p:nvPr/>
+        </p:nvSpPr>
+        <p:spPr>
+          <a:xfrm>
+            <a:off x="7173154" y="4251018"/>
+            <a:ext cx="2338405" cy="369328"/>
+          </a:xfrm>
+          <a:prstGeom prst="rect">
+            <a:avLst/>
+          </a:prstGeom>
+        </p:spPr>
+        <p:txBody>
+          <a:bodyPr wrap="square">
+            <a:spAutoFit/>
+          </a:bodyPr>
+          <a:lstStyle/>
+          <a:p>
+            <a:pPr algn="ctr"/>
+            <a:r>
+              <a:rPr lang="en-US" altLang="ko-KR" dirty="0">
+                <a:latin typeface="나눔스퀘어 ExtraBold" panose="020B0600000101010101" pitchFamily="50" charset="-127"/>
+                <a:ea typeface="나눔스퀘어 ExtraBold" panose="020B0600000101010101" pitchFamily="50" charset="-127"/>
+              </a:rPr>
+              <a:t>5. commit</a:t>
+            </a:r>
+            <a:endParaRPr lang="ko-KR" altLang="en-US" dirty="0">
+              <a:latin typeface="나눔스퀘어 ExtraBold" panose="020B0600000101010101" pitchFamily="50" charset="-127"/>
+              <a:ea typeface="나눔스퀘어 ExtraBold" panose="020B0600000101010101" pitchFamily="50" charset="-127"/>
+            </a:endParaRPr>
+          </a:p>
+        </p:txBody>
+      </p:sp>
+      <p:sp>
+        <p:nvSpPr>
+          <p:cNvPr id="26" name="순서도: 대체 처리 25">
+            <a:extLst>
+              <a:ext uri="{FF2B5EF4-FFF2-40B4-BE49-F238E27FC236}">
+                <a16:creationId xmlns:a16="http://schemas.microsoft.com/office/drawing/2014/main" id="{75512234-A72D-479F-BF4C-18D5515CCEAB}"/>
+              </a:ext>
+            </a:extLst>
+          </p:cNvPr>
+          <p:cNvSpPr/>
+          <p:nvPr/>
+        </p:nvSpPr>
+        <p:spPr>
+          <a:xfrm>
+            <a:off x="4609911" y="2737538"/>
+            <a:ext cx="1878227" cy="834998"/>
+          </a:xfrm>
+          <a:prstGeom prst="flowChartAlternateProcess">
+            <a:avLst/>
+          </a:prstGeom>
+          <a:solidFill>
+            <a:schemeClr val="bg1">
+              <a:lumMod val="85000"/>
+            </a:schemeClr>
+          </a:solidFill>
+          <a:ln w="28575">
+            <a:solidFill>
+              <a:schemeClr val="bg1">
+                <a:lumMod val="50000"/>
+              </a:schemeClr>
+            </a:solidFill>
+          </a:ln>
+        </p:spPr>
+        <p:style>
+          <a:lnRef idx="2">
+            <a:schemeClr val="accent1">
+              <a:shade val="50000"/>
+            </a:schemeClr>
+          </a:lnRef>
+          <a:fillRef idx="1">
+            <a:schemeClr val="accent1"/>
+          </a:fillRef>
+          <a:effectRef idx="0">
+            <a:schemeClr val="accent1"/>
+          </a:effectRef>
+          <a:fontRef idx="minor">
+            <a:schemeClr val="lt1"/>
+          </a:fontRef>
+        </p:style>
+        <p:txBody>
+          <a:bodyPr rtlCol="0" anchor="ctr"/>
+          <a:lstStyle/>
+          <a:p>
+            <a:pPr algn="ctr"/>
+            <a:r>
+              <a:rPr lang="en-US" altLang="ko-KR" dirty="0">
+                <a:solidFill>
+                  <a:schemeClr val="tx1"/>
+                </a:solidFill>
+              </a:rPr>
+              <a:t>Update SQL</a:t>
+            </a:r>
+            <a:endParaRPr lang="ko-KR" altLang="en-US" dirty="0">
+              <a:solidFill>
+                <a:schemeClr val="tx1"/>
+              </a:solidFill>
+            </a:endParaRPr>
+          </a:p>
+        </p:txBody>
+      </p:sp>
+      <p:sp>
+        <p:nvSpPr>
+          <p:cNvPr id="27" name="순서도: 대체 처리 26">
+            <a:extLst>
+              <a:ext uri="{FF2B5EF4-FFF2-40B4-BE49-F238E27FC236}">
+                <a16:creationId xmlns:a16="http://schemas.microsoft.com/office/drawing/2014/main" id="{9096A7C1-9E02-4B85-86EC-D68C8B59534A}"/>
+              </a:ext>
+            </a:extLst>
+          </p:cNvPr>
+          <p:cNvSpPr/>
+          <p:nvPr/>
+        </p:nvSpPr>
+        <p:spPr>
+          <a:xfrm>
+            <a:off x="9670866" y="2774911"/>
+            <a:ext cx="1878227" cy="834998"/>
+          </a:xfrm>
+          <a:prstGeom prst="flowChartAlternateProcess">
+            <a:avLst/>
+          </a:prstGeom>
+          <a:solidFill>
+            <a:schemeClr val="bg1">
+              <a:lumMod val="85000"/>
+            </a:schemeClr>
+          </a:solidFill>
+          <a:ln w="28575">
+            <a:solidFill>
+              <a:schemeClr val="bg1">
+                <a:lumMod val="50000"/>
+              </a:schemeClr>
+            </a:solidFill>
+          </a:ln>
+        </p:spPr>
+        <p:style>
+          <a:lnRef idx="2">
+            <a:schemeClr val="accent1">
+              <a:shade val="50000"/>
+            </a:schemeClr>
+          </a:lnRef>
+          <a:fillRef idx="1">
+            <a:schemeClr val="accent1"/>
+          </a:fillRef>
+          <a:effectRef idx="0">
+            <a:schemeClr val="accent1"/>
+          </a:effectRef>
+          <a:fontRef idx="minor">
+            <a:schemeClr val="lt1"/>
+          </a:fontRef>
+        </p:style>
+        <p:txBody>
+          <a:bodyPr rtlCol="0" anchor="ctr"/>
+          <a:lstStyle/>
+          <a:p>
+            <a:pPr algn="ctr"/>
+            <a:r>
+              <a:rPr lang="en-US" altLang="ko-KR" dirty="0">
+                <a:solidFill>
+                  <a:schemeClr val="tx1"/>
+                </a:solidFill>
+              </a:rPr>
+              <a:t>Update SQL</a:t>
+            </a:r>
+            <a:endParaRPr lang="ko-KR" altLang="en-US" dirty="0">
+              <a:solidFill>
+                <a:schemeClr val="tx1"/>
+              </a:solidFill>
+            </a:endParaRPr>
+          </a:p>
+        </p:txBody>
+      </p:sp>
+      <p:cxnSp>
+        <p:nvCxnSpPr>
+          <p:cNvPr id="28" name="직선 화살표 연결선 27">
+            <a:extLst>
+              <a:ext uri="{FF2B5EF4-FFF2-40B4-BE49-F238E27FC236}">
+                <a16:creationId xmlns:a16="http://schemas.microsoft.com/office/drawing/2014/main" id="{3A817C10-F0BE-4F3A-A82A-B55125B9ABC6}"/>
+              </a:ext>
+            </a:extLst>
+          </p:cNvPr>
+          <p:cNvCxnSpPr>
+            <a:cxnSpLocks/>
+          </p:cNvCxnSpPr>
+          <p:nvPr/>
+        </p:nvCxnSpPr>
+        <p:spPr>
+          <a:xfrm>
+            <a:off x="7376984" y="4729367"/>
+            <a:ext cx="2137152" cy="0"/>
+          </a:xfrm>
+          <a:prstGeom prst="straightConnector1">
+            <a:avLst/>
+          </a:prstGeom>
+          <a:ln w="38100">
+            <a:solidFill>
+              <a:schemeClr val="bg1">
+                <a:lumMod val="50000"/>
+              </a:schemeClr>
+            </a:solidFill>
+            <a:tailEnd type="triangle"/>
+          </a:ln>
+        </p:spPr>
+        <p:style>
+          <a:lnRef idx="1">
+            <a:schemeClr val="accent1"/>
+          </a:lnRef>
+          <a:fillRef idx="0">
+            <a:schemeClr val="accent1"/>
+          </a:fillRef>
+          <a:effectRef idx="0">
+            <a:schemeClr val="accent1"/>
+          </a:effectRef>
+          <a:fontRef idx="minor">
+            <a:schemeClr val="tx1"/>
+          </a:fontRef>
+        </p:style>
+      </p:cxnSp>
+    </p:spTree>
+    <p:extLst>
+      <p:ext uri="{BB962C8B-B14F-4D97-AF65-F5344CB8AC3E}">
+        <p14:creationId xmlns:p14="http://schemas.microsoft.com/office/powerpoint/2010/main" val="1209344267"/>
+      </p:ext>
+    </p:extLst>
+  </p:cSld>
+  <p:clrMapOvr>
+    <a:masterClrMapping/>
+  </p:clrMapOvr>
+</p:sld>
+</file>
+
 <file path=ppt/theme/theme1.xml><?xml version="1.0" encoding="utf-8"?>
 <a:theme xmlns:a="http://schemas.openxmlformats.org/drawingml/2006/main" name="Office 테마">
   <a:themeElements>
@@ -5814,4 +9077,299 @@
     </a:ext>
   </a:extLst>
 </a:theme>
+</file>
+
+<file path=ppt/theme/theme2.xml><?xml version="1.0" encoding="utf-8"?>
+<a:theme xmlns:a="http://schemas.openxmlformats.org/drawingml/2006/main" name="Office 테마">
+  <a:themeElements>
+    <a:clrScheme name="Office">
+      <a:dk1>
+        <a:sysClr val="windowText" lastClr="000000"/>
+      </a:dk1>
+      <a:lt1>
+        <a:sysClr val="window" lastClr="FFFFFF"/>
+      </a:lt1>
+      <a:dk2>
+        <a:srgbClr val="44546A"/>
+      </a:dk2>
+      <a:lt2>
+        <a:srgbClr val="E7E6E6"/>
+      </a:lt2>
+      <a:accent1>
+        <a:srgbClr val="4472C4"/>
+      </a:accent1>
+      <a:accent2>
+        <a:srgbClr val="ED7D31"/>
+      </a:accent2>
+      <a:accent3>
+        <a:srgbClr val="A5A5A5"/>
+      </a:accent3>
+      <a:accent4>
+        <a:srgbClr val="FFC000"/>
+      </a:accent4>
+      <a:accent5>
+        <a:srgbClr val="5B9BD5"/>
+      </a:accent5>
+      <a:accent6>
+        <a:srgbClr val="70AD47"/>
+      </a:accent6>
+      <a:hlink>
+        <a:srgbClr val="0563C1"/>
+      </a:hlink>
+      <a:folHlink>
+        <a:srgbClr val="954F72"/>
+      </a:folHlink>
+    </a:clrScheme>
+    <a:fontScheme name="Office">
+      <a:majorFont>
+        <a:latin typeface="맑은 고딕" panose="020F0302020204030204"/>
+        <a:ea typeface=""/>
+        <a:cs typeface=""/>
+        <a:font script="Jpan" typeface="游ゴシック Light"/>
+        <a:font script="Hang" typeface="맑은 고딕"/>
+        <a:font script="Hans" typeface="等线 Light"/>
+        <a:font script="Hant" typeface="新細明體"/>
+        <a:font script="Arab" typeface="Times New Roman"/>
+        <a:font script="Hebr" typeface="Times New Roman"/>
+        <a:font script="Thai" typeface="Angsana New"/>
+        <a:font script="Ethi" typeface="Nyala"/>
+        <a:font script="Beng" typeface="Vrinda"/>
+        <a:font script="Gujr" typeface="Shruti"/>
+        <a:font script="Khmr" typeface="MoolBoran"/>
+        <a:font script="Knda" typeface="Tunga"/>
+        <a:font script="Guru" typeface="Raavi"/>
+        <a:font script="Cans" typeface="Euphemia"/>
+        <a:font script="Cher" typeface="Plantagenet Cherokee"/>
+        <a:font script="Yiii" typeface="Microsoft Yi Baiti"/>
+        <a:font script="Tibt" typeface="Microsoft Himalaya"/>
+        <a:font script="Thaa" typeface="MV Boli"/>
+        <a:font script="Deva" typeface="Mangal"/>
+        <a:font script="Telu" typeface="Gautami"/>
+        <a:font script="Taml" typeface="Latha"/>
+        <a:font script="Syrc" typeface="Estrangelo Edessa"/>
+        <a:font script="Orya" typeface="Kalinga"/>
+        <a:font script="Mlym" typeface="Kartika"/>
+        <a:font script="Laoo" typeface="DokChampa"/>
+        <a:font script="Sinh" typeface="Iskoola Pota"/>
+        <a:font script="Mong" typeface="Mongolian Baiti"/>
+        <a:font script="Viet" typeface="Times New Roman"/>
+        <a:font script="Uigh" typeface="Microsoft Uighur"/>
+        <a:font script="Geor" typeface="Sylfaen"/>
+        <a:font script="Armn" typeface="Arial"/>
+        <a:font script="Bugi" typeface="Leelawadee UI"/>
+        <a:font script="Bopo" typeface="Microsoft JhengHei"/>
+        <a:font script="Java" typeface="Javanese Text"/>
+        <a:font script="Lisu" typeface="Segoe UI"/>
+        <a:font script="Mymr" typeface="Myanmar Text"/>
+        <a:font script="Nkoo" typeface="Ebrima"/>
+        <a:font script="Olck" typeface="Nirmala UI"/>
+        <a:font script="Osma" typeface="Ebrima"/>
+        <a:font script="Phag" typeface="Phagspa"/>
+        <a:font script="Syrn" typeface="Estrangelo Edessa"/>
+        <a:font script="Syrj" typeface="Estrangelo Edessa"/>
+        <a:font script="Syre" typeface="Estrangelo Edessa"/>
+        <a:font script="Sora" typeface="Nirmala UI"/>
+        <a:font script="Tale" typeface="Microsoft Tai Le"/>
+        <a:font script="Talu" typeface="Microsoft New Tai Lue"/>
+        <a:font script="Tfng" typeface="Ebrima"/>
+      </a:majorFont>
+      <a:minorFont>
+        <a:latin typeface="맑은 고딕" panose="020F0502020204030204"/>
+        <a:ea typeface=""/>
+        <a:cs typeface=""/>
+        <a:font script="Jpan" typeface="游ゴシック"/>
+        <a:font script="Hang" typeface="맑은 고딕"/>
+        <a:font script="Hans" typeface="等线"/>
+        <a:font script="Hant" typeface="新細明體"/>
+        <a:font script="Arab" typeface="Arial"/>
+        <a:font script="Hebr" typeface="Arial"/>
+        <a:font script="Thai" typeface="Cordia New"/>
+        <a:font script="Ethi" typeface="Nyala"/>
+        <a:font script="Beng" typeface="Vrinda"/>
+        <a:font script="Gujr" typeface="Shruti"/>
+        <a:font script="Khmr" typeface="DaunPenh"/>
+        <a:font script="Knda" typeface="Tunga"/>
+        <a:font script="Guru" typeface="Raavi"/>
+        <a:font script="Cans" typeface="Euphemia"/>
+        <a:font script="Cher" typeface="Plantagenet Cherokee"/>
+        <a:font script="Yiii" typeface="Microsoft Yi Baiti"/>
+        <a:font script="Tibt" typeface="Microsoft Himalaya"/>
+        <a:font script="Thaa" typeface="MV Boli"/>
+        <a:font script="Deva" typeface="Mangal"/>
+        <a:font script="Telu" typeface="Gautami"/>
+        <a:font script="Taml" typeface="Latha"/>
+        <a:font script="Syrc" typeface="Estrangelo Edessa"/>
+        <a:font script="Orya" typeface="Kalinga"/>
+        <a:font script="Mlym" typeface="Kartika"/>
+        <a:font script="Laoo" typeface="DokChampa"/>
+        <a:font script="Sinh" typeface="Iskoola Pota"/>
+        <a:font script="Mong" typeface="Mongolian Baiti"/>
+        <a:font script="Viet" typeface="Arial"/>
+        <a:font script="Uigh" typeface="Microsoft Uighur"/>
+        <a:font script="Geor" typeface="Sylfaen"/>
+        <a:font script="Armn" typeface="Arial"/>
+        <a:font script="Bugi" typeface="Leelawadee UI"/>
+        <a:font script="Bopo" typeface="Microsoft JhengHei"/>
+        <a:font script="Java" typeface="Javanese Text"/>
+        <a:font script="Lisu" typeface="Segoe UI"/>
+        <a:font script="Mymr" typeface="Myanmar Text"/>
+        <a:font script="Nkoo" typeface="Ebrima"/>
+        <a:font script="Olck" typeface="Nirmala UI"/>
+        <a:font script="Osma" typeface="Ebrima"/>
+        <a:font script="Phag" typeface="Phagspa"/>
+        <a:font script="Syrn" typeface="Estrangelo Edessa"/>
+        <a:font script="Syrj" typeface="Estrangelo Edessa"/>
+        <a:font script="Syre" typeface="Estrangelo Edessa"/>
+        <a:font script="Sora" typeface="Nirmala UI"/>
+        <a:font script="Tale" typeface="Microsoft Tai Le"/>
+        <a:font script="Talu" typeface="Microsoft New Tai Lue"/>
+        <a:font script="Tfng" typeface="Ebrima"/>
+      </a:minorFont>
+    </a:fontScheme>
+    <a:fmtScheme name="Office">
+      <a:fillStyleLst>
+        <a:solidFill>
+          <a:schemeClr val="phClr"/>
+        </a:solidFill>
+        <a:gradFill rotWithShape="1">
+          <a:gsLst>
+            <a:gs pos="0">
+              <a:schemeClr val="phClr">
+                <a:lumMod val="110000"/>
+                <a:satMod val="105000"/>
+                <a:tint val="67000"/>
+              </a:schemeClr>
+            </a:gs>
+            <a:gs pos="50000">
+              <a:schemeClr val="phClr">
+                <a:lumMod val="105000"/>
+                <a:satMod val="103000"/>
+                <a:tint val="73000"/>
+              </a:schemeClr>
+            </a:gs>
+            <a:gs pos="100000">
+              <a:schemeClr val="phClr">
+                <a:lumMod val="105000"/>
+                <a:satMod val="109000"/>
+                <a:tint val="81000"/>
+              </a:schemeClr>
+            </a:gs>
+          </a:gsLst>
+          <a:lin ang="5400000" scaled="0"/>
+        </a:gradFill>
+        <a:gradFill rotWithShape="1">
+          <a:gsLst>
+            <a:gs pos="0">
+              <a:schemeClr val="phClr">
+                <a:satMod val="103000"/>
+                <a:lumMod val="102000"/>
+                <a:tint val="94000"/>
+              </a:schemeClr>
+            </a:gs>
+            <a:gs pos="50000">
+              <a:schemeClr val="phClr">
+                <a:satMod val="110000"/>
+                <a:lumMod val="100000"/>
+                <a:shade val="100000"/>
+              </a:schemeClr>
+            </a:gs>
+            <a:gs pos="100000">
+              <a:schemeClr val="phClr">
+                <a:lumMod val="99000"/>
+                <a:satMod val="120000"/>
+                <a:shade val="78000"/>
+              </a:schemeClr>
+            </a:gs>
+          </a:gsLst>
+          <a:lin ang="5400000" scaled="0"/>
+        </a:gradFill>
+      </a:fillStyleLst>
+      <a:lnStyleLst>
+        <a:ln w="6350" cap="flat" cmpd="sng" algn="ctr">
+          <a:solidFill>
+            <a:schemeClr val="phClr"/>
+          </a:solidFill>
+          <a:prstDash val="solid"/>
+          <a:miter lim="800000"/>
+        </a:ln>
+        <a:ln w="12700" cap="flat" cmpd="sng" algn="ctr">
+          <a:solidFill>
+            <a:schemeClr val="phClr"/>
+          </a:solidFill>
+          <a:prstDash val="solid"/>
+          <a:miter lim="800000"/>
+        </a:ln>
+        <a:ln w="19050" cap="flat" cmpd="sng" algn="ctr">
+          <a:solidFill>
+            <a:schemeClr val="phClr"/>
+          </a:solidFill>
+          <a:prstDash val="solid"/>
+          <a:miter lim="800000"/>
+        </a:ln>
+      </a:lnStyleLst>
+      <a:effectStyleLst>
+        <a:effectStyle>
+          <a:effectLst/>
+        </a:effectStyle>
+        <a:effectStyle>
+          <a:effectLst/>
+        </a:effectStyle>
+        <a:effectStyle>
+          <a:effectLst>
+            <a:outerShdw blurRad="57150" dist="19050" dir="5400000" algn="ctr" rotWithShape="0">
+              <a:srgbClr val="000000">
+                <a:alpha val="63000"/>
+              </a:srgbClr>
+            </a:outerShdw>
+          </a:effectLst>
+        </a:effectStyle>
+      </a:effectStyleLst>
+      <a:bgFillStyleLst>
+        <a:solidFill>
+          <a:schemeClr val="phClr"/>
+        </a:solidFill>
+        <a:solidFill>
+          <a:schemeClr val="phClr">
+            <a:tint val="95000"/>
+            <a:satMod val="170000"/>
+          </a:schemeClr>
+        </a:solidFill>
+        <a:gradFill rotWithShape="1">
+          <a:gsLst>
+            <a:gs pos="0">
+              <a:schemeClr val="phClr">
+                <a:tint val="93000"/>
+                <a:satMod val="150000"/>
+                <a:shade val="98000"/>
+                <a:lumMod val="102000"/>
+              </a:schemeClr>
+            </a:gs>
+            <a:gs pos="50000">
+              <a:schemeClr val="phClr">
+                <a:tint val="98000"/>
+                <a:satMod val="130000"/>
+                <a:shade val="90000"/>
+                <a:lumMod val="103000"/>
+              </a:schemeClr>
+            </a:gs>
+            <a:gs pos="100000">
+              <a:schemeClr val="phClr">
+                <a:shade val="63000"/>
+                <a:satMod val="120000"/>
+              </a:schemeClr>
+            </a:gs>
+          </a:gsLst>
+          <a:lin ang="5400000" scaled="0"/>
+        </a:gradFill>
+      </a:bgFillStyleLst>
+    </a:fmtScheme>
+  </a:themeElements>
+  <a:objectDefaults/>
+  <a:extraClrSchemeLst/>
+  <a:extLst>
+    <a:ext uri="{05A4C25C-085E-4340-85A3-A5531E510DB2}">
+      <thm15:themeFamily xmlns:thm15="http://schemas.microsoft.com/office/thememl/2012/main" name="Office Theme" id="{62F939B6-93AF-4DB8-9C6B-D6C7DFDC589F}" vid="{4A3C46E8-61CC-4603-A589-7422A47A8E4A}"/>
+    </a:ext>
+  </a:extLst>
+</a:theme>
 </file>
</xml_diff>

<commit_message>
update JPA Proxy & modify JPA persistence post
</commit_message>
<xml_diff>
--- a/assets/spring/spring.pptx
+++ b/assets/spring/spring.pptx
@@ -5,13 +5,16 @@
     <p:sldMasterId id="2147483648" r:id="rId1"/>
   </p:sldMasterIdLst>
   <p:notesMasterIdLst>
-    <p:notesMasterId r:id="rId6"/>
+    <p:notesMasterId r:id="rId9"/>
   </p:notesMasterIdLst>
   <p:sldIdLst>
     <p:sldId id="256" r:id="rId2"/>
     <p:sldId id="257" r:id="rId3"/>
     <p:sldId id="258" r:id="rId4"/>
     <p:sldId id="259" r:id="rId5"/>
+    <p:sldId id="262" r:id="rId6"/>
+    <p:sldId id="260" r:id="rId7"/>
+    <p:sldId id="261" r:id="rId8"/>
   </p:sldIdLst>
   <p:sldSz cx="12192000" cy="6858000"/>
   <p:notesSz cx="6858000" cy="9144000"/>
@@ -119,10 +122,14 @@
             <p14:sldId id="257"/>
             <p14:sldId id="258"/>
             <p14:sldId id="259"/>
+            <p14:sldId id="262"/>
           </p14:sldIdLst>
         </p14:section>
         <p14:section name="Spring" id="{ED4FC4C4-6DC7-4EF7-A00E-4783D1D6B698}">
-          <p14:sldIdLst/>
+          <p14:sldIdLst>
+            <p14:sldId id="260"/>
+            <p14:sldId id="261"/>
+          </p14:sldIdLst>
         </p14:section>
       </p14:sectionLst>
     </p:ext>
@@ -215,7 +222,7 @@
           <a:p>
             <a:fld id="{21E43087-1E83-4EBB-B2F1-05118D3E9DD8}" type="datetimeFigureOut">
               <a:rPr lang="ko-KR" altLang="en-US" smtClean="0"/>
-              <a:t>2019-04-03</a:t>
+              <a:t>2019-04-04</a:t>
             </a:fld>
             <a:endParaRPr lang="ko-KR" altLang="en-US" dirty="0"/>
           </a:p>
@@ -799,7 +806,7 @@
           <a:lstStyle/>
           <a:p>
             <a:r>
-              <a:rPr lang="en-US" altLang="ko-KR" dirty="0" err="1"/>
+              <a:rPr lang="en-US" altLang="ko-KR" dirty="0"/>
               <a:t>Session.flush</a:t>
             </a:r>
             <a:endParaRPr lang="ko-KR" altLang="en-US" dirty="0"/>
@@ -833,6 +840,270 @@
     <p:extLst>
       <p:ext uri="{BB962C8B-B14F-4D97-AF65-F5344CB8AC3E}">
         <p14:creationId xmlns:p14="http://schemas.microsoft.com/office/powerpoint/2010/main" val="663336474"/>
+      </p:ext>
+    </p:extLst>
+  </p:cSld>
+  <p:clrMapOvr>
+    <a:masterClrMapping/>
+  </p:clrMapOvr>
+</p:notes>
+</file>
+
+<file path=ppt/notesSlides/notesSlide5.xml><?xml version="1.0" encoding="utf-8"?>
+<p:notes xmlns:a="http://schemas.openxmlformats.org/drawingml/2006/main" xmlns:r="http://schemas.openxmlformats.org/officeDocument/2006/relationships" xmlns:p="http://schemas.openxmlformats.org/presentationml/2006/main">
+  <p:cSld>
+    <p:spTree>
+      <p:nvGrpSpPr>
+        <p:cNvPr id="1" name=""/>
+        <p:cNvGrpSpPr/>
+        <p:nvPr/>
+      </p:nvGrpSpPr>
+      <p:grpSpPr>
+        <a:xfrm>
+          <a:off x="0" y="0"/>
+          <a:ext cx="0" cy="0"/>
+          <a:chOff x="0" y="0"/>
+          <a:chExt cx="0" cy="0"/>
+        </a:xfrm>
+      </p:grpSpPr>
+      <p:sp>
+        <p:nvSpPr>
+          <p:cNvPr id="2" name="슬라이드 이미지 개체 틀 1"/>
+          <p:cNvSpPr>
+            <a:spLocks noGrp="1" noRot="1" noChangeAspect="1"/>
+          </p:cNvSpPr>
+          <p:nvPr>
+            <p:ph type="sldImg"/>
+          </p:nvPr>
+        </p:nvSpPr>
+        <p:spPr/>
+      </p:sp>
+      <p:sp>
+        <p:nvSpPr>
+          <p:cNvPr id="3" name="슬라이드 노트 개체 틀 2"/>
+          <p:cNvSpPr>
+            <a:spLocks noGrp="1"/>
+          </p:cNvSpPr>
+          <p:nvPr>
+            <p:ph type="body" idx="1"/>
+          </p:nvPr>
+        </p:nvSpPr>
+        <p:spPr/>
+        <p:txBody>
+          <a:bodyPr/>
+          <a:lstStyle/>
+          <a:p>
+            <a:r>
+              <a:rPr lang="en-US" altLang="ko-KR" dirty="0" err="1"/>
+              <a:t>Session.flush</a:t>
+            </a:r>
+            <a:endParaRPr lang="ko-KR" altLang="en-US" dirty="0"/>
+          </a:p>
+        </p:txBody>
+      </p:sp>
+      <p:sp>
+        <p:nvSpPr>
+          <p:cNvPr id="4" name="슬라이드 번호 개체 틀 3"/>
+          <p:cNvSpPr>
+            <a:spLocks noGrp="1"/>
+          </p:cNvSpPr>
+          <p:nvPr>
+            <p:ph type="sldNum" sz="quarter" idx="5"/>
+          </p:nvPr>
+        </p:nvSpPr>
+        <p:spPr/>
+        <p:txBody>
+          <a:bodyPr/>
+          <a:lstStyle/>
+          <a:p>
+            <a:fld id="{5E44F880-DA34-4F6F-BE1A-465E7F1168D1}" type="slidenum">
+              <a:rPr lang="ko-KR" altLang="en-US" smtClean="0"/>
+              <a:t>5</a:t>
+            </a:fld>
+            <a:endParaRPr lang="ko-KR" altLang="en-US" dirty="0"/>
+          </a:p>
+        </p:txBody>
+      </p:sp>
+    </p:spTree>
+    <p:extLst>
+      <p:ext uri="{BB962C8B-B14F-4D97-AF65-F5344CB8AC3E}">
+        <p14:creationId xmlns:p14="http://schemas.microsoft.com/office/powerpoint/2010/main" val="526571192"/>
+      </p:ext>
+    </p:extLst>
+  </p:cSld>
+  <p:clrMapOvr>
+    <a:masterClrMapping/>
+  </p:clrMapOvr>
+</p:notes>
+</file>
+
+<file path=ppt/notesSlides/notesSlide6.xml><?xml version="1.0" encoding="utf-8"?>
+<p:notes xmlns:a="http://schemas.openxmlformats.org/drawingml/2006/main" xmlns:r="http://schemas.openxmlformats.org/officeDocument/2006/relationships" xmlns:p="http://schemas.openxmlformats.org/presentationml/2006/main">
+  <p:cSld>
+    <p:spTree>
+      <p:nvGrpSpPr>
+        <p:cNvPr id="1" name=""/>
+        <p:cNvGrpSpPr/>
+        <p:nvPr/>
+      </p:nvGrpSpPr>
+      <p:grpSpPr>
+        <a:xfrm>
+          <a:off x="0" y="0"/>
+          <a:ext cx="0" cy="0"/>
+          <a:chOff x="0" y="0"/>
+          <a:chExt cx="0" cy="0"/>
+        </a:xfrm>
+      </p:grpSpPr>
+      <p:sp>
+        <p:nvSpPr>
+          <p:cNvPr id="2" name="슬라이드 이미지 개체 틀 1"/>
+          <p:cNvSpPr>
+            <a:spLocks noGrp="1" noRot="1" noChangeAspect="1"/>
+          </p:cNvSpPr>
+          <p:nvPr>
+            <p:ph type="sldImg"/>
+          </p:nvPr>
+        </p:nvSpPr>
+        <p:spPr/>
+      </p:sp>
+      <p:sp>
+        <p:nvSpPr>
+          <p:cNvPr id="3" name="슬라이드 노트 개체 틀 2"/>
+          <p:cNvSpPr>
+            <a:spLocks noGrp="1"/>
+          </p:cNvSpPr>
+          <p:nvPr>
+            <p:ph type="body" idx="1"/>
+          </p:nvPr>
+        </p:nvSpPr>
+        <p:spPr/>
+        <p:txBody>
+          <a:bodyPr/>
+          <a:lstStyle/>
+          <a:p>
+            <a:r>
+              <a:rPr lang="en-US" altLang="ko-KR" dirty="0"/>
+              <a:t>Session.flush</a:t>
+            </a:r>
+            <a:endParaRPr lang="ko-KR" altLang="en-US" dirty="0"/>
+          </a:p>
+        </p:txBody>
+      </p:sp>
+      <p:sp>
+        <p:nvSpPr>
+          <p:cNvPr id="4" name="슬라이드 번호 개체 틀 3"/>
+          <p:cNvSpPr>
+            <a:spLocks noGrp="1"/>
+          </p:cNvSpPr>
+          <p:nvPr>
+            <p:ph type="sldNum" sz="quarter" idx="5"/>
+          </p:nvPr>
+        </p:nvSpPr>
+        <p:spPr/>
+        <p:txBody>
+          <a:bodyPr/>
+          <a:lstStyle/>
+          <a:p>
+            <a:fld id="{5E44F880-DA34-4F6F-BE1A-465E7F1168D1}" type="slidenum">
+              <a:rPr lang="ko-KR" altLang="en-US" smtClean="0"/>
+              <a:t>6</a:t>
+            </a:fld>
+            <a:endParaRPr lang="ko-KR" altLang="en-US" dirty="0"/>
+          </a:p>
+        </p:txBody>
+      </p:sp>
+    </p:spTree>
+    <p:extLst>
+      <p:ext uri="{BB962C8B-B14F-4D97-AF65-F5344CB8AC3E}">
+        <p14:creationId xmlns:p14="http://schemas.microsoft.com/office/powerpoint/2010/main" val="2831045386"/>
+      </p:ext>
+    </p:extLst>
+  </p:cSld>
+  <p:clrMapOvr>
+    <a:masterClrMapping/>
+  </p:clrMapOvr>
+</p:notes>
+</file>
+
+<file path=ppt/notesSlides/notesSlide7.xml><?xml version="1.0" encoding="utf-8"?>
+<p:notes xmlns:a="http://schemas.openxmlformats.org/drawingml/2006/main" xmlns:r="http://schemas.openxmlformats.org/officeDocument/2006/relationships" xmlns:p="http://schemas.openxmlformats.org/presentationml/2006/main">
+  <p:cSld>
+    <p:spTree>
+      <p:nvGrpSpPr>
+        <p:cNvPr id="1" name=""/>
+        <p:cNvGrpSpPr/>
+        <p:nvPr/>
+      </p:nvGrpSpPr>
+      <p:grpSpPr>
+        <a:xfrm>
+          <a:off x="0" y="0"/>
+          <a:ext cx="0" cy="0"/>
+          <a:chOff x="0" y="0"/>
+          <a:chExt cx="0" cy="0"/>
+        </a:xfrm>
+      </p:grpSpPr>
+      <p:sp>
+        <p:nvSpPr>
+          <p:cNvPr id="2" name="슬라이드 이미지 개체 틀 1"/>
+          <p:cNvSpPr>
+            <a:spLocks noGrp="1" noRot="1" noChangeAspect="1"/>
+          </p:cNvSpPr>
+          <p:nvPr>
+            <p:ph type="sldImg"/>
+          </p:nvPr>
+        </p:nvSpPr>
+        <p:spPr/>
+      </p:sp>
+      <p:sp>
+        <p:nvSpPr>
+          <p:cNvPr id="3" name="슬라이드 노트 개체 틀 2"/>
+          <p:cNvSpPr>
+            <a:spLocks noGrp="1"/>
+          </p:cNvSpPr>
+          <p:nvPr>
+            <p:ph type="body" idx="1"/>
+          </p:nvPr>
+        </p:nvSpPr>
+        <p:spPr/>
+        <p:txBody>
+          <a:bodyPr/>
+          <a:lstStyle/>
+          <a:p>
+            <a:r>
+              <a:rPr lang="en-US" altLang="ko-KR" dirty="0"/>
+              <a:t>Session.flush</a:t>
+            </a:r>
+            <a:endParaRPr lang="ko-KR" altLang="en-US" dirty="0"/>
+          </a:p>
+        </p:txBody>
+      </p:sp>
+      <p:sp>
+        <p:nvSpPr>
+          <p:cNvPr id="4" name="슬라이드 번호 개체 틀 3"/>
+          <p:cNvSpPr>
+            <a:spLocks noGrp="1"/>
+          </p:cNvSpPr>
+          <p:nvPr>
+            <p:ph type="sldNum" sz="quarter" idx="5"/>
+          </p:nvPr>
+        </p:nvSpPr>
+        <p:spPr/>
+        <p:txBody>
+          <a:bodyPr/>
+          <a:lstStyle/>
+          <a:p>
+            <a:fld id="{5E44F880-DA34-4F6F-BE1A-465E7F1168D1}" type="slidenum">
+              <a:rPr lang="ko-KR" altLang="en-US" smtClean="0"/>
+              <a:t>7</a:t>
+            </a:fld>
+            <a:endParaRPr lang="ko-KR" altLang="en-US" dirty="0"/>
+          </a:p>
+        </p:txBody>
+      </p:sp>
+    </p:spTree>
+    <p:extLst>
+      <p:ext uri="{BB962C8B-B14F-4D97-AF65-F5344CB8AC3E}">
+        <p14:creationId xmlns:p14="http://schemas.microsoft.com/office/powerpoint/2010/main" val="2175086796"/>
       </p:ext>
     </p:extLst>
   </p:cSld>
@@ -989,7 +1260,7 @@
           <a:p>
             <a:fld id="{7A8FD7E3-ACFC-42CD-AE31-283EF344AA10}" type="datetimeFigureOut">
               <a:rPr lang="ko-KR" altLang="en-US" smtClean="0"/>
-              <a:t>2019-04-03</a:t>
+              <a:t>2019-04-04</a:t>
             </a:fld>
             <a:endParaRPr lang="ko-KR" altLang="en-US" dirty="0"/>
           </a:p>
@@ -1187,7 +1458,7 @@
           <a:p>
             <a:fld id="{7A8FD7E3-ACFC-42CD-AE31-283EF344AA10}" type="datetimeFigureOut">
               <a:rPr lang="ko-KR" altLang="en-US" smtClean="0"/>
-              <a:t>2019-04-03</a:t>
+              <a:t>2019-04-04</a:t>
             </a:fld>
             <a:endParaRPr lang="ko-KR" altLang="en-US" dirty="0"/>
           </a:p>
@@ -1395,7 +1666,7 @@
           <a:p>
             <a:fld id="{7A8FD7E3-ACFC-42CD-AE31-283EF344AA10}" type="datetimeFigureOut">
               <a:rPr lang="ko-KR" altLang="en-US" smtClean="0"/>
-              <a:t>2019-04-03</a:t>
+              <a:t>2019-04-04</a:t>
             </a:fld>
             <a:endParaRPr lang="ko-KR" altLang="en-US" dirty="0"/>
           </a:p>
@@ -1593,7 +1864,7 @@
           <a:p>
             <a:fld id="{7A8FD7E3-ACFC-42CD-AE31-283EF344AA10}" type="datetimeFigureOut">
               <a:rPr lang="ko-KR" altLang="en-US" smtClean="0"/>
-              <a:t>2019-04-03</a:t>
+              <a:t>2019-04-04</a:t>
             </a:fld>
             <a:endParaRPr lang="ko-KR" altLang="en-US" dirty="0"/>
           </a:p>
@@ -1868,7 +2139,7 @@
           <a:p>
             <a:fld id="{7A8FD7E3-ACFC-42CD-AE31-283EF344AA10}" type="datetimeFigureOut">
               <a:rPr lang="ko-KR" altLang="en-US" smtClean="0"/>
-              <a:t>2019-04-03</a:t>
+              <a:t>2019-04-04</a:t>
             </a:fld>
             <a:endParaRPr lang="ko-KR" altLang="en-US" dirty="0"/>
           </a:p>
@@ -2133,7 +2404,7 @@
           <a:p>
             <a:fld id="{7A8FD7E3-ACFC-42CD-AE31-283EF344AA10}" type="datetimeFigureOut">
               <a:rPr lang="ko-KR" altLang="en-US" smtClean="0"/>
-              <a:t>2019-04-03</a:t>
+              <a:t>2019-04-04</a:t>
             </a:fld>
             <a:endParaRPr lang="ko-KR" altLang="en-US" dirty="0"/>
           </a:p>
@@ -2545,7 +2816,7 @@
           <a:p>
             <a:fld id="{7A8FD7E3-ACFC-42CD-AE31-283EF344AA10}" type="datetimeFigureOut">
               <a:rPr lang="ko-KR" altLang="en-US" smtClean="0"/>
-              <a:t>2019-04-03</a:t>
+              <a:t>2019-04-04</a:t>
             </a:fld>
             <a:endParaRPr lang="ko-KR" altLang="en-US" dirty="0"/>
           </a:p>
@@ -2686,7 +2957,7 @@
           <a:p>
             <a:fld id="{7A8FD7E3-ACFC-42CD-AE31-283EF344AA10}" type="datetimeFigureOut">
               <a:rPr lang="ko-KR" altLang="en-US" smtClean="0"/>
-              <a:t>2019-04-03</a:t>
+              <a:t>2019-04-04</a:t>
             </a:fld>
             <a:endParaRPr lang="ko-KR" altLang="en-US" dirty="0"/>
           </a:p>
@@ -2799,7 +3070,7 @@
           <a:p>
             <a:fld id="{7A8FD7E3-ACFC-42CD-AE31-283EF344AA10}" type="datetimeFigureOut">
               <a:rPr lang="ko-KR" altLang="en-US" smtClean="0"/>
-              <a:t>2019-04-03</a:t>
+              <a:t>2019-04-04</a:t>
             </a:fld>
             <a:endParaRPr lang="ko-KR" altLang="en-US" dirty="0"/>
           </a:p>
@@ -3110,7 +3381,7 @@
           <a:p>
             <a:fld id="{7A8FD7E3-ACFC-42CD-AE31-283EF344AA10}" type="datetimeFigureOut">
               <a:rPr lang="ko-KR" altLang="en-US" smtClean="0"/>
-              <a:t>2019-04-03</a:t>
+              <a:t>2019-04-04</a:t>
             </a:fld>
             <a:endParaRPr lang="ko-KR" altLang="en-US" dirty="0"/>
           </a:p>
@@ -3398,7 +3669,7 @@
           <a:p>
             <a:fld id="{7A8FD7E3-ACFC-42CD-AE31-283EF344AA10}" type="datetimeFigureOut">
               <a:rPr lang="ko-KR" altLang="en-US" smtClean="0"/>
-              <a:t>2019-04-03</a:t>
+              <a:t>2019-04-04</a:t>
             </a:fld>
             <a:endParaRPr lang="ko-KR" altLang="en-US" dirty="0"/>
           </a:p>
@@ -3639,7 +3910,7 @@
           <a:p>
             <a:fld id="{7A8FD7E3-ACFC-42CD-AE31-283EF344AA10}" type="datetimeFigureOut">
               <a:rPr lang="ko-KR" altLang="en-US" smtClean="0"/>
-              <a:t>2019-04-03</a:t>
+              <a:t>2019-04-04</a:t>
             </a:fld>
             <a:endParaRPr lang="ko-KR" altLang="en-US" dirty="0"/>
           </a:p>
@@ -7682,21 +7953,7 @@
                 <a:latin typeface="나눔스퀘어 ExtraBold" panose="020B0600000101010101" pitchFamily="50" charset="-127"/>
                 <a:ea typeface="나눔스퀘어 ExtraBold" panose="020B0600000101010101" pitchFamily="50" charset="-127"/>
               </a:rPr>
-              <a:t>1. </a:t>
-            </a:r>
-            <a:r>
-              <a:rPr lang="en-US" altLang="ko-KR" dirty="0" err="1">
-                <a:latin typeface="나눔스퀘어 ExtraBold" panose="020B0600000101010101" pitchFamily="50" charset="-127"/>
-                <a:ea typeface="나눔스퀘어 ExtraBold" panose="020B0600000101010101" pitchFamily="50" charset="-127"/>
-              </a:rPr>
-              <a:t>session.flush</a:t>
-            </a:r>
-            <a:r>
-              <a:rPr lang="en-US" altLang="ko-KR" dirty="0">
-                <a:latin typeface="나눔스퀘어 ExtraBold" panose="020B0600000101010101" pitchFamily="50" charset="-127"/>
-                <a:ea typeface="나눔스퀘어 ExtraBold" panose="020B0600000101010101" pitchFamily="50" charset="-127"/>
-              </a:rPr>
-              <a:t>()</a:t>
+              <a:t>1. session.flush()</a:t>
             </a:r>
             <a:endParaRPr lang="ko-KR" altLang="en-US" dirty="0">
               <a:latin typeface="나눔스퀘어 ExtraBold" panose="020B0600000101010101" pitchFamily="50" charset="-127"/>
@@ -8775,6 +9032,2625 @@
     <p:extLst>
       <p:ext uri="{BB962C8B-B14F-4D97-AF65-F5344CB8AC3E}">
         <p14:creationId xmlns:p14="http://schemas.microsoft.com/office/powerpoint/2010/main" val="1209344267"/>
+      </p:ext>
+    </p:extLst>
+  </p:cSld>
+  <p:clrMapOvr>
+    <a:masterClrMapping/>
+  </p:clrMapOvr>
+</p:sld>
+</file>
+
+<file path=ppt/slides/slide5.xml><?xml version="1.0" encoding="utf-8"?>
+<p:sld xmlns:a="http://schemas.openxmlformats.org/drawingml/2006/main" xmlns:r="http://schemas.openxmlformats.org/officeDocument/2006/relationships" xmlns:p="http://schemas.openxmlformats.org/presentationml/2006/main">
+  <p:cSld>
+    <p:spTree>
+      <p:nvGrpSpPr>
+        <p:cNvPr id="1" name=""/>
+        <p:cNvGrpSpPr/>
+        <p:nvPr/>
+      </p:nvGrpSpPr>
+      <p:grpSpPr>
+        <a:xfrm>
+          <a:off x="0" y="0"/>
+          <a:ext cx="0" cy="0"/>
+          <a:chOff x="0" y="0"/>
+          <a:chExt cx="0" cy="0"/>
+        </a:xfrm>
+      </p:grpSpPr>
+      <p:sp>
+        <p:nvSpPr>
+          <p:cNvPr id="10" name="직사각형 9">
+            <a:extLst>
+              <a:ext uri="{FF2B5EF4-FFF2-40B4-BE49-F238E27FC236}">
+                <a16:creationId xmlns:a16="http://schemas.microsoft.com/office/drawing/2014/main" id="{29F3B81B-3D40-440F-B7AC-C3B5CFB0A3F5}"/>
+              </a:ext>
+            </a:extLst>
+          </p:cNvPr>
+          <p:cNvSpPr/>
+          <p:nvPr/>
+        </p:nvSpPr>
+        <p:spPr>
+          <a:xfrm>
+            <a:off x="5598933" y="787974"/>
+            <a:ext cx="6295827" cy="3830926"/>
+          </a:xfrm>
+          <a:prstGeom prst="rect">
+            <a:avLst/>
+          </a:prstGeom>
+          <a:solidFill>
+            <a:schemeClr val="bg1">
+              <a:lumMod val="85000"/>
+            </a:schemeClr>
+          </a:solidFill>
+          <a:ln>
+            <a:noFill/>
+          </a:ln>
+        </p:spPr>
+        <p:style>
+          <a:lnRef idx="2">
+            <a:schemeClr val="accent1">
+              <a:shade val="50000"/>
+            </a:schemeClr>
+          </a:lnRef>
+          <a:fillRef idx="1">
+            <a:schemeClr val="accent1"/>
+          </a:fillRef>
+          <a:effectRef idx="0">
+            <a:schemeClr val="accent1"/>
+          </a:effectRef>
+          <a:fontRef idx="minor">
+            <a:schemeClr val="lt1"/>
+          </a:fontRef>
+        </p:style>
+        <p:txBody>
+          <a:bodyPr rtlCol="0" anchor="ctr"/>
+          <a:lstStyle/>
+          <a:p>
+            <a:pPr algn="ctr"/>
+            <a:endParaRPr lang="ko-KR" altLang="en-US" dirty="0">
+              <a:latin typeface="나눔스퀘어 ExtraBold" panose="020B0600000101010101" pitchFamily="50" charset="-127"/>
+              <a:ea typeface="나눔스퀘어 ExtraBold" panose="020B0600000101010101" pitchFamily="50" charset="-127"/>
+            </a:endParaRPr>
+          </a:p>
+        </p:txBody>
+      </p:sp>
+      <p:cxnSp>
+        <p:nvCxnSpPr>
+          <p:cNvPr id="5" name="직선 화살표 연결선 4">
+            <a:extLst>
+              <a:ext uri="{FF2B5EF4-FFF2-40B4-BE49-F238E27FC236}">
+                <a16:creationId xmlns:a16="http://schemas.microsoft.com/office/drawing/2014/main" id="{9E32C43A-A809-4797-9A05-9C4C775DB3B2}"/>
+              </a:ext>
+            </a:extLst>
+          </p:cNvPr>
+          <p:cNvCxnSpPr>
+            <a:cxnSpLocks/>
+          </p:cNvCxnSpPr>
+          <p:nvPr/>
+        </p:nvCxnSpPr>
+        <p:spPr>
+          <a:xfrm>
+            <a:off x="417095" y="4029042"/>
+            <a:ext cx="2187209" cy="0"/>
+          </a:xfrm>
+          <a:prstGeom prst="straightConnector1">
+            <a:avLst/>
+          </a:prstGeom>
+          <a:ln w="38100">
+            <a:solidFill>
+              <a:schemeClr val="bg1">
+                <a:lumMod val="50000"/>
+              </a:schemeClr>
+            </a:solidFill>
+            <a:tailEnd type="triangle"/>
+          </a:ln>
+        </p:spPr>
+        <p:style>
+          <a:lnRef idx="1">
+            <a:schemeClr val="accent1"/>
+          </a:lnRef>
+          <a:fillRef idx="0">
+            <a:schemeClr val="accent1"/>
+          </a:fillRef>
+          <a:effectRef idx="0">
+            <a:schemeClr val="accent1"/>
+          </a:effectRef>
+          <a:fontRef idx="minor">
+            <a:schemeClr val="tx1"/>
+          </a:fontRef>
+        </p:style>
+      </p:cxnSp>
+      <p:sp>
+        <p:nvSpPr>
+          <p:cNvPr id="6" name="TextBox 5">
+            <a:extLst>
+              <a:ext uri="{FF2B5EF4-FFF2-40B4-BE49-F238E27FC236}">
+                <a16:creationId xmlns:a16="http://schemas.microsoft.com/office/drawing/2014/main" id="{608FDBEF-27D8-4593-B29B-D6713BAB1BF8}"/>
+              </a:ext>
+            </a:extLst>
+          </p:cNvPr>
+          <p:cNvSpPr txBox="1"/>
+          <p:nvPr/>
+        </p:nvSpPr>
+        <p:spPr>
+          <a:xfrm>
+            <a:off x="197708" y="3597721"/>
+            <a:ext cx="2324371" cy="369332"/>
+          </a:xfrm>
+          <a:prstGeom prst="rect">
+            <a:avLst/>
+          </a:prstGeom>
+          <a:noFill/>
+        </p:spPr>
+        <p:txBody>
+          <a:bodyPr wrap="square" rtlCol="0">
+            <a:spAutoFit/>
+          </a:bodyPr>
+          <a:lstStyle/>
+          <a:p>
+            <a:pPr algn="ctr"/>
+            <a:r>
+              <a:rPr lang="en-US" altLang="ko-KR" dirty="0">
+                <a:latin typeface="나눔스퀘어 ExtraBold" panose="020B0600000101010101" pitchFamily="50" charset="-127"/>
+                <a:ea typeface="나눔스퀘어 ExtraBold" panose="020B0600000101010101" pitchFamily="50" charset="-127"/>
+              </a:rPr>
+              <a:t>1. book.getTitle()</a:t>
+            </a:r>
+            <a:endParaRPr lang="ko-KR" altLang="en-US" dirty="0">
+              <a:latin typeface="나눔스퀘어 ExtraBold" panose="020B0600000101010101" pitchFamily="50" charset="-127"/>
+              <a:ea typeface="나눔스퀘어 ExtraBold" panose="020B0600000101010101" pitchFamily="50" charset="-127"/>
+            </a:endParaRPr>
+          </a:p>
+        </p:txBody>
+      </p:sp>
+      <p:sp>
+        <p:nvSpPr>
+          <p:cNvPr id="11" name="TextBox 10">
+            <a:extLst>
+              <a:ext uri="{FF2B5EF4-FFF2-40B4-BE49-F238E27FC236}">
+                <a16:creationId xmlns:a16="http://schemas.microsoft.com/office/drawing/2014/main" id="{A7D4FFDB-8112-42C6-825B-A595B2A658F3}"/>
+              </a:ext>
+            </a:extLst>
+          </p:cNvPr>
+          <p:cNvSpPr txBox="1"/>
+          <p:nvPr/>
+        </p:nvSpPr>
+        <p:spPr>
+          <a:xfrm>
+            <a:off x="7690692" y="1001430"/>
+            <a:ext cx="2482870" cy="830997"/>
+          </a:xfrm>
+          <a:prstGeom prst="rect">
+            <a:avLst/>
+          </a:prstGeom>
+          <a:noFill/>
+        </p:spPr>
+        <p:txBody>
+          <a:bodyPr wrap="square" rtlCol="0">
+            <a:spAutoFit/>
+          </a:bodyPr>
+          <a:lstStyle/>
+          <a:p>
+            <a:pPr algn="ctr"/>
+            <a:r>
+              <a:rPr lang="ko-KR" altLang="en-US" sz="2400" dirty="0">
+                <a:latin typeface="나눔스퀘어 ExtraBold" panose="020B0600000101010101" pitchFamily="50" charset="-127"/>
+                <a:ea typeface="나눔스퀘어 ExtraBold" panose="020B0600000101010101" pitchFamily="50" charset="-127"/>
+              </a:rPr>
+              <a:t>영속 컨텍스트</a:t>
+            </a:r>
+            <a:r>
+              <a:rPr lang="en-US" altLang="ko-KR" sz="2400" dirty="0">
+                <a:latin typeface="나눔스퀘어 ExtraBold" panose="020B0600000101010101" pitchFamily="50" charset="-127"/>
+                <a:ea typeface="나눔스퀘어 ExtraBold" panose="020B0600000101010101" pitchFamily="50" charset="-127"/>
+              </a:rPr>
+              <a:t>(Entity</a:t>
+            </a:r>
+            <a:r>
+              <a:rPr lang="ko-KR" altLang="en-US" sz="2400" dirty="0">
+                <a:latin typeface="나눔스퀘어 ExtraBold" panose="020B0600000101010101" pitchFamily="50" charset="-127"/>
+                <a:ea typeface="나눔스퀘어 ExtraBold" panose="020B0600000101010101" pitchFamily="50" charset="-127"/>
+              </a:rPr>
+              <a:t> </a:t>
+            </a:r>
+            <a:r>
+              <a:rPr lang="en-US" altLang="ko-KR" sz="2400" dirty="0">
+                <a:latin typeface="나눔스퀘어 ExtraBold" panose="020B0600000101010101" pitchFamily="50" charset="-127"/>
+                <a:ea typeface="나눔스퀘어 ExtraBold" panose="020B0600000101010101" pitchFamily="50" charset="-127"/>
+              </a:rPr>
+              <a:t>Manger)</a:t>
+            </a:r>
+            <a:endParaRPr lang="ko-KR" altLang="en-US" sz="2400" dirty="0">
+              <a:latin typeface="나눔스퀘어 ExtraBold" panose="020B0600000101010101" pitchFamily="50" charset="-127"/>
+              <a:ea typeface="나눔스퀘어 ExtraBold" panose="020B0600000101010101" pitchFamily="50" charset="-127"/>
+            </a:endParaRPr>
+          </a:p>
+        </p:txBody>
+      </p:sp>
+      <p:sp>
+        <p:nvSpPr>
+          <p:cNvPr id="18" name="순서도: 자기 디스크 17">
+            <a:extLst>
+              <a:ext uri="{FF2B5EF4-FFF2-40B4-BE49-F238E27FC236}">
+                <a16:creationId xmlns:a16="http://schemas.microsoft.com/office/drawing/2014/main" id="{3F9BA157-703E-442E-8BC3-60313DC1949B}"/>
+              </a:ext>
+            </a:extLst>
+          </p:cNvPr>
+          <p:cNvSpPr/>
+          <p:nvPr/>
+        </p:nvSpPr>
+        <p:spPr>
+          <a:xfrm>
+            <a:off x="7651001" y="5177923"/>
+            <a:ext cx="2191689" cy="1353267"/>
+          </a:xfrm>
+          <a:prstGeom prst="flowChartMagneticDisk">
+            <a:avLst/>
+          </a:prstGeom>
+          <a:noFill/>
+          <a:ln w="28575">
+            <a:solidFill>
+              <a:schemeClr val="tx1"/>
+            </a:solidFill>
+          </a:ln>
+        </p:spPr>
+        <p:style>
+          <a:lnRef idx="2">
+            <a:schemeClr val="accent1">
+              <a:shade val="50000"/>
+            </a:schemeClr>
+          </a:lnRef>
+          <a:fillRef idx="1">
+            <a:schemeClr val="accent1"/>
+          </a:fillRef>
+          <a:effectRef idx="0">
+            <a:schemeClr val="accent1"/>
+          </a:effectRef>
+          <a:fontRef idx="minor">
+            <a:schemeClr val="lt1"/>
+          </a:fontRef>
+        </p:style>
+        <p:txBody>
+          <a:bodyPr rtlCol="0" anchor="ctr"/>
+          <a:lstStyle/>
+          <a:p>
+            <a:pPr algn="ctr"/>
+            <a:r>
+              <a:rPr lang="en-US" altLang="ko-KR" dirty="0">
+                <a:solidFill>
+                  <a:schemeClr val="tx1"/>
+                </a:solidFill>
+                <a:latin typeface="나눔스퀘어 ExtraBold" panose="020B0600000101010101" pitchFamily="50" charset="-127"/>
+                <a:ea typeface="나눔스퀘어 ExtraBold" panose="020B0600000101010101" pitchFamily="50" charset="-127"/>
+              </a:rPr>
+              <a:t>DB</a:t>
+            </a:r>
+            <a:endParaRPr lang="ko-KR" altLang="en-US" dirty="0">
+              <a:solidFill>
+                <a:schemeClr val="tx1"/>
+              </a:solidFill>
+              <a:latin typeface="나눔스퀘어 ExtraBold" panose="020B0600000101010101" pitchFamily="50" charset="-127"/>
+              <a:ea typeface="나눔스퀘어 ExtraBold" panose="020B0600000101010101" pitchFamily="50" charset="-127"/>
+            </a:endParaRPr>
+          </a:p>
+        </p:txBody>
+      </p:sp>
+      <p:sp>
+        <p:nvSpPr>
+          <p:cNvPr id="17" name="TextBox 16">
+            <a:extLst>
+              <a:ext uri="{FF2B5EF4-FFF2-40B4-BE49-F238E27FC236}">
+                <a16:creationId xmlns:a16="http://schemas.microsoft.com/office/drawing/2014/main" id="{C3539730-592A-442D-A46A-E696009A7068}"/>
+              </a:ext>
+            </a:extLst>
+          </p:cNvPr>
+          <p:cNvSpPr txBox="1"/>
+          <p:nvPr/>
+        </p:nvSpPr>
+        <p:spPr>
+          <a:xfrm>
+            <a:off x="3635900" y="312154"/>
+            <a:ext cx="4764387" cy="461665"/>
+          </a:xfrm>
+          <a:prstGeom prst="rect">
+            <a:avLst/>
+          </a:prstGeom>
+          <a:noFill/>
+        </p:spPr>
+        <p:txBody>
+          <a:bodyPr wrap="square" rtlCol="0">
+            <a:spAutoFit/>
+          </a:bodyPr>
+          <a:lstStyle/>
+          <a:p>
+            <a:pPr algn="ctr"/>
+            <a:r>
+              <a:rPr lang="en-US" altLang="ko-KR" sz="2400" dirty="0">
+                <a:latin typeface="나눔스퀘어 ExtraBold" panose="020B0600000101010101" pitchFamily="50" charset="-127"/>
+                <a:ea typeface="나눔스퀘어 ExtraBold" panose="020B0600000101010101" pitchFamily="50" charset="-127"/>
+              </a:rPr>
+              <a:t>JPA Proxy</a:t>
+            </a:r>
+            <a:endParaRPr lang="ko-KR" altLang="en-US" sz="2400" dirty="0">
+              <a:latin typeface="나눔스퀘어 ExtraBold" panose="020B0600000101010101" pitchFamily="50" charset="-127"/>
+              <a:ea typeface="나눔스퀘어 ExtraBold" panose="020B0600000101010101" pitchFamily="50" charset="-127"/>
+            </a:endParaRPr>
+          </a:p>
+        </p:txBody>
+      </p:sp>
+      <p:sp>
+        <p:nvSpPr>
+          <p:cNvPr id="16" name="TextBox 15">
+            <a:extLst>
+              <a:ext uri="{FF2B5EF4-FFF2-40B4-BE49-F238E27FC236}">
+                <a16:creationId xmlns:a16="http://schemas.microsoft.com/office/drawing/2014/main" id="{86FB98DE-685B-4C2E-9581-C305FC415705}"/>
+              </a:ext>
+            </a:extLst>
+          </p:cNvPr>
+          <p:cNvSpPr txBox="1"/>
+          <p:nvPr/>
+        </p:nvSpPr>
+        <p:spPr>
+          <a:xfrm>
+            <a:off x="3004079" y="2142044"/>
+            <a:ext cx="3393416" cy="646331"/>
+          </a:xfrm>
+          <a:prstGeom prst="rect">
+            <a:avLst/>
+          </a:prstGeom>
+          <a:noFill/>
+        </p:spPr>
+        <p:txBody>
+          <a:bodyPr wrap="square" rtlCol="0">
+            <a:spAutoFit/>
+          </a:bodyPr>
+          <a:lstStyle/>
+          <a:p>
+            <a:pPr algn="ctr"/>
+            <a:r>
+              <a:rPr lang="en-US" altLang="ko-KR" dirty="0">
+                <a:latin typeface="나눔스퀘어 ExtraBold" panose="020B0600000101010101" pitchFamily="50" charset="-127"/>
+                <a:ea typeface="나눔스퀘어 ExtraBold" panose="020B0600000101010101" pitchFamily="50" charset="-127"/>
+              </a:rPr>
+              <a:t>2. Book </a:t>
+            </a:r>
+            <a:r>
+              <a:rPr lang="ko-KR" altLang="en-US" dirty="0">
+                <a:latin typeface="나눔스퀘어 ExtraBold" panose="020B0600000101010101" pitchFamily="50" charset="-127"/>
+                <a:ea typeface="나눔스퀘어 ExtraBold" panose="020B0600000101010101" pitchFamily="50" charset="-127"/>
+              </a:rPr>
+              <a:t>엔티티를 조회하지만</a:t>
+            </a:r>
+            <a:br>
+              <a:rPr lang="en-US" altLang="ko-KR" dirty="0">
+                <a:latin typeface="나눔스퀘어 ExtraBold" panose="020B0600000101010101" pitchFamily="50" charset="-127"/>
+                <a:ea typeface="나눔스퀘어 ExtraBold" panose="020B0600000101010101" pitchFamily="50" charset="-127"/>
+              </a:rPr>
+            </a:br>
+            <a:r>
+              <a:rPr lang="ko-KR" altLang="en-US" dirty="0">
+                <a:latin typeface="나눔스퀘어 ExtraBold" panose="020B0600000101010101" pitchFamily="50" charset="-127"/>
+                <a:ea typeface="나눔스퀘어 ExtraBold" panose="020B0600000101010101" pitchFamily="50" charset="-127"/>
+              </a:rPr>
+              <a:t>존재하지 않음</a:t>
+            </a:r>
+          </a:p>
+        </p:txBody>
+      </p:sp>
+      <p:cxnSp>
+        <p:nvCxnSpPr>
+          <p:cNvPr id="28" name="직선 화살표 연결선 27">
+            <a:extLst>
+              <a:ext uri="{FF2B5EF4-FFF2-40B4-BE49-F238E27FC236}">
+                <a16:creationId xmlns:a16="http://schemas.microsoft.com/office/drawing/2014/main" id="{3A817C10-F0BE-4F3A-A82A-B55125B9ABC6}"/>
+              </a:ext>
+            </a:extLst>
+          </p:cNvPr>
+          <p:cNvCxnSpPr>
+            <a:cxnSpLocks/>
+          </p:cNvCxnSpPr>
+          <p:nvPr/>
+        </p:nvCxnSpPr>
+        <p:spPr>
+          <a:xfrm flipV="1">
+            <a:off x="4146104" y="2958903"/>
+            <a:ext cx="2148016" cy="1008151"/>
+          </a:xfrm>
+          <a:prstGeom prst="straightConnector1">
+            <a:avLst/>
+          </a:prstGeom>
+          <a:ln w="38100">
+            <a:solidFill>
+              <a:schemeClr val="bg1">
+                <a:lumMod val="50000"/>
+              </a:schemeClr>
+            </a:solidFill>
+            <a:tailEnd type="triangle"/>
+          </a:ln>
+        </p:spPr>
+        <p:style>
+          <a:lnRef idx="1">
+            <a:schemeClr val="accent1"/>
+          </a:lnRef>
+          <a:fillRef idx="0">
+            <a:schemeClr val="accent1"/>
+          </a:fillRef>
+          <a:effectRef idx="0">
+            <a:schemeClr val="accent1"/>
+          </a:effectRef>
+          <a:fontRef idx="minor">
+            <a:schemeClr val="tx1"/>
+          </a:fontRef>
+        </p:style>
+      </p:cxnSp>
+      <p:grpSp>
+        <p:nvGrpSpPr>
+          <p:cNvPr id="3" name="그룹 2">
+            <a:extLst>
+              <a:ext uri="{FF2B5EF4-FFF2-40B4-BE49-F238E27FC236}">
+                <a16:creationId xmlns:a16="http://schemas.microsoft.com/office/drawing/2014/main" id="{1A7306F5-5127-4BA7-8DAA-0D119C6C91C3}"/>
+              </a:ext>
+            </a:extLst>
+          </p:cNvPr>
+          <p:cNvGrpSpPr/>
+          <p:nvPr/>
+        </p:nvGrpSpPr>
+        <p:grpSpPr>
+          <a:xfrm>
+            <a:off x="2650374" y="3079487"/>
+            <a:ext cx="2030917" cy="1539412"/>
+            <a:chOff x="1209046" y="1173480"/>
+            <a:chExt cx="2030917" cy="1539412"/>
+          </a:xfrm>
+        </p:grpSpPr>
+        <p:sp>
+          <p:nvSpPr>
+            <p:cNvPr id="2" name="순서도: 처리 1">
+              <a:extLst>
+                <a:ext uri="{FF2B5EF4-FFF2-40B4-BE49-F238E27FC236}">
+                  <a16:creationId xmlns:a16="http://schemas.microsoft.com/office/drawing/2014/main" id="{E8B9C9D3-22B8-470D-9DFD-E9A6F0D7A2D2}"/>
+                </a:ext>
+              </a:extLst>
+            </p:cNvPr>
+            <p:cNvSpPr/>
+            <p:nvPr/>
+          </p:nvSpPr>
+          <p:spPr>
+            <a:xfrm>
+              <a:off x="1209046" y="1173480"/>
+              <a:ext cx="2021834" cy="502920"/>
+            </a:xfrm>
+            <a:prstGeom prst="flowChartProcess">
+              <a:avLst/>
+            </a:prstGeom>
+            <a:noFill/>
+            <a:ln w="38100">
+              <a:solidFill>
+                <a:schemeClr val="bg1">
+                  <a:lumMod val="50000"/>
+                </a:schemeClr>
+              </a:solidFill>
+            </a:ln>
+          </p:spPr>
+          <p:style>
+            <a:lnRef idx="2">
+              <a:schemeClr val="accent1">
+                <a:shade val="50000"/>
+              </a:schemeClr>
+            </a:lnRef>
+            <a:fillRef idx="1">
+              <a:schemeClr val="accent1"/>
+            </a:fillRef>
+            <a:effectRef idx="0">
+              <a:schemeClr val="accent1"/>
+            </a:effectRef>
+            <a:fontRef idx="minor">
+              <a:schemeClr val="lt1"/>
+            </a:fontRef>
+          </p:style>
+          <p:txBody>
+            <a:bodyPr rtlCol="0" anchor="ctr"/>
+            <a:lstStyle/>
+            <a:p>
+              <a:pPr algn="ctr"/>
+              <a:r>
+                <a:rPr lang="en-US" altLang="ko-KR" dirty="0">
+                  <a:solidFill>
+                    <a:schemeClr val="tx1"/>
+                  </a:solidFill>
+                </a:rPr>
+                <a:t>User Proxy</a:t>
+              </a:r>
+              <a:endParaRPr lang="ko-KR" altLang="en-US" dirty="0">
+                <a:solidFill>
+                  <a:schemeClr val="tx1"/>
+                </a:solidFill>
+              </a:endParaRPr>
+            </a:p>
+          </p:txBody>
+        </p:sp>
+        <p:sp>
+          <p:nvSpPr>
+            <p:cNvPr id="20" name="순서도: 처리 19">
+              <a:extLst>
+                <a:ext uri="{FF2B5EF4-FFF2-40B4-BE49-F238E27FC236}">
+                  <a16:creationId xmlns:a16="http://schemas.microsoft.com/office/drawing/2014/main" id="{259AE223-AA30-4EEC-9616-7273A8823215}"/>
+                </a:ext>
+              </a:extLst>
+            </p:cNvPr>
+            <p:cNvSpPr/>
+            <p:nvPr/>
+          </p:nvSpPr>
+          <p:spPr>
+            <a:xfrm>
+              <a:off x="1209046" y="1679206"/>
+              <a:ext cx="2030917" cy="1033686"/>
+            </a:xfrm>
+            <a:prstGeom prst="flowChartProcess">
+              <a:avLst/>
+            </a:prstGeom>
+            <a:noFill/>
+            <a:ln w="38100">
+              <a:solidFill>
+                <a:schemeClr val="bg1">
+                  <a:lumMod val="50000"/>
+                </a:schemeClr>
+              </a:solidFill>
+            </a:ln>
+          </p:spPr>
+          <p:style>
+            <a:lnRef idx="2">
+              <a:schemeClr val="accent1">
+                <a:shade val="50000"/>
+              </a:schemeClr>
+            </a:lnRef>
+            <a:fillRef idx="1">
+              <a:schemeClr val="accent1"/>
+            </a:fillRef>
+            <a:effectRef idx="0">
+              <a:schemeClr val="accent1"/>
+            </a:effectRef>
+            <a:fontRef idx="minor">
+              <a:schemeClr val="lt1"/>
+            </a:fontRef>
+          </p:style>
+          <p:txBody>
+            <a:bodyPr rtlCol="0" anchor="ctr"/>
+            <a:lstStyle/>
+            <a:p>
+              <a:pPr algn="ctr"/>
+              <a:r>
+                <a:rPr lang="en-US" altLang="ko-KR" dirty="0">
+                  <a:solidFill>
+                    <a:schemeClr val="tx1"/>
+                  </a:solidFill>
+                </a:rPr>
+                <a:t>target</a:t>
+              </a:r>
+            </a:p>
+            <a:p>
+              <a:pPr algn="ctr"/>
+              <a:r>
+                <a:rPr lang="en-US" altLang="ko-KR" dirty="0">
+                  <a:solidFill>
+                    <a:schemeClr val="tx1"/>
+                  </a:solidFill>
+                </a:rPr>
+                <a:t>getTitle()</a:t>
+              </a:r>
+              <a:endParaRPr lang="ko-KR" altLang="en-US" dirty="0">
+                <a:solidFill>
+                  <a:schemeClr val="tx1"/>
+                </a:solidFill>
+              </a:endParaRPr>
+            </a:p>
+          </p:txBody>
+        </p:sp>
+      </p:grpSp>
+      <p:sp>
+        <p:nvSpPr>
+          <p:cNvPr id="23" name="순서도: 처리 22">
+            <a:extLst>
+              <a:ext uri="{FF2B5EF4-FFF2-40B4-BE49-F238E27FC236}">
+                <a16:creationId xmlns:a16="http://schemas.microsoft.com/office/drawing/2014/main" id="{0B4F8B85-BEEA-4051-BC2C-B27B9F21D723}"/>
+              </a:ext>
+            </a:extLst>
+          </p:cNvPr>
+          <p:cNvSpPr/>
+          <p:nvPr/>
+        </p:nvSpPr>
+        <p:spPr>
+          <a:xfrm>
+            <a:off x="6397495" y="2458737"/>
+            <a:ext cx="2030917" cy="830997"/>
+          </a:xfrm>
+          <a:prstGeom prst="flowChartProcess">
+            <a:avLst/>
+          </a:prstGeom>
+          <a:noFill/>
+          <a:ln w="38100">
+            <a:solidFill>
+              <a:schemeClr val="bg1">
+                <a:lumMod val="50000"/>
+              </a:schemeClr>
+            </a:solidFill>
+            <a:prstDash val="dash"/>
+          </a:ln>
+        </p:spPr>
+        <p:style>
+          <a:lnRef idx="2">
+            <a:schemeClr val="accent1">
+              <a:shade val="50000"/>
+            </a:schemeClr>
+          </a:lnRef>
+          <a:fillRef idx="1">
+            <a:schemeClr val="accent1"/>
+          </a:fillRef>
+          <a:effectRef idx="0">
+            <a:schemeClr val="accent1"/>
+          </a:effectRef>
+          <a:fontRef idx="minor">
+            <a:schemeClr val="lt1"/>
+          </a:fontRef>
+        </p:style>
+        <p:txBody>
+          <a:bodyPr rtlCol="0" anchor="ctr"/>
+          <a:lstStyle/>
+          <a:p>
+            <a:pPr algn="ctr"/>
+            <a:r>
+              <a:rPr lang="en-US" altLang="ko-KR" dirty="0">
+                <a:solidFill>
+                  <a:schemeClr val="tx1"/>
+                </a:solidFill>
+              </a:rPr>
+              <a:t>Book</a:t>
+            </a:r>
+            <a:endParaRPr lang="ko-KR" altLang="en-US" dirty="0">
+              <a:solidFill>
+                <a:schemeClr val="tx1"/>
+              </a:solidFill>
+            </a:endParaRPr>
+          </a:p>
+        </p:txBody>
+      </p:sp>
+      <p:sp>
+        <p:nvSpPr>
+          <p:cNvPr id="29" name="순서도: 처리 28">
+            <a:extLst>
+              <a:ext uri="{FF2B5EF4-FFF2-40B4-BE49-F238E27FC236}">
+                <a16:creationId xmlns:a16="http://schemas.microsoft.com/office/drawing/2014/main" id="{954A11C7-6C04-4DCD-AB7D-BF53469F0D86}"/>
+              </a:ext>
+            </a:extLst>
+          </p:cNvPr>
+          <p:cNvSpPr/>
+          <p:nvPr/>
+        </p:nvSpPr>
+        <p:spPr>
+          <a:xfrm>
+            <a:off x="9146127" y="2458737"/>
+            <a:ext cx="2030917" cy="830997"/>
+          </a:xfrm>
+          <a:prstGeom prst="flowChartProcess">
+            <a:avLst/>
+          </a:prstGeom>
+          <a:noFill/>
+          <a:ln w="38100">
+            <a:solidFill>
+              <a:schemeClr val="bg1">
+                <a:lumMod val="50000"/>
+              </a:schemeClr>
+            </a:solidFill>
+          </a:ln>
+        </p:spPr>
+        <p:style>
+          <a:lnRef idx="2">
+            <a:schemeClr val="accent1">
+              <a:shade val="50000"/>
+            </a:schemeClr>
+          </a:lnRef>
+          <a:fillRef idx="1">
+            <a:schemeClr val="accent1"/>
+          </a:fillRef>
+          <a:effectRef idx="0">
+            <a:schemeClr val="accent1"/>
+          </a:effectRef>
+          <a:fontRef idx="minor">
+            <a:schemeClr val="lt1"/>
+          </a:fontRef>
+        </p:style>
+        <p:txBody>
+          <a:bodyPr rtlCol="0" anchor="ctr"/>
+          <a:lstStyle/>
+          <a:p>
+            <a:pPr algn="ctr"/>
+            <a:r>
+              <a:rPr lang="en-US" altLang="ko-KR" dirty="0">
+                <a:solidFill>
+                  <a:schemeClr val="tx1"/>
+                </a:solidFill>
+              </a:rPr>
+              <a:t>Book</a:t>
+            </a:r>
+            <a:endParaRPr lang="ko-KR" altLang="en-US" dirty="0">
+              <a:solidFill>
+                <a:schemeClr val="tx1"/>
+              </a:solidFill>
+            </a:endParaRPr>
+          </a:p>
+        </p:txBody>
+      </p:sp>
+      <p:cxnSp>
+        <p:nvCxnSpPr>
+          <p:cNvPr id="30" name="직선 화살표 연결선 29">
+            <a:extLst>
+              <a:ext uri="{FF2B5EF4-FFF2-40B4-BE49-F238E27FC236}">
+                <a16:creationId xmlns:a16="http://schemas.microsoft.com/office/drawing/2014/main" id="{E50AF506-6CF2-440D-99B7-D15E71FAFA23}"/>
+              </a:ext>
+            </a:extLst>
+          </p:cNvPr>
+          <p:cNvCxnSpPr>
+            <a:cxnSpLocks/>
+          </p:cNvCxnSpPr>
+          <p:nvPr/>
+        </p:nvCxnSpPr>
+        <p:spPr>
+          <a:xfrm flipH="1">
+            <a:off x="8289765" y="3330947"/>
+            <a:ext cx="1419359" cy="1914263"/>
+          </a:xfrm>
+          <a:prstGeom prst="straightConnector1">
+            <a:avLst/>
+          </a:prstGeom>
+          <a:ln w="38100">
+            <a:solidFill>
+              <a:schemeClr val="bg1">
+                <a:lumMod val="50000"/>
+              </a:schemeClr>
+            </a:solidFill>
+            <a:tailEnd type="triangle"/>
+          </a:ln>
+        </p:spPr>
+        <p:style>
+          <a:lnRef idx="1">
+            <a:schemeClr val="accent1"/>
+          </a:lnRef>
+          <a:fillRef idx="0">
+            <a:schemeClr val="accent1"/>
+          </a:fillRef>
+          <a:effectRef idx="0">
+            <a:schemeClr val="accent1"/>
+          </a:effectRef>
+          <a:fontRef idx="minor">
+            <a:schemeClr val="tx1"/>
+          </a:fontRef>
+        </p:style>
+      </p:cxnSp>
+      <p:cxnSp>
+        <p:nvCxnSpPr>
+          <p:cNvPr id="31" name="직선 화살표 연결선 30">
+            <a:extLst>
+              <a:ext uri="{FF2B5EF4-FFF2-40B4-BE49-F238E27FC236}">
+                <a16:creationId xmlns:a16="http://schemas.microsoft.com/office/drawing/2014/main" id="{C31E6344-FC4F-49D1-AE79-5010A9E65986}"/>
+              </a:ext>
+            </a:extLst>
+          </p:cNvPr>
+          <p:cNvCxnSpPr>
+            <a:cxnSpLocks/>
+            <a:stCxn id="18" idx="1"/>
+            <a:endCxn id="29" idx="2"/>
+          </p:cNvCxnSpPr>
+          <p:nvPr/>
+        </p:nvCxnSpPr>
+        <p:spPr>
+          <a:xfrm flipV="1">
+            <a:off x="8746846" y="3289734"/>
+            <a:ext cx="1414740" cy="1888189"/>
+          </a:xfrm>
+          <a:prstGeom prst="straightConnector1">
+            <a:avLst/>
+          </a:prstGeom>
+          <a:ln w="38100">
+            <a:solidFill>
+              <a:schemeClr val="bg1">
+                <a:lumMod val="50000"/>
+              </a:schemeClr>
+            </a:solidFill>
+            <a:tailEnd type="triangle"/>
+          </a:ln>
+        </p:spPr>
+        <p:style>
+          <a:lnRef idx="1">
+            <a:schemeClr val="accent1"/>
+          </a:lnRef>
+          <a:fillRef idx="0">
+            <a:schemeClr val="accent1"/>
+          </a:fillRef>
+          <a:effectRef idx="0">
+            <a:schemeClr val="accent1"/>
+          </a:effectRef>
+          <a:fontRef idx="minor">
+            <a:schemeClr val="tx1"/>
+          </a:fontRef>
+        </p:style>
+      </p:cxnSp>
+      <p:sp>
+        <p:nvSpPr>
+          <p:cNvPr id="35" name="TextBox 34">
+            <a:extLst>
+              <a:ext uri="{FF2B5EF4-FFF2-40B4-BE49-F238E27FC236}">
+                <a16:creationId xmlns:a16="http://schemas.microsoft.com/office/drawing/2014/main" id="{7F0E50C6-F5CD-4644-9DC9-5498EEB268FB}"/>
+              </a:ext>
+            </a:extLst>
+          </p:cNvPr>
+          <p:cNvSpPr txBox="1"/>
+          <p:nvPr/>
+        </p:nvSpPr>
+        <p:spPr>
+          <a:xfrm>
+            <a:off x="7098072" y="4133810"/>
+            <a:ext cx="2023840" cy="369332"/>
+          </a:xfrm>
+          <a:prstGeom prst="rect">
+            <a:avLst/>
+          </a:prstGeom>
+          <a:noFill/>
+        </p:spPr>
+        <p:txBody>
+          <a:bodyPr wrap="square" rtlCol="0">
+            <a:spAutoFit/>
+          </a:bodyPr>
+          <a:lstStyle/>
+          <a:p>
+            <a:pPr algn="ctr"/>
+            <a:r>
+              <a:rPr lang="en-US" altLang="ko-KR" dirty="0">
+                <a:latin typeface="나눔스퀘어 ExtraBold" panose="020B0600000101010101" pitchFamily="50" charset="-127"/>
+                <a:ea typeface="나눔스퀘어 ExtraBold" panose="020B0600000101010101" pitchFamily="50" charset="-127"/>
+              </a:rPr>
+              <a:t>3. </a:t>
+            </a:r>
+            <a:r>
+              <a:rPr lang="ko-KR" altLang="en-US" dirty="0">
+                <a:latin typeface="나눔스퀘어 ExtraBold" panose="020B0600000101010101" pitchFamily="50" charset="-127"/>
+                <a:ea typeface="나눔스퀘어 ExtraBold" panose="020B0600000101010101" pitchFamily="50" charset="-127"/>
+              </a:rPr>
+              <a:t>초기화 요청</a:t>
+            </a:r>
+          </a:p>
+        </p:txBody>
+      </p:sp>
+      <p:sp>
+        <p:nvSpPr>
+          <p:cNvPr id="36" name="TextBox 35">
+            <a:extLst>
+              <a:ext uri="{FF2B5EF4-FFF2-40B4-BE49-F238E27FC236}">
+                <a16:creationId xmlns:a16="http://schemas.microsoft.com/office/drawing/2014/main" id="{07ACB0BC-1EB6-46BB-9E6E-F4A27E4A06DC}"/>
+              </a:ext>
+            </a:extLst>
+          </p:cNvPr>
+          <p:cNvSpPr txBox="1"/>
+          <p:nvPr/>
+        </p:nvSpPr>
+        <p:spPr>
+          <a:xfrm>
+            <a:off x="9423617" y="4034972"/>
+            <a:ext cx="2023840" cy="646331"/>
+          </a:xfrm>
+          <a:prstGeom prst="rect">
+            <a:avLst/>
+          </a:prstGeom>
+          <a:noFill/>
+        </p:spPr>
+        <p:txBody>
+          <a:bodyPr wrap="square" rtlCol="0">
+            <a:spAutoFit/>
+          </a:bodyPr>
+          <a:lstStyle/>
+          <a:p>
+            <a:pPr algn="ctr"/>
+            <a:r>
+              <a:rPr lang="en-US" altLang="ko-KR" dirty="0">
+                <a:latin typeface="나눔스퀘어 ExtraBold" panose="020B0600000101010101" pitchFamily="50" charset="-127"/>
+                <a:ea typeface="나눔스퀘어 ExtraBold" panose="020B0600000101010101" pitchFamily="50" charset="-127"/>
+              </a:rPr>
+              <a:t>4. Book Entity</a:t>
+            </a:r>
+            <a:r>
+              <a:rPr lang="ko-KR" altLang="en-US" dirty="0">
+                <a:latin typeface="나눔스퀘어 ExtraBold" panose="020B0600000101010101" pitchFamily="50" charset="-127"/>
+                <a:ea typeface="나눔스퀘어 ExtraBold" panose="020B0600000101010101" pitchFamily="50" charset="-127"/>
+              </a:rPr>
+              <a:t>를 </a:t>
+            </a:r>
+            <a:br>
+              <a:rPr lang="en-US" altLang="ko-KR" dirty="0">
+                <a:latin typeface="나눔스퀘어 ExtraBold" panose="020B0600000101010101" pitchFamily="50" charset="-127"/>
+                <a:ea typeface="나눔스퀘어 ExtraBold" panose="020B0600000101010101" pitchFamily="50" charset="-127"/>
+              </a:rPr>
+            </a:br>
+            <a:r>
+              <a:rPr lang="en-US" altLang="ko-KR" dirty="0">
+                <a:latin typeface="나눔스퀘어 ExtraBold" panose="020B0600000101010101" pitchFamily="50" charset="-127"/>
+                <a:ea typeface="나눔스퀘어 ExtraBold" panose="020B0600000101010101" pitchFamily="50" charset="-127"/>
+              </a:rPr>
+              <a:t>1</a:t>
+            </a:r>
+            <a:r>
+              <a:rPr lang="ko-KR" altLang="en-US" dirty="0">
+                <a:latin typeface="나눔스퀘어 ExtraBold" panose="020B0600000101010101" pitchFamily="50" charset="-127"/>
+                <a:ea typeface="나눔스퀘어 ExtraBold" panose="020B0600000101010101" pitchFamily="50" charset="-127"/>
+              </a:rPr>
+              <a:t>차 캐시에 저장</a:t>
+            </a:r>
+          </a:p>
+        </p:txBody>
+      </p:sp>
+      <p:cxnSp>
+        <p:nvCxnSpPr>
+          <p:cNvPr id="38" name="직선 화살표 연결선 37">
+            <a:extLst>
+              <a:ext uri="{FF2B5EF4-FFF2-40B4-BE49-F238E27FC236}">
+                <a16:creationId xmlns:a16="http://schemas.microsoft.com/office/drawing/2014/main" id="{D64B0F5C-9F21-4CE2-9DC8-F55377BDD935}"/>
+              </a:ext>
+            </a:extLst>
+          </p:cNvPr>
+          <p:cNvCxnSpPr>
+            <a:cxnSpLocks/>
+          </p:cNvCxnSpPr>
+          <p:nvPr/>
+        </p:nvCxnSpPr>
+        <p:spPr>
+          <a:xfrm flipH="1">
+            <a:off x="4184193" y="3303889"/>
+            <a:ext cx="4961934" cy="1054249"/>
+          </a:xfrm>
+          <a:prstGeom prst="straightConnector1">
+            <a:avLst/>
+          </a:prstGeom>
+          <a:ln w="38100">
+            <a:solidFill>
+              <a:schemeClr val="bg1">
+                <a:lumMod val="50000"/>
+              </a:schemeClr>
+            </a:solidFill>
+            <a:tailEnd type="triangle"/>
+          </a:ln>
+        </p:spPr>
+        <p:style>
+          <a:lnRef idx="1">
+            <a:schemeClr val="accent1"/>
+          </a:lnRef>
+          <a:fillRef idx="0">
+            <a:schemeClr val="accent1"/>
+          </a:fillRef>
+          <a:effectRef idx="0">
+            <a:schemeClr val="accent1"/>
+          </a:effectRef>
+          <a:fontRef idx="minor">
+            <a:schemeClr val="tx1"/>
+          </a:fontRef>
+        </p:style>
+      </p:cxnSp>
+      <p:sp>
+        <p:nvSpPr>
+          <p:cNvPr id="42" name="TextBox 41">
+            <a:extLst>
+              <a:ext uri="{FF2B5EF4-FFF2-40B4-BE49-F238E27FC236}">
+                <a16:creationId xmlns:a16="http://schemas.microsoft.com/office/drawing/2014/main" id="{BC359CFB-388E-4757-A06F-588B0CD99835}"/>
+              </a:ext>
+            </a:extLst>
+          </p:cNvPr>
+          <p:cNvSpPr txBox="1"/>
+          <p:nvPr/>
+        </p:nvSpPr>
+        <p:spPr>
+          <a:xfrm>
+            <a:off x="4712303" y="4147965"/>
+            <a:ext cx="2439155" cy="646331"/>
+          </a:xfrm>
+          <a:prstGeom prst="rect">
+            <a:avLst/>
+          </a:prstGeom>
+          <a:noFill/>
+        </p:spPr>
+        <p:txBody>
+          <a:bodyPr wrap="square" rtlCol="0">
+            <a:spAutoFit/>
+          </a:bodyPr>
+          <a:lstStyle/>
+          <a:p>
+            <a:pPr algn="ctr"/>
+            <a:r>
+              <a:rPr lang="en-US" altLang="ko-KR" dirty="0">
+                <a:latin typeface="나눔스퀘어 ExtraBold" panose="020B0600000101010101" pitchFamily="50" charset="-127"/>
+                <a:ea typeface="나눔스퀘어 ExtraBold" panose="020B0600000101010101" pitchFamily="50" charset="-127"/>
+              </a:rPr>
+              <a:t>5.</a:t>
+            </a:r>
+            <a:r>
+              <a:rPr lang="ko-KR" altLang="en-US" dirty="0">
+                <a:latin typeface="나눔스퀘어 ExtraBold" panose="020B0600000101010101" pitchFamily="50" charset="-127"/>
+                <a:ea typeface="나눔스퀘어 ExtraBold" panose="020B0600000101010101" pitchFamily="50" charset="-127"/>
+              </a:rPr>
+              <a:t> 실제 </a:t>
+            </a:r>
+            <a:r>
+              <a:rPr lang="en-US" altLang="ko-KR" dirty="0">
+                <a:latin typeface="나눔스퀘어 ExtraBold" panose="020B0600000101010101" pitchFamily="50" charset="-127"/>
+                <a:ea typeface="나눔스퀘어 ExtraBold" panose="020B0600000101010101" pitchFamily="50" charset="-127"/>
+              </a:rPr>
+              <a:t>Entity</a:t>
+            </a:r>
+            <a:r>
+              <a:rPr lang="ko-KR" altLang="en-US" dirty="0">
+                <a:latin typeface="나눔스퀘어 ExtraBold" panose="020B0600000101010101" pitchFamily="50" charset="-127"/>
+                <a:ea typeface="나눔스퀘어 ExtraBold" panose="020B0600000101010101" pitchFamily="50" charset="-127"/>
+              </a:rPr>
+              <a:t>에서 </a:t>
+            </a:r>
+            <a:br>
+              <a:rPr lang="en-US" altLang="ko-KR" dirty="0">
+                <a:latin typeface="나눔스퀘어 ExtraBold" panose="020B0600000101010101" pitchFamily="50" charset="-127"/>
+                <a:ea typeface="나눔스퀘어 ExtraBold" panose="020B0600000101010101" pitchFamily="50" charset="-127"/>
+              </a:rPr>
+            </a:br>
+            <a:r>
+              <a:rPr lang="en-US" altLang="ko-KR" dirty="0">
+                <a:latin typeface="나눔스퀘어 ExtraBold" panose="020B0600000101010101" pitchFamily="50" charset="-127"/>
+                <a:ea typeface="나눔스퀘어 ExtraBold" panose="020B0600000101010101" pitchFamily="50" charset="-127"/>
+              </a:rPr>
+              <a:t>getTitle() </a:t>
+            </a:r>
+            <a:r>
+              <a:rPr lang="ko-KR" altLang="en-US" dirty="0">
+                <a:latin typeface="나눔스퀘어 ExtraBold" panose="020B0600000101010101" pitchFamily="50" charset="-127"/>
+                <a:ea typeface="나눔스퀘어 ExtraBold" panose="020B0600000101010101" pitchFamily="50" charset="-127"/>
+              </a:rPr>
+              <a:t>호출</a:t>
+            </a:r>
+          </a:p>
+        </p:txBody>
+      </p:sp>
+    </p:spTree>
+    <p:extLst>
+      <p:ext uri="{BB962C8B-B14F-4D97-AF65-F5344CB8AC3E}">
+        <p14:creationId xmlns:p14="http://schemas.microsoft.com/office/powerpoint/2010/main" val="119778288"/>
+      </p:ext>
+    </p:extLst>
+  </p:cSld>
+  <p:clrMapOvr>
+    <a:masterClrMapping/>
+  </p:clrMapOvr>
+</p:sld>
+</file>
+
+<file path=ppt/slides/slide6.xml><?xml version="1.0" encoding="utf-8"?>
+<p:sld xmlns:a="http://schemas.openxmlformats.org/drawingml/2006/main" xmlns:r="http://schemas.openxmlformats.org/officeDocument/2006/relationships" xmlns:p="http://schemas.openxmlformats.org/presentationml/2006/main">
+  <p:cSld>
+    <p:spTree>
+      <p:nvGrpSpPr>
+        <p:cNvPr id="1" name=""/>
+        <p:cNvGrpSpPr/>
+        <p:nvPr/>
+      </p:nvGrpSpPr>
+      <p:grpSpPr>
+        <a:xfrm>
+          <a:off x="0" y="0"/>
+          <a:ext cx="0" cy="0"/>
+          <a:chOff x="0" y="0"/>
+          <a:chExt cx="0" cy="0"/>
+        </a:xfrm>
+      </p:grpSpPr>
+      <p:grpSp>
+        <p:nvGrpSpPr>
+          <p:cNvPr id="3" name="그룹 2">
+            <a:extLst>
+              <a:ext uri="{FF2B5EF4-FFF2-40B4-BE49-F238E27FC236}">
+                <a16:creationId xmlns:a16="http://schemas.microsoft.com/office/drawing/2014/main" id="{B99BBFBB-3526-4BB1-A37C-3B8966515734}"/>
+              </a:ext>
+            </a:extLst>
+          </p:cNvPr>
+          <p:cNvGrpSpPr/>
+          <p:nvPr/>
+        </p:nvGrpSpPr>
+        <p:grpSpPr>
+          <a:xfrm>
+            <a:off x="2186929" y="2997679"/>
+            <a:ext cx="2406596" cy="431321"/>
+            <a:chOff x="4063855" y="2961431"/>
+            <a:chExt cx="2406596" cy="431321"/>
+          </a:xfrm>
+        </p:grpSpPr>
+        <p:cxnSp>
+          <p:nvCxnSpPr>
+            <p:cNvPr id="5" name="직선 화살표 연결선 4">
+              <a:extLst>
+                <a:ext uri="{FF2B5EF4-FFF2-40B4-BE49-F238E27FC236}">
+                  <a16:creationId xmlns:a16="http://schemas.microsoft.com/office/drawing/2014/main" id="{9E32C43A-A809-4797-9A05-9C4C775DB3B2}"/>
+                </a:ext>
+              </a:extLst>
+            </p:cNvPr>
+            <p:cNvCxnSpPr>
+              <a:cxnSpLocks/>
+            </p:cNvCxnSpPr>
+            <p:nvPr/>
+          </p:nvCxnSpPr>
+          <p:spPr>
+            <a:xfrm>
+              <a:off x="4283242" y="3392752"/>
+              <a:ext cx="2187209" cy="0"/>
+            </a:xfrm>
+            <a:prstGeom prst="straightConnector1">
+              <a:avLst/>
+            </a:prstGeom>
+            <a:ln w="38100">
+              <a:solidFill>
+                <a:schemeClr val="bg1">
+                  <a:lumMod val="50000"/>
+                </a:schemeClr>
+              </a:solidFill>
+              <a:tailEnd type="triangle"/>
+            </a:ln>
+          </p:spPr>
+          <p:style>
+            <a:lnRef idx="1">
+              <a:schemeClr val="accent1"/>
+            </a:lnRef>
+            <a:fillRef idx="0">
+              <a:schemeClr val="accent1"/>
+            </a:fillRef>
+            <a:effectRef idx="0">
+              <a:schemeClr val="accent1"/>
+            </a:effectRef>
+            <a:fontRef idx="minor">
+              <a:schemeClr val="tx1"/>
+            </a:fontRef>
+          </p:style>
+        </p:cxnSp>
+        <p:sp>
+          <p:nvSpPr>
+            <p:cNvPr id="6" name="TextBox 5">
+              <a:extLst>
+                <a:ext uri="{FF2B5EF4-FFF2-40B4-BE49-F238E27FC236}">
+                  <a16:creationId xmlns:a16="http://schemas.microsoft.com/office/drawing/2014/main" id="{608FDBEF-27D8-4593-B29B-D6713BAB1BF8}"/>
+                </a:ext>
+              </a:extLst>
+            </p:cNvPr>
+            <p:cNvSpPr txBox="1"/>
+            <p:nvPr/>
+          </p:nvSpPr>
+          <p:spPr>
+            <a:xfrm>
+              <a:off x="4063855" y="2961431"/>
+              <a:ext cx="2324371" cy="369332"/>
+            </a:xfrm>
+            <a:prstGeom prst="rect">
+              <a:avLst/>
+            </a:prstGeom>
+            <a:noFill/>
+          </p:spPr>
+          <p:txBody>
+            <a:bodyPr wrap="square" rtlCol="0">
+              <a:spAutoFit/>
+            </a:bodyPr>
+            <a:lstStyle/>
+            <a:p>
+              <a:pPr algn="ctr"/>
+              <a:r>
+                <a:rPr lang="ko-KR" altLang="en-US" dirty="0">
+                  <a:latin typeface="나눔스퀘어라운드 ExtraBold" panose="020B0600000101010101" pitchFamily="50" charset="-127"/>
+                  <a:ea typeface="나눔스퀘어라운드 ExtraBold" panose="020B0600000101010101" pitchFamily="50" charset="-127"/>
+                </a:rPr>
+                <a:t>신규 생성</a:t>
+              </a:r>
+            </a:p>
+          </p:txBody>
+        </p:sp>
+      </p:grpSp>
+      <p:sp>
+        <p:nvSpPr>
+          <p:cNvPr id="20" name="TextBox 19">
+            <a:extLst>
+              <a:ext uri="{FF2B5EF4-FFF2-40B4-BE49-F238E27FC236}">
+                <a16:creationId xmlns:a16="http://schemas.microsoft.com/office/drawing/2014/main" id="{1995BEE1-69DE-4738-B8C2-71F35551F883}"/>
+              </a:ext>
+            </a:extLst>
+          </p:cNvPr>
+          <p:cNvSpPr txBox="1"/>
+          <p:nvPr/>
+        </p:nvSpPr>
+        <p:spPr>
+          <a:xfrm>
+            <a:off x="668110" y="5477712"/>
+            <a:ext cx="4764387" cy="461665"/>
+          </a:xfrm>
+          <a:prstGeom prst="rect">
+            <a:avLst/>
+          </a:prstGeom>
+          <a:noFill/>
+        </p:spPr>
+        <p:txBody>
+          <a:bodyPr wrap="square" rtlCol="0">
+            <a:spAutoFit/>
+          </a:bodyPr>
+          <a:lstStyle/>
+          <a:p>
+            <a:pPr algn="ctr"/>
+            <a:r>
+              <a:rPr lang="en-US" altLang="ko-KR" sz="2400" dirty="0">
+                <a:latin typeface="나눔스퀘어라운드 ExtraBold" panose="020B0600000101010101" pitchFamily="50" charset="-127"/>
+                <a:ea typeface="나눔스퀘어라운드 ExtraBold" panose="020B0600000101010101" pitchFamily="50" charset="-127"/>
+              </a:rPr>
+              <a:t>IoC</a:t>
+            </a:r>
+            <a:r>
+              <a:rPr lang="ko-KR" altLang="en-US" sz="2400" dirty="0">
+                <a:latin typeface="나눔스퀘어라운드 ExtraBold" panose="020B0600000101010101" pitchFamily="50" charset="-127"/>
+                <a:ea typeface="나눔스퀘어라운드 ExtraBold" panose="020B0600000101010101" pitchFamily="50" charset="-127"/>
+              </a:rPr>
+              <a:t>가 아닌 경우</a:t>
+            </a:r>
+          </a:p>
+        </p:txBody>
+      </p:sp>
+      <p:sp>
+        <p:nvSpPr>
+          <p:cNvPr id="23" name="TextBox 22">
+            <a:extLst>
+              <a:ext uri="{FF2B5EF4-FFF2-40B4-BE49-F238E27FC236}">
+                <a16:creationId xmlns:a16="http://schemas.microsoft.com/office/drawing/2014/main" id="{A8EE4CE9-90F9-43D4-A38B-F7CCC38F0BED}"/>
+              </a:ext>
+            </a:extLst>
+          </p:cNvPr>
+          <p:cNvSpPr txBox="1"/>
+          <p:nvPr/>
+        </p:nvSpPr>
+        <p:spPr>
+          <a:xfrm>
+            <a:off x="6759505" y="5477712"/>
+            <a:ext cx="4764387" cy="461665"/>
+          </a:xfrm>
+          <a:prstGeom prst="rect">
+            <a:avLst/>
+          </a:prstGeom>
+          <a:noFill/>
+        </p:spPr>
+        <p:txBody>
+          <a:bodyPr wrap="square" rtlCol="0">
+            <a:spAutoFit/>
+          </a:bodyPr>
+          <a:lstStyle/>
+          <a:p>
+            <a:pPr algn="ctr"/>
+            <a:r>
+              <a:rPr lang="en-US" altLang="ko-KR" sz="2400" dirty="0">
+                <a:latin typeface="나눔스퀘어라운드 ExtraBold" panose="020B0600000101010101" pitchFamily="50" charset="-127"/>
+                <a:ea typeface="나눔스퀘어라운드 ExtraBold" panose="020B0600000101010101" pitchFamily="50" charset="-127"/>
+              </a:rPr>
+              <a:t>IoC</a:t>
+            </a:r>
+            <a:r>
+              <a:rPr lang="ko-KR" altLang="en-US" sz="2400" dirty="0">
+                <a:latin typeface="나눔스퀘어라운드 ExtraBold" panose="020B0600000101010101" pitchFamily="50" charset="-127"/>
+                <a:ea typeface="나눔스퀘어라운드 ExtraBold" panose="020B0600000101010101" pitchFamily="50" charset="-127"/>
+              </a:rPr>
+              <a:t>인 경우</a:t>
+            </a:r>
+          </a:p>
+        </p:txBody>
+      </p:sp>
+      <p:sp>
+        <p:nvSpPr>
+          <p:cNvPr id="2" name="타원 1">
+            <a:extLst>
+              <a:ext uri="{FF2B5EF4-FFF2-40B4-BE49-F238E27FC236}">
+                <a16:creationId xmlns:a16="http://schemas.microsoft.com/office/drawing/2014/main" id="{2302B476-96CA-4B98-A6B1-306FC28D9A8F}"/>
+              </a:ext>
+            </a:extLst>
+          </p:cNvPr>
+          <p:cNvSpPr/>
+          <p:nvPr/>
+        </p:nvSpPr>
+        <p:spPr>
+          <a:xfrm>
+            <a:off x="668110" y="2961431"/>
+            <a:ext cx="1770290" cy="1770290"/>
+          </a:xfrm>
+          <a:prstGeom prst="ellipse">
+            <a:avLst/>
+          </a:prstGeom>
+          <a:solidFill>
+            <a:schemeClr val="accent4">
+              <a:lumMod val="40000"/>
+              <a:lumOff val="60000"/>
+            </a:schemeClr>
+          </a:solidFill>
+          <a:ln>
+            <a:noFill/>
+          </a:ln>
+        </p:spPr>
+        <p:style>
+          <a:lnRef idx="2">
+            <a:schemeClr val="accent1">
+              <a:shade val="50000"/>
+            </a:schemeClr>
+          </a:lnRef>
+          <a:fillRef idx="1">
+            <a:schemeClr val="accent1"/>
+          </a:fillRef>
+          <a:effectRef idx="0">
+            <a:schemeClr val="accent1"/>
+          </a:effectRef>
+          <a:fontRef idx="minor">
+            <a:schemeClr val="lt1"/>
+          </a:fontRef>
+        </p:style>
+        <p:txBody>
+          <a:bodyPr rtlCol="0" anchor="ctr"/>
+          <a:lstStyle/>
+          <a:p>
+            <a:pPr algn="ctr"/>
+            <a:endParaRPr lang="ko-KR" altLang="en-US" dirty="0">
+              <a:latin typeface="나눔스퀘어라운드 ExtraBold" panose="020B0600000101010101" pitchFamily="50" charset="-127"/>
+              <a:ea typeface="나눔스퀘어라운드 ExtraBold" panose="020B0600000101010101" pitchFamily="50" charset="-127"/>
+            </a:endParaRPr>
+          </a:p>
+        </p:txBody>
+      </p:sp>
+      <p:grpSp>
+        <p:nvGrpSpPr>
+          <p:cNvPr id="24" name="그룹 23">
+            <a:extLst>
+              <a:ext uri="{FF2B5EF4-FFF2-40B4-BE49-F238E27FC236}">
+                <a16:creationId xmlns:a16="http://schemas.microsoft.com/office/drawing/2014/main" id="{B917B6BF-48D7-4378-BB0E-AA11472B6673}"/>
+              </a:ext>
+            </a:extLst>
+          </p:cNvPr>
+          <p:cNvGrpSpPr/>
+          <p:nvPr/>
+        </p:nvGrpSpPr>
+        <p:grpSpPr>
+          <a:xfrm>
+            <a:off x="2219013" y="3992290"/>
+            <a:ext cx="2406596" cy="431321"/>
+            <a:chOff x="4063855" y="2961431"/>
+            <a:chExt cx="2406596" cy="431321"/>
+          </a:xfrm>
+        </p:grpSpPr>
+        <p:cxnSp>
+          <p:nvCxnSpPr>
+            <p:cNvPr id="25" name="직선 화살표 연결선 24">
+              <a:extLst>
+                <a:ext uri="{FF2B5EF4-FFF2-40B4-BE49-F238E27FC236}">
+                  <a16:creationId xmlns:a16="http://schemas.microsoft.com/office/drawing/2014/main" id="{E34C6ABA-ECEA-4CFA-A8B9-0120C859022D}"/>
+                </a:ext>
+              </a:extLst>
+            </p:cNvPr>
+            <p:cNvCxnSpPr>
+              <a:cxnSpLocks/>
+            </p:cNvCxnSpPr>
+            <p:nvPr/>
+          </p:nvCxnSpPr>
+          <p:spPr>
+            <a:xfrm>
+              <a:off x="4283242" y="3392752"/>
+              <a:ext cx="2187209" cy="0"/>
+            </a:xfrm>
+            <a:prstGeom prst="straightConnector1">
+              <a:avLst/>
+            </a:prstGeom>
+            <a:ln w="38100">
+              <a:solidFill>
+                <a:schemeClr val="bg1">
+                  <a:lumMod val="50000"/>
+                </a:schemeClr>
+              </a:solidFill>
+              <a:tailEnd type="triangle"/>
+            </a:ln>
+          </p:spPr>
+          <p:style>
+            <a:lnRef idx="1">
+              <a:schemeClr val="accent1"/>
+            </a:lnRef>
+            <a:fillRef idx="0">
+              <a:schemeClr val="accent1"/>
+            </a:fillRef>
+            <a:effectRef idx="0">
+              <a:schemeClr val="accent1"/>
+            </a:effectRef>
+            <a:fontRef idx="minor">
+              <a:schemeClr val="tx1"/>
+            </a:fontRef>
+          </p:style>
+        </p:cxnSp>
+        <p:sp>
+          <p:nvSpPr>
+            <p:cNvPr id="29" name="TextBox 28">
+              <a:extLst>
+                <a:ext uri="{FF2B5EF4-FFF2-40B4-BE49-F238E27FC236}">
+                  <a16:creationId xmlns:a16="http://schemas.microsoft.com/office/drawing/2014/main" id="{A94883C9-7407-498B-906B-669E73362E0B}"/>
+                </a:ext>
+              </a:extLst>
+            </p:cNvPr>
+            <p:cNvSpPr txBox="1"/>
+            <p:nvPr/>
+          </p:nvSpPr>
+          <p:spPr>
+            <a:xfrm>
+              <a:off x="4063855" y="2961431"/>
+              <a:ext cx="2324371" cy="369332"/>
+            </a:xfrm>
+            <a:prstGeom prst="rect">
+              <a:avLst/>
+            </a:prstGeom>
+            <a:noFill/>
+          </p:spPr>
+          <p:txBody>
+            <a:bodyPr wrap="square" rtlCol="0">
+              <a:spAutoFit/>
+            </a:bodyPr>
+            <a:lstStyle/>
+            <a:p>
+              <a:pPr algn="ctr"/>
+              <a:r>
+                <a:rPr lang="ko-KR" altLang="en-US" dirty="0">
+                  <a:latin typeface="나눔스퀘어라운드 ExtraBold" panose="020B0600000101010101" pitchFamily="50" charset="-127"/>
+                  <a:ea typeface="나눔스퀘어라운드 ExtraBold" panose="020B0600000101010101" pitchFamily="50" charset="-127"/>
+                </a:rPr>
+                <a:t>신규 생성</a:t>
+              </a:r>
+            </a:p>
+          </p:txBody>
+        </p:sp>
+      </p:grpSp>
+      <p:sp>
+        <p:nvSpPr>
+          <p:cNvPr id="30" name="타원 29">
+            <a:extLst>
+              <a:ext uri="{FF2B5EF4-FFF2-40B4-BE49-F238E27FC236}">
+                <a16:creationId xmlns:a16="http://schemas.microsoft.com/office/drawing/2014/main" id="{46D8656B-F5DF-4C7A-BD41-7D67FF4D3C51}"/>
+              </a:ext>
+            </a:extLst>
+          </p:cNvPr>
+          <p:cNvSpPr/>
+          <p:nvPr/>
+        </p:nvSpPr>
+        <p:spPr>
+          <a:xfrm>
+            <a:off x="4766867" y="4064343"/>
+            <a:ext cx="1040374" cy="1040374"/>
+          </a:xfrm>
+          <a:prstGeom prst="ellipse">
+            <a:avLst/>
+          </a:prstGeom>
+          <a:solidFill>
+            <a:schemeClr val="accent2">
+              <a:lumMod val="40000"/>
+              <a:lumOff val="60000"/>
+            </a:schemeClr>
+          </a:solidFill>
+          <a:ln>
+            <a:noFill/>
+          </a:ln>
+        </p:spPr>
+        <p:style>
+          <a:lnRef idx="2">
+            <a:schemeClr val="accent1">
+              <a:shade val="50000"/>
+            </a:schemeClr>
+          </a:lnRef>
+          <a:fillRef idx="1">
+            <a:schemeClr val="accent1"/>
+          </a:fillRef>
+          <a:effectRef idx="0">
+            <a:schemeClr val="accent1"/>
+          </a:effectRef>
+          <a:fontRef idx="minor">
+            <a:schemeClr val="lt1"/>
+          </a:fontRef>
+        </p:style>
+        <p:txBody>
+          <a:bodyPr rtlCol="0" anchor="ctr"/>
+          <a:lstStyle/>
+          <a:p>
+            <a:pPr algn="ctr"/>
+            <a:r>
+              <a:rPr lang="en-US" altLang="ko-KR" dirty="0">
+                <a:solidFill>
+                  <a:schemeClr val="tx1"/>
+                </a:solidFill>
+                <a:latin typeface="나눔스퀘어라운드 ExtraBold" panose="020B0600000101010101" pitchFamily="50" charset="-127"/>
+                <a:ea typeface="나눔스퀘어라운드 ExtraBold" panose="020B0600000101010101" pitchFamily="50" charset="-127"/>
+              </a:rPr>
+              <a:t>obj</a:t>
+            </a:r>
+            <a:endParaRPr lang="ko-KR" altLang="en-US" dirty="0">
+              <a:solidFill>
+                <a:schemeClr val="tx1"/>
+              </a:solidFill>
+              <a:latin typeface="나눔스퀘어라운드 ExtraBold" panose="020B0600000101010101" pitchFamily="50" charset="-127"/>
+              <a:ea typeface="나눔스퀘어라운드 ExtraBold" panose="020B0600000101010101" pitchFamily="50" charset="-127"/>
+            </a:endParaRPr>
+          </a:p>
+        </p:txBody>
+      </p:sp>
+      <p:sp>
+        <p:nvSpPr>
+          <p:cNvPr id="31" name="타원 30">
+            <a:extLst>
+              <a:ext uri="{FF2B5EF4-FFF2-40B4-BE49-F238E27FC236}">
+                <a16:creationId xmlns:a16="http://schemas.microsoft.com/office/drawing/2014/main" id="{28429E66-8A8A-414B-9ED9-99B110648878}"/>
+              </a:ext>
+            </a:extLst>
+          </p:cNvPr>
+          <p:cNvSpPr/>
+          <p:nvPr/>
+        </p:nvSpPr>
+        <p:spPr>
+          <a:xfrm>
+            <a:off x="4766867" y="2793657"/>
+            <a:ext cx="1040374" cy="1040374"/>
+          </a:xfrm>
+          <a:prstGeom prst="ellipse">
+            <a:avLst/>
+          </a:prstGeom>
+          <a:solidFill>
+            <a:schemeClr val="accent2">
+              <a:lumMod val="40000"/>
+              <a:lumOff val="60000"/>
+            </a:schemeClr>
+          </a:solidFill>
+          <a:ln>
+            <a:noFill/>
+          </a:ln>
+        </p:spPr>
+        <p:style>
+          <a:lnRef idx="2">
+            <a:schemeClr val="accent1">
+              <a:shade val="50000"/>
+            </a:schemeClr>
+          </a:lnRef>
+          <a:fillRef idx="1">
+            <a:schemeClr val="accent1"/>
+          </a:fillRef>
+          <a:effectRef idx="0">
+            <a:schemeClr val="accent1"/>
+          </a:effectRef>
+          <a:fontRef idx="minor">
+            <a:schemeClr val="lt1"/>
+          </a:fontRef>
+        </p:style>
+        <p:txBody>
+          <a:bodyPr rtlCol="0" anchor="ctr"/>
+          <a:lstStyle/>
+          <a:p>
+            <a:pPr algn="ctr"/>
+            <a:r>
+              <a:rPr lang="en-US" altLang="ko-KR" dirty="0">
+                <a:solidFill>
+                  <a:schemeClr val="tx1"/>
+                </a:solidFill>
+                <a:latin typeface="나눔스퀘어라운드 ExtraBold" panose="020B0600000101010101" pitchFamily="50" charset="-127"/>
+                <a:ea typeface="나눔스퀘어라운드 ExtraBold" panose="020B0600000101010101" pitchFamily="50" charset="-127"/>
+              </a:rPr>
+              <a:t>obj</a:t>
+            </a:r>
+            <a:endParaRPr lang="ko-KR" altLang="en-US" dirty="0">
+              <a:solidFill>
+                <a:schemeClr val="tx1"/>
+              </a:solidFill>
+              <a:latin typeface="나눔스퀘어라운드 ExtraBold" panose="020B0600000101010101" pitchFamily="50" charset="-127"/>
+              <a:ea typeface="나눔스퀘어라운드 ExtraBold" panose="020B0600000101010101" pitchFamily="50" charset="-127"/>
+            </a:endParaRPr>
+          </a:p>
+        </p:txBody>
+      </p:sp>
+      <p:sp>
+        <p:nvSpPr>
+          <p:cNvPr id="35" name="타원 34">
+            <a:extLst>
+              <a:ext uri="{FF2B5EF4-FFF2-40B4-BE49-F238E27FC236}">
+                <a16:creationId xmlns:a16="http://schemas.microsoft.com/office/drawing/2014/main" id="{2DC3EB9D-FC1D-4F29-92C5-008790D0A84B}"/>
+              </a:ext>
+            </a:extLst>
+          </p:cNvPr>
+          <p:cNvSpPr/>
+          <p:nvPr/>
+        </p:nvSpPr>
+        <p:spPr>
+          <a:xfrm>
+            <a:off x="6852928" y="2964594"/>
+            <a:ext cx="1770290" cy="1770290"/>
+          </a:xfrm>
+          <a:prstGeom prst="ellipse">
+            <a:avLst/>
+          </a:prstGeom>
+          <a:solidFill>
+            <a:schemeClr val="accent4">
+              <a:lumMod val="40000"/>
+              <a:lumOff val="60000"/>
+            </a:schemeClr>
+          </a:solidFill>
+          <a:ln>
+            <a:noFill/>
+          </a:ln>
+        </p:spPr>
+        <p:style>
+          <a:lnRef idx="2">
+            <a:schemeClr val="accent1">
+              <a:shade val="50000"/>
+            </a:schemeClr>
+          </a:lnRef>
+          <a:fillRef idx="1">
+            <a:schemeClr val="accent1"/>
+          </a:fillRef>
+          <a:effectRef idx="0">
+            <a:schemeClr val="accent1"/>
+          </a:effectRef>
+          <a:fontRef idx="minor">
+            <a:schemeClr val="lt1"/>
+          </a:fontRef>
+        </p:style>
+        <p:txBody>
+          <a:bodyPr rtlCol="0" anchor="ctr"/>
+          <a:lstStyle/>
+          <a:p>
+            <a:pPr algn="ctr"/>
+            <a:endParaRPr lang="ko-KR" altLang="en-US" dirty="0">
+              <a:latin typeface="나눔스퀘어라운드 ExtraBold" panose="020B0600000101010101" pitchFamily="50" charset="-127"/>
+              <a:ea typeface="나눔스퀘어라운드 ExtraBold" panose="020B0600000101010101" pitchFamily="50" charset="-127"/>
+            </a:endParaRPr>
+          </a:p>
+        </p:txBody>
+      </p:sp>
+      <p:cxnSp>
+        <p:nvCxnSpPr>
+          <p:cNvPr id="37" name="직선 화살표 연결선 36">
+            <a:extLst>
+              <a:ext uri="{FF2B5EF4-FFF2-40B4-BE49-F238E27FC236}">
+                <a16:creationId xmlns:a16="http://schemas.microsoft.com/office/drawing/2014/main" id="{4AECF7A6-B896-462C-82C0-F43346539E9F}"/>
+              </a:ext>
+            </a:extLst>
+          </p:cNvPr>
+          <p:cNvCxnSpPr>
+            <a:cxnSpLocks/>
+          </p:cNvCxnSpPr>
+          <p:nvPr/>
+        </p:nvCxnSpPr>
+        <p:spPr>
+          <a:xfrm flipH="1">
+            <a:off x="8718298" y="3943317"/>
+            <a:ext cx="3273761" cy="0"/>
+          </a:xfrm>
+          <a:prstGeom prst="straightConnector1">
+            <a:avLst/>
+          </a:prstGeom>
+          <a:ln w="38100">
+            <a:solidFill>
+              <a:schemeClr val="bg1">
+                <a:lumMod val="50000"/>
+              </a:schemeClr>
+            </a:solidFill>
+            <a:tailEnd type="triangle"/>
+          </a:ln>
+        </p:spPr>
+        <p:style>
+          <a:lnRef idx="1">
+            <a:schemeClr val="accent1"/>
+          </a:lnRef>
+          <a:fillRef idx="0">
+            <a:schemeClr val="accent1"/>
+          </a:fillRef>
+          <a:effectRef idx="0">
+            <a:schemeClr val="accent1"/>
+          </a:effectRef>
+          <a:fontRef idx="minor">
+            <a:schemeClr val="tx1"/>
+          </a:fontRef>
+        </p:style>
+      </p:cxnSp>
+      <p:sp>
+        <p:nvSpPr>
+          <p:cNvPr id="39" name="타원 38">
+            <a:extLst>
+              <a:ext uri="{FF2B5EF4-FFF2-40B4-BE49-F238E27FC236}">
+                <a16:creationId xmlns:a16="http://schemas.microsoft.com/office/drawing/2014/main" id="{B8DB5C17-45B8-414E-B39F-2F7A8991774E}"/>
+              </a:ext>
+            </a:extLst>
+          </p:cNvPr>
+          <p:cNvSpPr/>
+          <p:nvPr/>
+        </p:nvSpPr>
+        <p:spPr>
+          <a:xfrm>
+            <a:off x="10667821" y="3434534"/>
+            <a:ext cx="1040374" cy="1040374"/>
+          </a:xfrm>
+          <a:prstGeom prst="ellipse">
+            <a:avLst/>
+          </a:prstGeom>
+          <a:solidFill>
+            <a:schemeClr val="accent2">
+              <a:lumMod val="40000"/>
+              <a:lumOff val="60000"/>
+            </a:schemeClr>
+          </a:solidFill>
+          <a:ln>
+            <a:noFill/>
+          </a:ln>
+        </p:spPr>
+        <p:style>
+          <a:lnRef idx="2">
+            <a:schemeClr val="accent1">
+              <a:shade val="50000"/>
+            </a:schemeClr>
+          </a:lnRef>
+          <a:fillRef idx="1">
+            <a:schemeClr val="accent1"/>
+          </a:fillRef>
+          <a:effectRef idx="0">
+            <a:schemeClr val="accent1"/>
+          </a:effectRef>
+          <a:fontRef idx="minor">
+            <a:schemeClr val="lt1"/>
+          </a:fontRef>
+        </p:style>
+        <p:txBody>
+          <a:bodyPr rtlCol="0" anchor="ctr"/>
+          <a:lstStyle/>
+          <a:p>
+            <a:pPr algn="ctr"/>
+            <a:r>
+              <a:rPr lang="en-US" altLang="ko-KR" dirty="0">
+                <a:solidFill>
+                  <a:schemeClr val="tx1"/>
+                </a:solidFill>
+                <a:latin typeface="나눔스퀘어라운드 ExtraBold" panose="020B0600000101010101" pitchFamily="50" charset="-127"/>
+                <a:ea typeface="나눔스퀘어라운드 ExtraBold" panose="020B0600000101010101" pitchFamily="50" charset="-127"/>
+              </a:rPr>
+              <a:t>obj</a:t>
+            </a:r>
+            <a:endParaRPr lang="ko-KR" altLang="en-US" dirty="0">
+              <a:solidFill>
+                <a:schemeClr val="tx1"/>
+              </a:solidFill>
+              <a:latin typeface="나눔스퀘어라운드 ExtraBold" panose="020B0600000101010101" pitchFamily="50" charset="-127"/>
+              <a:ea typeface="나눔스퀘어라운드 ExtraBold" panose="020B0600000101010101" pitchFamily="50" charset="-127"/>
+            </a:endParaRPr>
+          </a:p>
+        </p:txBody>
+      </p:sp>
+      <p:sp>
+        <p:nvSpPr>
+          <p:cNvPr id="40" name="타원 39">
+            <a:extLst>
+              <a:ext uri="{FF2B5EF4-FFF2-40B4-BE49-F238E27FC236}">
+                <a16:creationId xmlns:a16="http://schemas.microsoft.com/office/drawing/2014/main" id="{F0E4A421-8187-4B4D-AD12-E13E98CC9325}"/>
+              </a:ext>
+            </a:extLst>
+          </p:cNvPr>
+          <p:cNvSpPr/>
+          <p:nvPr/>
+        </p:nvSpPr>
+        <p:spPr>
+          <a:xfrm>
+            <a:off x="9343584" y="3472103"/>
+            <a:ext cx="1040374" cy="1040374"/>
+          </a:xfrm>
+          <a:prstGeom prst="ellipse">
+            <a:avLst/>
+          </a:prstGeom>
+          <a:solidFill>
+            <a:schemeClr val="accent2">
+              <a:lumMod val="40000"/>
+              <a:lumOff val="60000"/>
+            </a:schemeClr>
+          </a:solidFill>
+          <a:ln>
+            <a:noFill/>
+          </a:ln>
+        </p:spPr>
+        <p:style>
+          <a:lnRef idx="2">
+            <a:schemeClr val="accent1">
+              <a:shade val="50000"/>
+            </a:schemeClr>
+          </a:lnRef>
+          <a:fillRef idx="1">
+            <a:schemeClr val="accent1"/>
+          </a:fillRef>
+          <a:effectRef idx="0">
+            <a:schemeClr val="accent1"/>
+          </a:effectRef>
+          <a:fontRef idx="minor">
+            <a:schemeClr val="lt1"/>
+          </a:fontRef>
+        </p:style>
+        <p:txBody>
+          <a:bodyPr rtlCol="0" anchor="ctr"/>
+          <a:lstStyle/>
+          <a:p>
+            <a:pPr algn="ctr"/>
+            <a:r>
+              <a:rPr lang="en-US" altLang="ko-KR" dirty="0">
+                <a:solidFill>
+                  <a:schemeClr val="tx1"/>
+                </a:solidFill>
+                <a:latin typeface="나눔스퀘어라운드 ExtraBold" panose="020B0600000101010101" pitchFamily="50" charset="-127"/>
+                <a:ea typeface="나눔스퀘어라운드 ExtraBold" panose="020B0600000101010101" pitchFamily="50" charset="-127"/>
+              </a:rPr>
+              <a:t>obj</a:t>
+            </a:r>
+            <a:endParaRPr lang="ko-KR" altLang="en-US" dirty="0">
+              <a:solidFill>
+                <a:schemeClr val="tx1"/>
+              </a:solidFill>
+              <a:latin typeface="나눔스퀘어라운드 ExtraBold" panose="020B0600000101010101" pitchFamily="50" charset="-127"/>
+              <a:ea typeface="나눔스퀘어라운드 ExtraBold" panose="020B0600000101010101" pitchFamily="50" charset="-127"/>
+            </a:endParaRPr>
+          </a:p>
+        </p:txBody>
+      </p:sp>
+    </p:spTree>
+    <p:extLst>
+      <p:ext uri="{BB962C8B-B14F-4D97-AF65-F5344CB8AC3E}">
+        <p14:creationId xmlns:p14="http://schemas.microsoft.com/office/powerpoint/2010/main" val="2759227179"/>
+      </p:ext>
+    </p:extLst>
+  </p:cSld>
+  <p:clrMapOvr>
+    <a:masterClrMapping/>
+  </p:clrMapOvr>
+</p:sld>
+</file>
+
+<file path=ppt/slides/slide7.xml><?xml version="1.0" encoding="utf-8"?>
+<p:sld xmlns:a="http://schemas.openxmlformats.org/drawingml/2006/main" xmlns:r="http://schemas.openxmlformats.org/officeDocument/2006/relationships" xmlns:p="http://schemas.openxmlformats.org/presentationml/2006/main">
+  <p:cSld>
+    <p:spTree>
+      <p:nvGrpSpPr>
+        <p:cNvPr id="1" name=""/>
+        <p:cNvGrpSpPr/>
+        <p:nvPr/>
+      </p:nvGrpSpPr>
+      <p:grpSpPr>
+        <a:xfrm>
+          <a:off x="0" y="0"/>
+          <a:ext cx="0" cy="0"/>
+          <a:chOff x="0" y="0"/>
+          <a:chExt cx="0" cy="0"/>
+        </a:xfrm>
+      </p:grpSpPr>
+      <p:grpSp>
+        <p:nvGrpSpPr>
+          <p:cNvPr id="3" name="그룹 2">
+            <a:extLst>
+              <a:ext uri="{FF2B5EF4-FFF2-40B4-BE49-F238E27FC236}">
+                <a16:creationId xmlns:a16="http://schemas.microsoft.com/office/drawing/2014/main" id="{B99BBFBB-3526-4BB1-A37C-3B8966515734}"/>
+              </a:ext>
+            </a:extLst>
+          </p:cNvPr>
+          <p:cNvGrpSpPr/>
+          <p:nvPr/>
+        </p:nvGrpSpPr>
+        <p:grpSpPr>
+          <a:xfrm rot="16200000">
+            <a:off x="3987627" y="720360"/>
+            <a:ext cx="1342846" cy="5705258"/>
+            <a:chOff x="4283242" y="1983914"/>
+            <a:chExt cx="2299965" cy="5705258"/>
+          </a:xfrm>
+        </p:grpSpPr>
+        <p:cxnSp>
+          <p:nvCxnSpPr>
+            <p:cNvPr id="5" name="직선 화살표 연결선 4">
+              <a:extLst>
+                <a:ext uri="{FF2B5EF4-FFF2-40B4-BE49-F238E27FC236}">
+                  <a16:creationId xmlns:a16="http://schemas.microsoft.com/office/drawing/2014/main" id="{9E32C43A-A809-4797-9A05-9C4C775DB3B2}"/>
+                </a:ext>
+              </a:extLst>
+            </p:cNvPr>
+            <p:cNvCxnSpPr>
+              <a:cxnSpLocks/>
+            </p:cNvCxnSpPr>
+            <p:nvPr/>
+          </p:nvCxnSpPr>
+          <p:spPr>
+            <a:xfrm>
+              <a:off x="4283242" y="3392752"/>
+              <a:ext cx="2187209" cy="0"/>
+            </a:xfrm>
+            <a:prstGeom prst="straightConnector1">
+              <a:avLst/>
+            </a:prstGeom>
+            <a:ln w="38100">
+              <a:solidFill>
+                <a:schemeClr val="bg1">
+                  <a:lumMod val="50000"/>
+                </a:schemeClr>
+              </a:solidFill>
+              <a:tailEnd type="triangle"/>
+            </a:ln>
+          </p:spPr>
+          <p:style>
+            <a:lnRef idx="1">
+              <a:schemeClr val="accent1"/>
+            </a:lnRef>
+            <a:fillRef idx="0">
+              <a:schemeClr val="accent1"/>
+            </a:fillRef>
+            <a:effectRef idx="0">
+              <a:schemeClr val="accent1"/>
+            </a:effectRef>
+            <a:fontRef idx="minor">
+              <a:schemeClr val="tx1"/>
+            </a:fontRef>
+          </p:style>
+        </p:cxnSp>
+        <p:sp>
+          <p:nvSpPr>
+            <p:cNvPr id="6" name="TextBox 5">
+              <a:extLst>
+                <a:ext uri="{FF2B5EF4-FFF2-40B4-BE49-F238E27FC236}">
+                  <a16:creationId xmlns:a16="http://schemas.microsoft.com/office/drawing/2014/main" id="{608FDBEF-27D8-4593-B29B-D6713BAB1BF8}"/>
+                </a:ext>
+              </a:extLst>
+            </p:cNvPr>
+            <p:cNvSpPr txBox="1"/>
+            <p:nvPr/>
+          </p:nvSpPr>
+          <p:spPr>
+            <a:xfrm rot="5400000">
+              <a:off x="4654076" y="2498742"/>
+              <a:ext cx="1408840" cy="379183"/>
+            </a:xfrm>
+            <a:prstGeom prst="rect">
+              <a:avLst/>
+            </a:prstGeom>
+            <a:noFill/>
+          </p:spPr>
+          <p:txBody>
+            <a:bodyPr wrap="square" rtlCol="0">
+              <a:spAutoFit/>
+            </a:bodyPr>
+            <a:lstStyle/>
+            <a:p>
+              <a:pPr algn="ctr"/>
+              <a:r>
+                <a:rPr lang="ko-KR" altLang="en-US" dirty="0">
+                  <a:latin typeface="나눔스퀘어라운드 ExtraBold" panose="020B0600000101010101" pitchFamily="50" charset="-127"/>
+                  <a:ea typeface="나눔스퀘어라운드 ExtraBold" panose="020B0600000101010101" pitchFamily="50" charset="-127"/>
+                </a:rPr>
+                <a:t>의존성 삽입</a:t>
+              </a:r>
+            </a:p>
+          </p:txBody>
+        </p:sp>
+        <p:cxnSp>
+          <p:nvCxnSpPr>
+            <p:cNvPr id="33" name="직선 화살표 연결선 32">
+              <a:extLst>
+                <a:ext uri="{FF2B5EF4-FFF2-40B4-BE49-F238E27FC236}">
+                  <a16:creationId xmlns:a16="http://schemas.microsoft.com/office/drawing/2014/main" id="{BC13A7BC-8F91-4E26-BFBD-A1A6DBF1E1C2}"/>
+                </a:ext>
+              </a:extLst>
+            </p:cNvPr>
+            <p:cNvCxnSpPr>
+              <a:cxnSpLocks/>
+            </p:cNvCxnSpPr>
+            <p:nvPr/>
+          </p:nvCxnSpPr>
+          <p:spPr>
+            <a:xfrm>
+              <a:off x="4395998" y="7689170"/>
+              <a:ext cx="2187209" cy="0"/>
+            </a:xfrm>
+            <a:prstGeom prst="straightConnector1">
+              <a:avLst/>
+            </a:prstGeom>
+            <a:ln w="38100">
+              <a:solidFill>
+                <a:schemeClr val="bg1">
+                  <a:lumMod val="50000"/>
+                </a:schemeClr>
+              </a:solidFill>
+              <a:tailEnd type="triangle"/>
+            </a:ln>
+          </p:spPr>
+          <p:style>
+            <a:lnRef idx="1">
+              <a:schemeClr val="accent1"/>
+            </a:lnRef>
+            <a:fillRef idx="0">
+              <a:schemeClr val="accent1"/>
+            </a:fillRef>
+            <a:effectRef idx="0">
+              <a:schemeClr val="accent1"/>
+            </a:effectRef>
+            <a:fontRef idx="minor">
+              <a:schemeClr val="tx1"/>
+            </a:fontRef>
+          </p:style>
+        </p:cxnSp>
+        <p:sp>
+          <p:nvSpPr>
+            <p:cNvPr id="34" name="TextBox 33">
+              <a:extLst>
+                <a:ext uri="{FF2B5EF4-FFF2-40B4-BE49-F238E27FC236}">
+                  <a16:creationId xmlns:a16="http://schemas.microsoft.com/office/drawing/2014/main" id="{6672E57D-7C75-4317-AD5E-26187BDF918F}"/>
+                </a:ext>
+              </a:extLst>
+            </p:cNvPr>
+            <p:cNvSpPr txBox="1"/>
+            <p:nvPr/>
+          </p:nvSpPr>
+          <p:spPr>
+            <a:xfrm rot="5400000">
+              <a:off x="4991792" y="7020122"/>
+              <a:ext cx="705525" cy="632575"/>
+            </a:xfrm>
+            <a:prstGeom prst="rect">
+              <a:avLst/>
+            </a:prstGeom>
+            <a:noFill/>
+          </p:spPr>
+          <p:txBody>
+            <a:bodyPr wrap="square" rtlCol="0">
+              <a:spAutoFit/>
+            </a:bodyPr>
+            <a:lstStyle/>
+            <a:p>
+              <a:pPr algn="ctr"/>
+              <a:r>
+                <a:rPr lang="ko-KR" altLang="en-US" dirty="0">
+                  <a:latin typeface="나눔스퀘어라운드 ExtraBold" panose="020B0600000101010101" pitchFamily="50" charset="-127"/>
+                  <a:ea typeface="나눔스퀘어라운드 ExtraBold" panose="020B0600000101010101" pitchFamily="50" charset="-127"/>
+                </a:rPr>
+                <a:t>구현</a:t>
+              </a:r>
+            </a:p>
+          </p:txBody>
+        </p:sp>
+      </p:grpSp>
+      <p:sp>
+        <p:nvSpPr>
+          <p:cNvPr id="20" name="TextBox 19">
+            <a:extLst>
+              <a:ext uri="{FF2B5EF4-FFF2-40B4-BE49-F238E27FC236}">
+                <a16:creationId xmlns:a16="http://schemas.microsoft.com/office/drawing/2014/main" id="{1995BEE1-69DE-4738-B8C2-71F35551F883}"/>
+              </a:ext>
+            </a:extLst>
+          </p:cNvPr>
+          <p:cNvSpPr txBox="1"/>
+          <p:nvPr/>
+        </p:nvSpPr>
+        <p:spPr>
+          <a:xfrm>
+            <a:off x="2705457" y="373616"/>
+            <a:ext cx="4764387" cy="461665"/>
+          </a:xfrm>
+          <a:prstGeom prst="rect">
+            <a:avLst/>
+          </a:prstGeom>
+          <a:noFill/>
+        </p:spPr>
+        <p:txBody>
+          <a:bodyPr wrap="square" rtlCol="0">
+            <a:spAutoFit/>
+          </a:bodyPr>
+          <a:lstStyle/>
+          <a:p>
+            <a:pPr algn="ctr"/>
+            <a:r>
+              <a:rPr lang="en-US" altLang="ko-KR" sz="2400" dirty="0">
+                <a:latin typeface="나눔스퀘어라운드 ExtraBold" panose="020B0600000101010101" pitchFamily="50" charset="-127"/>
+                <a:ea typeface="나눔스퀘어라운드 ExtraBold" panose="020B0600000101010101" pitchFamily="50" charset="-127"/>
+              </a:rPr>
+              <a:t>IoC</a:t>
+            </a:r>
+            <a:r>
+              <a:rPr lang="ko-KR" altLang="en-US" sz="2400" dirty="0">
+                <a:latin typeface="나눔스퀘어라운드 ExtraBold" panose="020B0600000101010101" pitchFamily="50" charset="-127"/>
+                <a:ea typeface="나눔스퀘어라운드 ExtraBold" panose="020B0600000101010101" pitchFamily="50" charset="-127"/>
+              </a:rPr>
+              <a:t>를 이용한 클래스 호출 방식</a:t>
+            </a:r>
+          </a:p>
+        </p:txBody>
+      </p:sp>
+      <p:sp>
+        <p:nvSpPr>
+          <p:cNvPr id="31" name="타원 30">
+            <a:extLst>
+              <a:ext uri="{FF2B5EF4-FFF2-40B4-BE49-F238E27FC236}">
+                <a16:creationId xmlns:a16="http://schemas.microsoft.com/office/drawing/2014/main" id="{28429E66-8A8A-414B-9ED9-99B110648878}"/>
+              </a:ext>
+            </a:extLst>
+          </p:cNvPr>
+          <p:cNvSpPr/>
+          <p:nvPr/>
+        </p:nvSpPr>
+        <p:spPr>
+          <a:xfrm>
+            <a:off x="2326104" y="1012184"/>
+            <a:ext cx="1778311" cy="1778311"/>
+          </a:xfrm>
+          <a:prstGeom prst="ellipse">
+            <a:avLst/>
+          </a:prstGeom>
+          <a:solidFill>
+            <a:schemeClr val="accent2">
+              <a:lumMod val="40000"/>
+              <a:lumOff val="60000"/>
+            </a:schemeClr>
+          </a:solidFill>
+          <a:ln>
+            <a:noFill/>
+          </a:ln>
+        </p:spPr>
+        <p:style>
+          <a:lnRef idx="2">
+            <a:schemeClr val="accent1">
+              <a:shade val="50000"/>
+            </a:schemeClr>
+          </a:lnRef>
+          <a:fillRef idx="1">
+            <a:schemeClr val="accent1"/>
+          </a:fillRef>
+          <a:effectRef idx="0">
+            <a:schemeClr val="accent1"/>
+          </a:effectRef>
+          <a:fontRef idx="minor">
+            <a:schemeClr val="lt1"/>
+          </a:fontRef>
+        </p:style>
+        <p:txBody>
+          <a:bodyPr rtlCol="0" anchor="ctr"/>
+          <a:lstStyle/>
+          <a:p>
+            <a:pPr algn="ctr"/>
+            <a:r>
+              <a:rPr lang="ko-KR" altLang="en-US" dirty="0">
+                <a:solidFill>
+                  <a:schemeClr val="tx1"/>
+                </a:solidFill>
+                <a:latin typeface="나눔스퀘어라운드 ExtraBold" panose="020B0600000101010101" pitchFamily="50" charset="-127"/>
+                <a:ea typeface="나눔스퀘어라운드 ExtraBold" panose="020B0600000101010101" pitchFamily="50" charset="-127"/>
+              </a:rPr>
+              <a:t>클래스</a:t>
+            </a:r>
+          </a:p>
+        </p:txBody>
+      </p:sp>
+      <p:grpSp>
+        <p:nvGrpSpPr>
+          <p:cNvPr id="17" name="그룹 16">
+            <a:extLst>
+              <a:ext uri="{FF2B5EF4-FFF2-40B4-BE49-F238E27FC236}">
+                <a16:creationId xmlns:a16="http://schemas.microsoft.com/office/drawing/2014/main" id="{238E0916-8BCA-4F77-A658-4D97F54E99D9}"/>
+              </a:ext>
+            </a:extLst>
+          </p:cNvPr>
+          <p:cNvGrpSpPr/>
+          <p:nvPr/>
+        </p:nvGrpSpPr>
+        <p:grpSpPr>
+          <a:xfrm>
+            <a:off x="4104415" y="4803765"/>
+            <a:ext cx="2406596" cy="431321"/>
+            <a:chOff x="4063855" y="2961431"/>
+            <a:chExt cx="2406596" cy="431321"/>
+          </a:xfrm>
+        </p:grpSpPr>
+        <p:cxnSp>
+          <p:nvCxnSpPr>
+            <p:cNvPr id="18" name="직선 화살표 연결선 17">
+              <a:extLst>
+                <a:ext uri="{FF2B5EF4-FFF2-40B4-BE49-F238E27FC236}">
+                  <a16:creationId xmlns:a16="http://schemas.microsoft.com/office/drawing/2014/main" id="{C1C3B536-6DD2-499F-9A50-A804E4B40E73}"/>
+                </a:ext>
+              </a:extLst>
+            </p:cNvPr>
+            <p:cNvCxnSpPr>
+              <a:cxnSpLocks/>
+            </p:cNvCxnSpPr>
+            <p:nvPr/>
+          </p:nvCxnSpPr>
+          <p:spPr>
+            <a:xfrm>
+              <a:off x="4283242" y="3392752"/>
+              <a:ext cx="2187209" cy="0"/>
+            </a:xfrm>
+            <a:prstGeom prst="straightConnector1">
+              <a:avLst/>
+            </a:prstGeom>
+            <a:ln w="38100">
+              <a:solidFill>
+                <a:schemeClr val="bg1">
+                  <a:lumMod val="50000"/>
+                </a:schemeClr>
+              </a:solidFill>
+              <a:tailEnd type="triangle"/>
+            </a:ln>
+          </p:spPr>
+          <p:style>
+            <a:lnRef idx="1">
+              <a:schemeClr val="accent1"/>
+            </a:lnRef>
+            <a:fillRef idx="0">
+              <a:schemeClr val="accent1"/>
+            </a:fillRef>
+            <a:effectRef idx="0">
+              <a:schemeClr val="accent1"/>
+            </a:effectRef>
+            <a:fontRef idx="minor">
+              <a:schemeClr val="tx1"/>
+            </a:fontRef>
+          </p:style>
+        </p:cxnSp>
+        <p:sp>
+          <p:nvSpPr>
+            <p:cNvPr id="19" name="TextBox 18">
+              <a:extLst>
+                <a:ext uri="{FF2B5EF4-FFF2-40B4-BE49-F238E27FC236}">
+                  <a16:creationId xmlns:a16="http://schemas.microsoft.com/office/drawing/2014/main" id="{D7B697B1-C361-4619-8AB1-FAAF388580B3}"/>
+                </a:ext>
+              </a:extLst>
+            </p:cNvPr>
+            <p:cNvSpPr txBox="1"/>
+            <p:nvPr/>
+          </p:nvSpPr>
+          <p:spPr>
+            <a:xfrm>
+              <a:off x="4063855" y="2961431"/>
+              <a:ext cx="2324371" cy="369332"/>
+            </a:xfrm>
+            <a:prstGeom prst="rect">
+              <a:avLst/>
+            </a:prstGeom>
+            <a:noFill/>
+          </p:spPr>
+          <p:txBody>
+            <a:bodyPr wrap="square" rtlCol="0">
+              <a:spAutoFit/>
+            </a:bodyPr>
+            <a:lstStyle/>
+            <a:p>
+              <a:pPr algn="ctr"/>
+              <a:r>
+                <a:rPr lang="ko-KR" altLang="en-US" dirty="0">
+                  <a:latin typeface="나눔스퀘어라운드 ExtraBold" panose="020B0600000101010101" pitchFamily="50" charset="-127"/>
+                  <a:ea typeface="나눔스퀘어라운드 ExtraBold" panose="020B0600000101010101" pitchFamily="50" charset="-127"/>
+                </a:rPr>
+                <a:t>사용</a:t>
+              </a:r>
+            </a:p>
+          </p:txBody>
+        </p:sp>
+      </p:grpSp>
+      <p:sp>
+        <p:nvSpPr>
+          <p:cNvPr id="21" name="타원 20">
+            <a:extLst>
+              <a:ext uri="{FF2B5EF4-FFF2-40B4-BE49-F238E27FC236}">
+                <a16:creationId xmlns:a16="http://schemas.microsoft.com/office/drawing/2014/main" id="{8CB08007-5C87-4185-AD60-03A69886844B}"/>
+              </a:ext>
+            </a:extLst>
+          </p:cNvPr>
+          <p:cNvSpPr/>
+          <p:nvPr/>
+        </p:nvSpPr>
+        <p:spPr>
+          <a:xfrm>
+            <a:off x="2326104" y="4316858"/>
+            <a:ext cx="1778311" cy="1778311"/>
+          </a:xfrm>
+          <a:prstGeom prst="ellipse">
+            <a:avLst/>
+          </a:prstGeom>
+          <a:solidFill>
+            <a:schemeClr val="accent2">
+              <a:lumMod val="40000"/>
+              <a:lumOff val="60000"/>
+            </a:schemeClr>
+          </a:solidFill>
+          <a:ln>
+            <a:noFill/>
+          </a:ln>
+        </p:spPr>
+        <p:style>
+          <a:lnRef idx="2">
+            <a:schemeClr val="accent1">
+              <a:shade val="50000"/>
+            </a:schemeClr>
+          </a:lnRef>
+          <a:fillRef idx="1">
+            <a:schemeClr val="accent1"/>
+          </a:fillRef>
+          <a:effectRef idx="0">
+            <a:schemeClr val="accent1"/>
+          </a:effectRef>
+          <a:fontRef idx="minor">
+            <a:schemeClr val="lt1"/>
+          </a:fontRef>
+        </p:style>
+        <p:txBody>
+          <a:bodyPr rtlCol="0" anchor="ctr"/>
+          <a:lstStyle/>
+          <a:p>
+            <a:pPr algn="ctr"/>
+            <a:r>
+              <a:rPr lang="ko-KR" altLang="en-US" dirty="0">
+                <a:solidFill>
+                  <a:schemeClr val="tx1"/>
+                </a:solidFill>
+                <a:latin typeface="나눔스퀘어라운드 ExtraBold" panose="020B0600000101010101" pitchFamily="50" charset="-127"/>
+                <a:ea typeface="나눔스퀘어라운드 ExtraBold" panose="020B0600000101010101" pitchFamily="50" charset="-127"/>
+              </a:rPr>
+              <a:t>조립기</a:t>
+            </a:r>
+          </a:p>
+        </p:txBody>
+      </p:sp>
+      <p:sp>
+        <p:nvSpPr>
+          <p:cNvPr id="22" name="타원 21">
+            <a:extLst>
+              <a:ext uri="{FF2B5EF4-FFF2-40B4-BE49-F238E27FC236}">
+                <a16:creationId xmlns:a16="http://schemas.microsoft.com/office/drawing/2014/main" id="{F19AD96C-67BC-48F8-B2B6-8F57B5417A4F}"/>
+              </a:ext>
+            </a:extLst>
+          </p:cNvPr>
+          <p:cNvSpPr/>
+          <p:nvPr/>
+        </p:nvSpPr>
+        <p:spPr>
+          <a:xfrm>
+            <a:off x="6730398" y="979267"/>
+            <a:ext cx="1778311" cy="1778311"/>
+          </a:xfrm>
+          <a:prstGeom prst="ellipse">
+            <a:avLst/>
+          </a:prstGeom>
+          <a:solidFill>
+            <a:schemeClr val="accent2">
+              <a:lumMod val="40000"/>
+              <a:lumOff val="60000"/>
+            </a:schemeClr>
+          </a:solidFill>
+          <a:ln>
+            <a:noFill/>
+          </a:ln>
+        </p:spPr>
+        <p:style>
+          <a:lnRef idx="2">
+            <a:schemeClr val="accent1">
+              <a:shade val="50000"/>
+            </a:schemeClr>
+          </a:lnRef>
+          <a:fillRef idx="1">
+            <a:schemeClr val="accent1"/>
+          </a:fillRef>
+          <a:effectRef idx="0">
+            <a:schemeClr val="accent1"/>
+          </a:effectRef>
+          <a:fontRef idx="minor">
+            <a:schemeClr val="lt1"/>
+          </a:fontRef>
+        </p:style>
+        <p:txBody>
+          <a:bodyPr rtlCol="0" anchor="ctr"/>
+          <a:lstStyle/>
+          <a:p>
+            <a:pPr algn="ctr"/>
+            <a:r>
+              <a:rPr lang="ko-KR" altLang="en-US" dirty="0">
+                <a:solidFill>
+                  <a:schemeClr val="tx1"/>
+                </a:solidFill>
+                <a:latin typeface="나눔스퀘어라운드 ExtraBold" panose="020B0600000101010101" pitchFamily="50" charset="-127"/>
+                <a:ea typeface="나눔스퀘어라운드 ExtraBold" panose="020B0600000101010101" pitchFamily="50" charset="-127"/>
+              </a:rPr>
+              <a:t>인터페이스</a:t>
+            </a:r>
+          </a:p>
+        </p:txBody>
+      </p:sp>
+      <p:sp>
+        <p:nvSpPr>
+          <p:cNvPr id="26" name="타원 25">
+            <a:extLst>
+              <a:ext uri="{FF2B5EF4-FFF2-40B4-BE49-F238E27FC236}">
+                <a16:creationId xmlns:a16="http://schemas.microsoft.com/office/drawing/2014/main" id="{AE00BC41-E635-4584-934C-C6D9AFC352E4}"/>
+              </a:ext>
+            </a:extLst>
+          </p:cNvPr>
+          <p:cNvSpPr/>
+          <p:nvPr/>
+        </p:nvSpPr>
+        <p:spPr>
+          <a:xfrm>
+            <a:off x="6730398" y="4283941"/>
+            <a:ext cx="1778311" cy="1778311"/>
+          </a:xfrm>
+          <a:prstGeom prst="ellipse">
+            <a:avLst/>
+          </a:prstGeom>
+          <a:solidFill>
+            <a:schemeClr val="accent2">
+              <a:lumMod val="40000"/>
+              <a:lumOff val="60000"/>
+            </a:schemeClr>
+          </a:solidFill>
+          <a:ln>
+            <a:noFill/>
+          </a:ln>
+        </p:spPr>
+        <p:style>
+          <a:lnRef idx="2">
+            <a:schemeClr val="accent1">
+              <a:shade val="50000"/>
+            </a:schemeClr>
+          </a:lnRef>
+          <a:fillRef idx="1">
+            <a:schemeClr val="accent1"/>
+          </a:fillRef>
+          <a:effectRef idx="0">
+            <a:schemeClr val="accent1"/>
+          </a:effectRef>
+          <a:fontRef idx="minor">
+            <a:schemeClr val="lt1"/>
+          </a:fontRef>
+        </p:style>
+        <p:txBody>
+          <a:bodyPr rtlCol="0" anchor="ctr"/>
+          <a:lstStyle/>
+          <a:p>
+            <a:pPr algn="ctr"/>
+            <a:r>
+              <a:rPr lang="ko-KR" altLang="en-US" dirty="0">
+                <a:solidFill>
+                  <a:schemeClr val="tx1"/>
+                </a:solidFill>
+                <a:latin typeface="나눔스퀘어라운드 ExtraBold" panose="020B0600000101010101" pitchFamily="50" charset="-127"/>
+                <a:ea typeface="나눔스퀘어라운드 ExtraBold" panose="020B0600000101010101" pitchFamily="50" charset="-127"/>
+              </a:rPr>
+              <a:t>구현 </a:t>
+            </a:r>
+            <a:br>
+              <a:rPr lang="en-US" altLang="ko-KR" dirty="0">
+                <a:solidFill>
+                  <a:schemeClr val="tx1"/>
+                </a:solidFill>
+                <a:latin typeface="나눔스퀘어라운드 ExtraBold" panose="020B0600000101010101" pitchFamily="50" charset="-127"/>
+                <a:ea typeface="나눔스퀘어라운드 ExtraBold" panose="020B0600000101010101" pitchFamily="50" charset="-127"/>
+              </a:rPr>
+            </a:br>
+            <a:r>
+              <a:rPr lang="ko-KR" altLang="en-US" dirty="0">
+                <a:solidFill>
+                  <a:schemeClr val="tx1"/>
+                </a:solidFill>
+                <a:latin typeface="나눔스퀘어라운드 ExtraBold" panose="020B0600000101010101" pitchFamily="50" charset="-127"/>
+                <a:ea typeface="나눔스퀘어라운드 ExtraBold" panose="020B0600000101010101" pitchFamily="50" charset="-127"/>
+              </a:rPr>
+              <a:t>클래스</a:t>
+            </a:r>
+          </a:p>
+        </p:txBody>
+      </p:sp>
+      <p:grpSp>
+        <p:nvGrpSpPr>
+          <p:cNvPr id="27" name="그룹 26">
+            <a:extLst>
+              <a:ext uri="{FF2B5EF4-FFF2-40B4-BE49-F238E27FC236}">
+                <a16:creationId xmlns:a16="http://schemas.microsoft.com/office/drawing/2014/main" id="{F94E7B07-5DB6-4EED-B8F5-5D4EB90BA51D}"/>
+              </a:ext>
+            </a:extLst>
+          </p:cNvPr>
+          <p:cNvGrpSpPr/>
+          <p:nvPr/>
+        </p:nvGrpSpPr>
+        <p:grpSpPr>
+          <a:xfrm>
+            <a:off x="4256815" y="1651491"/>
+            <a:ext cx="2406596" cy="431321"/>
+            <a:chOff x="4063855" y="2961431"/>
+            <a:chExt cx="2406596" cy="431321"/>
+          </a:xfrm>
+        </p:grpSpPr>
+        <p:cxnSp>
+          <p:nvCxnSpPr>
+            <p:cNvPr id="28" name="직선 화살표 연결선 27">
+              <a:extLst>
+                <a:ext uri="{FF2B5EF4-FFF2-40B4-BE49-F238E27FC236}">
+                  <a16:creationId xmlns:a16="http://schemas.microsoft.com/office/drawing/2014/main" id="{5EF20473-9290-40BB-9AD5-33EB37049B03}"/>
+                </a:ext>
+              </a:extLst>
+            </p:cNvPr>
+            <p:cNvCxnSpPr>
+              <a:cxnSpLocks/>
+            </p:cNvCxnSpPr>
+            <p:nvPr/>
+          </p:nvCxnSpPr>
+          <p:spPr>
+            <a:xfrm>
+              <a:off x="4283242" y="3392752"/>
+              <a:ext cx="2187209" cy="0"/>
+            </a:xfrm>
+            <a:prstGeom prst="straightConnector1">
+              <a:avLst/>
+            </a:prstGeom>
+            <a:ln w="38100">
+              <a:solidFill>
+                <a:schemeClr val="bg1">
+                  <a:lumMod val="50000"/>
+                </a:schemeClr>
+              </a:solidFill>
+              <a:tailEnd type="triangle"/>
+            </a:ln>
+          </p:spPr>
+          <p:style>
+            <a:lnRef idx="1">
+              <a:schemeClr val="accent1"/>
+            </a:lnRef>
+            <a:fillRef idx="0">
+              <a:schemeClr val="accent1"/>
+            </a:fillRef>
+            <a:effectRef idx="0">
+              <a:schemeClr val="accent1"/>
+            </a:effectRef>
+            <a:fontRef idx="minor">
+              <a:schemeClr val="tx1"/>
+            </a:fontRef>
+          </p:style>
+        </p:cxnSp>
+        <p:sp>
+          <p:nvSpPr>
+            <p:cNvPr id="32" name="TextBox 31">
+              <a:extLst>
+                <a:ext uri="{FF2B5EF4-FFF2-40B4-BE49-F238E27FC236}">
+                  <a16:creationId xmlns:a16="http://schemas.microsoft.com/office/drawing/2014/main" id="{6F35C7AE-C4D6-4D83-88B0-A19AAC004476}"/>
+                </a:ext>
+              </a:extLst>
+            </p:cNvPr>
+            <p:cNvSpPr txBox="1"/>
+            <p:nvPr/>
+          </p:nvSpPr>
+          <p:spPr>
+            <a:xfrm>
+              <a:off x="4063855" y="2961431"/>
+              <a:ext cx="2324371" cy="369332"/>
+            </a:xfrm>
+            <a:prstGeom prst="rect">
+              <a:avLst/>
+            </a:prstGeom>
+            <a:noFill/>
+          </p:spPr>
+          <p:txBody>
+            <a:bodyPr wrap="square" rtlCol="0">
+              <a:spAutoFit/>
+            </a:bodyPr>
+            <a:lstStyle/>
+            <a:p>
+              <a:pPr algn="ctr"/>
+              <a:r>
+                <a:rPr lang="ko-KR" altLang="en-US" dirty="0">
+                  <a:latin typeface="나눔스퀘어라운드 ExtraBold" panose="020B0600000101010101" pitchFamily="50" charset="-127"/>
+                  <a:ea typeface="나눔스퀘어라운드 ExtraBold" panose="020B0600000101010101" pitchFamily="50" charset="-127"/>
+                </a:rPr>
+                <a:t>사용</a:t>
+              </a:r>
+            </a:p>
+          </p:txBody>
+        </p:sp>
+      </p:grpSp>
+    </p:spTree>
+    <p:extLst>
+      <p:ext uri="{BB962C8B-B14F-4D97-AF65-F5344CB8AC3E}">
+        <p14:creationId xmlns:p14="http://schemas.microsoft.com/office/powerpoint/2010/main" val="3922872124"/>
       </p:ext>
     </p:extLst>
   </p:cSld>

</xml_diff>